<commit_message>
change where we go after shooting
</commit_message>
<xml_diff>
--- a/BuildRubberBandGunSoftware.pptx
+++ b/BuildRubberBandGunSoftware.pptx
@@ -272,7 +272,7 @@
           <a:p>
             <a:fld id="{02AC24A9-CCB6-4F8D-B8DB-C2F3692CFA5A}" type="datetimeFigureOut">
               <a:rPr lang="en-US" smtClean="0"/>
-              <a:t>2/15/2020</a:t>
+              <a:t>2/16/2020</a:t>
             </a:fld>
             <a:endParaRPr lang="en-US" dirty="0"/>
           </a:p>
@@ -642,7 +642,7 @@
           <a:p>
             <a:fld id="{02AC24A9-CCB6-4F8D-B8DB-C2F3692CFA5A}" type="datetimeFigureOut">
               <a:rPr lang="en-US" smtClean="0"/>
-              <a:t>2/15/2020</a:t>
+              <a:t>2/16/2020</a:t>
             </a:fld>
             <a:endParaRPr lang="en-US"/>
           </a:p>
@@ -851,7 +851,7 @@
           <a:p>
             <a:fld id="{02AC24A9-CCB6-4F8D-B8DB-C2F3692CFA5A}" type="datetimeFigureOut">
               <a:rPr lang="en-US" smtClean="0"/>
-              <a:t>2/15/2020</a:t>
+              <a:t>2/16/2020</a:t>
             </a:fld>
             <a:endParaRPr lang="en-US"/>
           </a:p>
@@ -1321,7 +1321,7 @@
           <a:p>
             <a:fld id="{02AC24A9-CCB6-4F8D-B8DB-C2F3692CFA5A}" type="datetimeFigureOut">
               <a:rPr lang="en-US" smtClean="0"/>
-              <a:t>2/15/2020</a:t>
+              <a:t>2/16/2020</a:t>
             </a:fld>
             <a:endParaRPr lang="en-US"/>
           </a:p>
@@ -1775,7 +1775,7 @@
           <a:p>
             <a:fld id="{02AC24A9-CCB6-4F8D-B8DB-C2F3692CFA5A}" type="datetimeFigureOut">
               <a:rPr lang="en-US" smtClean="0"/>
-              <a:t>2/15/2020</a:t>
+              <a:t>2/16/2020</a:t>
             </a:fld>
             <a:endParaRPr lang="en-US"/>
           </a:p>
@@ -2307,7 +2307,7 @@
           <a:p>
             <a:fld id="{02AC24A9-CCB6-4F8D-B8DB-C2F3692CFA5A}" type="datetimeFigureOut">
               <a:rPr lang="en-US" smtClean="0"/>
-              <a:t>2/15/2020</a:t>
+              <a:t>2/16/2020</a:t>
             </a:fld>
             <a:endParaRPr lang="en-US"/>
           </a:p>
@@ -3006,7 +3006,7 @@
           <a:p>
             <a:fld id="{02AC24A9-CCB6-4F8D-B8DB-C2F3692CFA5A}" type="datetimeFigureOut">
               <a:rPr lang="en-US" smtClean="0"/>
-              <a:t>2/15/2020</a:t>
+              <a:t>2/16/2020</a:t>
             </a:fld>
             <a:endParaRPr lang="en-US"/>
           </a:p>
@@ -3335,7 +3335,7 @@
           <a:p>
             <a:fld id="{02AC24A9-CCB6-4F8D-B8DB-C2F3692CFA5A}" type="datetimeFigureOut">
               <a:rPr lang="en-US" smtClean="0"/>
-              <a:t>2/15/2020</a:t>
+              <a:t>2/16/2020</a:t>
             </a:fld>
             <a:endParaRPr lang="en-US"/>
           </a:p>
@@ -3448,7 +3448,7 @@
           <a:p>
             <a:fld id="{02AC24A9-CCB6-4F8D-B8DB-C2F3692CFA5A}" type="datetimeFigureOut">
               <a:rPr lang="en-US" smtClean="0"/>
-              <a:t>2/15/2020</a:t>
+              <a:t>2/16/2020</a:t>
             </a:fld>
             <a:endParaRPr lang="en-US"/>
           </a:p>
@@ -3943,7 +3943,7 @@
           <a:p>
             <a:fld id="{02AC24A9-CCB6-4F8D-B8DB-C2F3692CFA5A}" type="datetimeFigureOut">
               <a:rPr lang="en-US" smtClean="0"/>
-              <a:t>2/15/2020</a:t>
+              <a:t>2/16/2020</a:t>
             </a:fld>
             <a:endParaRPr lang="en-US" dirty="0"/>
           </a:p>
@@ -4420,7 +4420,7 @@
           <a:p>
             <a:fld id="{02AC24A9-CCB6-4F8D-B8DB-C2F3692CFA5A}" type="datetimeFigureOut">
               <a:rPr lang="en-US" smtClean="0"/>
-              <a:t>2/15/2020</a:t>
+              <a:t>2/16/2020</a:t>
             </a:fld>
             <a:endParaRPr lang="en-US"/>
           </a:p>
@@ -4663,7 +4663,7 @@
           <a:p>
             <a:fld id="{02AC24A9-CCB6-4F8D-B8DB-C2F3692CFA5A}" type="datetimeFigureOut">
               <a:rPr lang="en-US" smtClean="0"/>
-              <a:t>2/15/2020</a:t>
+              <a:t>2/16/2020</a:t>
             </a:fld>
             <a:endParaRPr lang="en-US"/>
           </a:p>
@@ -5801,51 +5801,6 @@
           </a:p>
         </p:txBody>
       </p:sp>
-      <p:cxnSp>
-        <p:nvCxnSpPr>
-          <p:cNvPr id="15" name="Connector: Curved 14">
-            <a:extLst>
-              <a:ext uri="{FF2B5EF4-FFF2-40B4-BE49-F238E27FC236}">
-                <a16:creationId xmlns:a16="http://schemas.microsoft.com/office/drawing/2014/main" id="{C92B5EFC-83D7-4989-8279-A505FEE57ACC}"/>
-              </a:ext>
-            </a:extLst>
-          </p:cNvPr>
-          <p:cNvCxnSpPr>
-            <a:cxnSpLocks/>
-            <a:stCxn id="12" idx="0"/>
-            <a:endCxn id="8" idx="0"/>
-          </p:cNvCxnSpPr>
-          <p:nvPr/>
-        </p:nvCxnSpPr>
-        <p:spPr>
-          <a:xfrm rot="16200000" flipH="1" flipV="1">
-            <a:off x="3911884" y="1916815"/>
-            <a:ext cx="92338" cy="1870239"/>
-          </a:xfrm>
-          <a:prstGeom prst="curvedConnector3">
-            <a:avLst>
-              <a:gd name="adj1" fmla="val -247569"/>
-            </a:avLst>
-          </a:prstGeom>
-          <a:ln>
-            <a:tailEnd type="triangle"/>
-          </a:ln>
-        </p:spPr>
-        <p:style>
-          <a:lnRef idx="1">
-            <a:schemeClr val="accent1"/>
-          </a:lnRef>
-          <a:fillRef idx="0">
-            <a:schemeClr val="accent1"/>
-          </a:fillRef>
-          <a:effectRef idx="0">
-            <a:schemeClr val="accent1"/>
-          </a:effectRef>
-          <a:fontRef idx="minor">
-            <a:schemeClr val="tx1"/>
-          </a:fontRef>
-        </p:style>
-      </p:cxnSp>
       <p:sp>
         <p:nvSpPr>
           <p:cNvPr id="20" name="TextBox 19">
@@ -7783,6 +7738,51 @@
             <a:avLst>
               <a:gd name="adj1" fmla="val -2239"/>
               <a:gd name="adj2" fmla="val -414858"/>
+            </a:avLst>
+          </a:prstGeom>
+          <a:ln>
+            <a:tailEnd type="triangle"/>
+          </a:ln>
+        </p:spPr>
+        <p:style>
+          <a:lnRef idx="1">
+            <a:schemeClr val="accent1"/>
+          </a:lnRef>
+          <a:fillRef idx="0">
+            <a:schemeClr val="accent1"/>
+          </a:fillRef>
+          <a:effectRef idx="0">
+            <a:schemeClr val="accent1"/>
+          </a:effectRef>
+          <a:fontRef idx="minor">
+            <a:schemeClr val="tx1"/>
+          </a:fontRef>
+        </p:style>
+      </p:cxnSp>
+      <p:cxnSp>
+        <p:nvCxnSpPr>
+          <p:cNvPr id="60" name="Connector: Curved 59">
+            <a:extLst>
+              <a:ext uri="{FF2B5EF4-FFF2-40B4-BE49-F238E27FC236}">
+                <a16:creationId xmlns:a16="http://schemas.microsoft.com/office/drawing/2014/main" id="{CE1CA26F-BD62-49F4-8B7D-9E20C01C1A6C}"/>
+              </a:ext>
+            </a:extLst>
+          </p:cNvPr>
+          <p:cNvCxnSpPr>
+            <a:cxnSpLocks/>
+            <a:stCxn id="12" idx="1"/>
+            <a:endCxn id="4" idx="0"/>
+          </p:cNvCxnSpPr>
+          <p:nvPr/>
+        </p:nvCxnSpPr>
+        <p:spPr>
+          <a:xfrm rot="16200000" flipV="1">
+            <a:off x="2814510" y="1318341"/>
+            <a:ext cx="66866" cy="3253474"/>
+          </a:xfrm>
+          <a:prstGeom prst="curvedConnector3">
+            <a:avLst>
+              <a:gd name="adj1" fmla="val 600223"/>
             </a:avLst>
           </a:prstGeom>
           <a:ln>

</xml_diff>

<commit_message>
add info on Arduino config
</commit_message>
<xml_diff>
--- a/BuildRubberBandGunSoftware.pptx
+++ b/BuildRubberBandGunSoftware.pptx
@@ -10,9 +10,10 @@
     <p:sldId id="260" r:id="rId4"/>
     <p:sldId id="259" r:id="rId5"/>
     <p:sldId id="261" r:id="rId6"/>
+    <p:sldId id="263" r:id="rId7"/>
   </p:sldIdLst>
   <p:sldSz cx="12192000" cy="6858000"/>
-  <p:notesSz cx="6858000" cy="9144000"/>
+  <p:notesSz cx="7315200" cy="9601200"/>
   <p:defaultTextStyle>
     <a:defPPr>
       <a:defRPr lang="en-US"/>
@@ -272,7 +273,7 @@
           <a:p>
             <a:fld id="{02AC24A9-CCB6-4F8D-B8DB-C2F3692CFA5A}" type="datetimeFigureOut">
               <a:rPr lang="en-US" smtClean="0"/>
-              <a:t>2/16/2020</a:t>
+              <a:t>3/20/2020</a:t>
             </a:fld>
             <a:endParaRPr lang="en-US" dirty="0"/>
           </a:p>
@@ -642,7 +643,7 @@
           <a:p>
             <a:fld id="{02AC24A9-CCB6-4F8D-B8DB-C2F3692CFA5A}" type="datetimeFigureOut">
               <a:rPr lang="en-US" smtClean="0"/>
-              <a:t>2/16/2020</a:t>
+              <a:t>3/20/2020</a:t>
             </a:fld>
             <a:endParaRPr lang="en-US"/>
           </a:p>
@@ -851,7 +852,7 @@
           <a:p>
             <a:fld id="{02AC24A9-CCB6-4F8D-B8DB-C2F3692CFA5A}" type="datetimeFigureOut">
               <a:rPr lang="en-US" smtClean="0"/>
-              <a:t>2/16/2020</a:t>
+              <a:t>3/20/2020</a:t>
             </a:fld>
             <a:endParaRPr lang="en-US"/>
           </a:p>
@@ -1321,7 +1322,7 @@
           <a:p>
             <a:fld id="{02AC24A9-CCB6-4F8D-B8DB-C2F3692CFA5A}" type="datetimeFigureOut">
               <a:rPr lang="en-US" smtClean="0"/>
-              <a:t>2/16/2020</a:t>
+              <a:t>3/20/2020</a:t>
             </a:fld>
             <a:endParaRPr lang="en-US"/>
           </a:p>
@@ -1775,7 +1776,7 @@
           <a:p>
             <a:fld id="{02AC24A9-CCB6-4F8D-B8DB-C2F3692CFA5A}" type="datetimeFigureOut">
               <a:rPr lang="en-US" smtClean="0"/>
-              <a:t>2/16/2020</a:t>
+              <a:t>3/20/2020</a:t>
             </a:fld>
             <a:endParaRPr lang="en-US"/>
           </a:p>
@@ -2307,7 +2308,7 @@
           <a:p>
             <a:fld id="{02AC24A9-CCB6-4F8D-B8DB-C2F3692CFA5A}" type="datetimeFigureOut">
               <a:rPr lang="en-US" smtClean="0"/>
-              <a:t>2/16/2020</a:t>
+              <a:t>3/20/2020</a:t>
             </a:fld>
             <a:endParaRPr lang="en-US"/>
           </a:p>
@@ -3006,7 +3007,7 @@
           <a:p>
             <a:fld id="{02AC24A9-CCB6-4F8D-B8DB-C2F3692CFA5A}" type="datetimeFigureOut">
               <a:rPr lang="en-US" smtClean="0"/>
-              <a:t>2/16/2020</a:t>
+              <a:t>3/20/2020</a:t>
             </a:fld>
             <a:endParaRPr lang="en-US"/>
           </a:p>
@@ -3335,7 +3336,7 @@
           <a:p>
             <a:fld id="{02AC24A9-CCB6-4F8D-B8DB-C2F3692CFA5A}" type="datetimeFigureOut">
               <a:rPr lang="en-US" smtClean="0"/>
-              <a:t>2/16/2020</a:t>
+              <a:t>3/20/2020</a:t>
             </a:fld>
             <a:endParaRPr lang="en-US"/>
           </a:p>
@@ -3448,7 +3449,7 @@
           <a:p>
             <a:fld id="{02AC24A9-CCB6-4F8D-B8DB-C2F3692CFA5A}" type="datetimeFigureOut">
               <a:rPr lang="en-US" smtClean="0"/>
-              <a:t>2/16/2020</a:t>
+              <a:t>3/20/2020</a:t>
             </a:fld>
             <a:endParaRPr lang="en-US"/>
           </a:p>
@@ -3943,7 +3944,7 @@
           <a:p>
             <a:fld id="{02AC24A9-CCB6-4F8D-B8DB-C2F3692CFA5A}" type="datetimeFigureOut">
               <a:rPr lang="en-US" smtClean="0"/>
-              <a:t>2/16/2020</a:t>
+              <a:t>3/20/2020</a:t>
             </a:fld>
             <a:endParaRPr lang="en-US" dirty="0"/>
           </a:p>
@@ -4420,7 +4421,7 @@
           <a:p>
             <a:fld id="{02AC24A9-CCB6-4F8D-B8DB-C2F3692CFA5A}" type="datetimeFigureOut">
               <a:rPr lang="en-US" smtClean="0"/>
-              <a:t>2/16/2020</a:t>
+              <a:t>3/20/2020</a:t>
             </a:fld>
             <a:endParaRPr lang="en-US"/>
           </a:p>
@@ -4663,7 +4664,7 @@
           <a:p>
             <a:fld id="{02AC24A9-CCB6-4F8D-B8DB-C2F3692CFA5A}" type="datetimeFigureOut">
               <a:rPr lang="en-US" smtClean="0"/>
-              <a:t>2/16/2020</a:t>
+              <a:t>3/20/2020</a:t>
             </a:fld>
             <a:endParaRPr lang="en-US"/>
           </a:p>
@@ -10294,6 +10295,166 @@
 </p:sld>
 </file>
 
+<file path=ppt/slides/slide6.xml><?xml version="1.0" encoding="utf-8"?>
+<p:sld xmlns:a="http://schemas.openxmlformats.org/drawingml/2006/main" xmlns:r="http://schemas.openxmlformats.org/officeDocument/2006/relationships" xmlns:p="http://schemas.openxmlformats.org/presentationml/2006/main">
+  <p:cSld>
+    <p:spTree>
+      <p:nvGrpSpPr>
+        <p:cNvPr id="1" name=""/>
+        <p:cNvGrpSpPr/>
+        <p:nvPr/>
+      </p:nvGrpSpPr>
+      <p:grpSpPr>
+        <a:xfrm>
+          <a:off x="0" y="0"/>
+          <a:ext cx="0" cy="0"/>
+          <a:chOff x="0" y="0"/>
+          <a:chExt cx="0" cy="0"/>
+        </a:xfrm>
+      </p:grpSpPr>
+      <p:sp>
+        <p:nvSpPr>
+          <p:cNvPr id="2" name="Title 1">
+            <a:extLst>
+              <a:ext uri="{FF2B5EF4-FFF2-40B4-BE49-F238E27FC236}">
+                <a16:creationId xmlns:a16="http://schemas.microsoft.com/office/drawing/2014/main" id="{4E2272C3-2933-48F5-923A-A6570DEEFCCF}"/>
+              </a:ext>
+            </a:extLst>
+          </p:cNvPr>
+          <p:cNvSpPr>
+            <a:spLocks noGrp="1"/>
+          </p:cNvSpPr>
+          <p:nvPr>
+            <p:ph type="title"/>
+          </p:nvPr>
+        </p:nvSpPr>
+        <p:spPr/>
+        <p:txBody>
+          <a:bodyPr>
+            <a:normAutofit fontScale="90000"/>
+          </a:bodyPr>
+          <a:lstStyle/>
+          <a:p>
+            <a:pPr algn="ctr"/>
+            <a:r>
+              <a:rPr lang="en-US" dirty="0"/>
+              <a:t>FOOF Rubber Band Gun</a:t>
+            </a:r>
+            <a:br>
+              <a:rPr lang="en-US" dirty="0"/>
+            </a:br>
+            <a:r>
+              <a:rPr lang="en-US" dirty="0"/>
+              <a:t>Arduino Setup</a:t>
+            </a:r>
+          </a:p>
+        </p:txBody>
+      </p:sp>
+      <p:sp>
+        <p:nvSpPr>
+          <p:cNvPr id="3" name="Content Placeholder 2">
+            <a:extLst>
+              <a:ext uri="{FF2B5EF4-FFF2-40B4-BE49-F238E27FC236}">
+                <a16:creationId xmlns:a16="http://schemas.microsoft.com/office/drawing/2014/main" id="{6FA38F56-2E24-4600-B93F-FBDF438A7340}"/>
+              </a:ext>
+            </a:extLst>
+          </p:cNvPr>
+          <p:cNvSpPr>
+            <a:spLocks noGrp="1"/>
+          </p:cNvSpPr>
+          <p:nvPr>
+            <p:ph idx="1"/>
+          </p:nvPr>
+        </p:nvSpPr>
+        <p:spPr/>
+        <p:txBody>
+          <a:bodyPr/>
+          <a:lstStyle/>
+          <a:p>
+            <a:r>
+              <a:rPr lang="en-US" dirty="0"/>
+              <a:t>Board “Arduino Nano”</a:t>
+            </a:r>
+          </a:p>
+          <a:p>
+            <a:r>
+              <a:rPr lang="en-US" dirty="0"/>
+              <a:t>Processor “ATmega328P (Old Bootloader)”</a:t>
+            </a:r>
+          </a:p>
+          <a:p>
+            <a:r>
+              <a:rPr lang="en-US" dirty="0"/>
+              <a:t>Programmer “AVRISP </a:t>
+            </a:r>
+            <a:r>
+              <a:rPr lang="en-US" dirty="0" err="1"/>
+              <a:t>mkll</a:t>
+            </a:r>
+            <a:r>
+              <a:rPr lang="en-US" dirty="0"/>
+              <a:t>”</a:t>
+            </a:r>
+          </a:p>
+          <a:p>
+            <a:endParaRPr lang="en-US" dirty="0"/>
+          </a:p>
+        </p:txBody>
+      </p:sp>
+      <p:pic>
+        <p:nvPicPr>
+          <p:cNvPr id="5" name="Picture 4">
+            <a:extLst>
+              <a:ext uri="{FF2B5EF4-FFF2-40B4-BE49-F238E27FC236}">
+                <a16:creationId xmlns:a16="http://schemas.microsoft.com/office/drawing/2014/main" id="{38AD304D-7E10-4353-93E1-9CB6FB2D32BD}"/>
+              </a:ext>
+            </a:extLst>
+          </p:cNvPr>
+          <p:cNvPicPr/>
+          <p:nvPr/>
+        </p:nvPicPr>
+        <p:blipFill rotWithShape="1">
+          <a:blip r:embed="rId2" cstate="hqprint">
+            <a:extLst>
+              <a:ext uri="{28A0092B-C50C-407E-A947-70E740481C1C}">
+                <a14:useLocalDpi xmlns:a14="http://schemas.microsoft.com/office/drawing/2010/main"/>
+              </a:ext>
+            </a:extLst>
+          </a:blip>
+          <a:srcRect/>
+          <a:stretch/>
+        </p:blipFill>
+        <p:spPr bwMode="auto">
+          <a:xfrm>
+            <a:off x="3723254" y="4325112"/>
+            <a:ext cx="2089286" cy="1729064"/>
+          </a:xfrm>
+          <a:prstGeom prst="rect">
+            <a:avLst/>
+          </a:prstGeom>
+          <a:ln>
+            <a:noFill/>
+          </a:ln>
+          <a:extLst>
+            <a:ext uri="{53640926-AAD7-44D8-BBD7-CCE9431645EC}">
+              <a14:shadowObscured xmlns:a14="http://schemas.microsoft.com/office/drawing/2010/main"/>
+            </a:ext>
+          </a:extLst>
+        </p:spPr>
+      </p:pic>
+    </p:spTree>
+    <p:extLst>
+      <p:ext uri="{BB962C8B-B14F-4D97-AF65-F5344CB8AC3E}">
+        <p14:creationId xmlns:p14="http://schemas.microsoft.com/office/powerpoint/2010/main" val="1665323964"/>
+      </p:ext>
+    </p:extLst>
+  </p:cSld>
+  <p:clrMapOvr>
+    <a:masterClrMapping/>
+  </p:clrMapOvr>
+</p:sld>
+</file>
+
 <file path=ppt/theme/theme1.xml><?xml version="1.0" encoding="utf-8"?>
 <a:theme xmlns:a="http://schemas.openxmlformats.org/drawingml/2006/main" name="AccentBoxVTI">
   <a:themeElements>

</xml_diff>

<commit_message>
add start of RBG wiring
</commit_message>
<xml_diff>
--- a/BuildRubberBandGunSoftware.pptx
+++ b/BuildRubberBandGunSoftware.pptx
@@ -5,7 +5,7 @@
     <p:sldMasterId id="2147483869" r:id="rId1"/>
   </p:sldMasterIdLst>
   <p:sldIdLst>
-    <p:sldId id="256" r:id="rId2"/>
+    <p:sldId id="264" r:id="rId2"/>
     <p:sldId id="262" r:id="rId3"/>
     <p:sldId id="260" r:id="rId4"/>
     <p:sldId id="259" r:id="rId5"/>
@@ -5067,14 +5067,6 @@
 <file path=ppt/slides/slide1.xml><?xml version="1.0" encoding="utf-8"?>
 <p:sld xmlns:a="http://schemas.openxmlformats.org/drawingml/2006/main" xmlns:r="http://schemas.openxmlformats.org/officeDocument/2006/relationships" xmlns:p="http://schemas.openxmlformats.org/presentationml/2006/main">
   <p:cSld>
-    <p:bg>
-      <p:bgPr>
-        <a:solidFill>
-          <a:schemeClr val="bg1"/>
-        </a:solidFill>
-        <a:effectLst/>
-      </p:bgPr>
-    </p:bg>
     <p:spTree>
       <p:nvGrpSpPr>
         <p:cNvPr id="1" name=""/>
@@ -5089,72 +5081,12 @@
           <a:chExt cx="0" cy="0"/>
         </a:xfrm>
       </p:grpSpPr>
-      <p:sp useBgFill="1">
-        <p:nvSpPr>
-          <p:cNvPr id="26" name="Rectangle 22">
-            <a:extLst>
-              <a:ext uri="{FF2B5EF4-FFF2-40B4-BE49-F238E27FC236}">
-                <a16:creationId xmlns:a16="http://schemas.microsoft.com/office/drawing/2014/main" id="{5A59F003-E00A-43F9-91DC-CC54E3B87466}"/>
-              </a:ext>
-              <a:ext uri="{C183D7F6-B498-43B3-948B-1728B52AA6E4}">
-                <adec:decorative xmlns:adec="http://schemas.microsoft.com/office/drawing/2017/decorative" val="1"/>
-              </a:ext>
-            </a:extLst>
-          </p:cNvPr>
-          <p:cNvSpPr>
-            <a:spLocks noGrp="1" noRot="1" noChangeAspect="1" noMove="1" noResize="1" noEditPoints="1" noAdjustHandles="1" noChangeArrowheads="1" noChangeShapeType="1" noTextEdit="1"/>
-          </p:cNvSpPr>
-          <p:nvPr>
-            <p:extLst>
-              <p:ext uri="{386F3935-93C4-4BCD-93E2-E3B085C9AB24}">
-                <p16:designElem xmlns:p16="http://schemas.microsoft.com/office/powerpoint/2015/main" val="1"/>
-              </p:ext>
-            </p:extLst>
-          </p:nvPr>
-        </p:nvSpPr>
-        <p:spPr>
-          <a:xfrm>
-            <a:off x="0" y="0"/>
-            <a:ext cx="12192000" cy="6858000"/>
-          </a:xfrm>
-          <a:prstGeom prst="rect">
-            <a:avLst/>
-          </a:prstGeom>
-          <a:ln>
-            <a:noFill/>
-          </a:ln>
-        </p:spPr>
-        <p:style>
-          <a:lnRef idx="2">
-            <a:schemeClr val="accent1">
-              <a:shade val="50000"/>
-            </a:schemeClr>
-          </a:lnRef>
-          <a:fillRef idx="1">
-            <a:schemeClr val="accent1"/>
-          </a:fillRef>
-          <a:effectRef idx="0">
-            <a:schemeClr val="accent1"/>
-          </a:effectRef>
-          <a:fontRef idx="minor">
-            <a:schemeClr val="lt1"/>
-          </a:fontRef>
-        </p:style>
-        <p:txBody>
-          <a:bodyPr rtlCol="0" anchor="ctr"/>
-          <a:lstStyle/>
-          <a:p>
-            <a:pPr algn="ctr"/>
-            <a:endParaRPr lang="en-US"/>
-          </a:p>
-        </p:txBody>
-      </p:sp>
       <p:pic>
         <p:nvPicPr>
           <p:cNvPr id="4" name="Picture 3">
             <a:extLst>
               <a:ext uri="{FF2B5EF4-FFF2-40B4-BE49-F238E27FC236}">
-                <a16:creationId xmlns:a16="http://schemas.microsoft.com/office/drawing/2014/main" id="{7FBD4499-D17A-4717-B0FF-165071491AE9}"/>
+                <a16:creationId xmlns:a16="http://schemas.microsoft.com/office/drawing/2014/main" id="{B638B0B8-D3AD-4CAE-B1E2-958B2740BB91}"/>
               </a:ext>
             </a:extLst>
           </p:cNvPr>
@@ -5165,13 +5097,13 @@
         </p:nvPicPr>
         <p:blipFill rotWithShape="1">
           <a:blip r:embed="rId2"/>
-          <a:srcRect t="23391" r="9091"/>
+          <a:srcRect/>
           <a:stretch/>
         </p:blipFill>
         <p:spPr>
           <a:xfrm>
-            <a:off x="20" y="10"/>
-            <a:ext cx="12191981" cy="6857990"/>
+            <a:off x="-2" y="-1"/>
+            <a:ext cx="12192001" cy="6858000"/>
           </a:xfrm>
           <a:prstGeom prst="rect">
             <a:avLst/>
@@ -5180,95 +5112,10 @@
       </p:pic>
       <p:sp>
         <p:nvSpPr>
-          <p:cNvPr id="25" name="Rectangle 24">
-            <a:extLst>
-              <a:ext uri="{FF2B5EF4-FFF2-40B4-BE49-F238E27FC236}">
-                <a16:creationId xmlns:a16="http://schemas.microsoft.com/office/drawing/2014/main" id="{D74A4382-E3AD-430A-9A1F-DFA3E0E77A7D}"/>
-              </a:ext>
-              <a:ext uri="{C183D7F6-B498-43B3-948B-1728B52AA6E4}">
-                <adec:decorative xmlns:adec="http://schemas.microsoft.com/office/drawing/2017/decorative" val="1"/>
-              </a:ext>
-            </a:extLst>
-          </p:cNvPr>
-          <p:cNvSpPr>
-            <a:spLocks noGrp="1" noRot="1" noChangeAspect="1" noMove="1" noResize="1" noEditPoints="1" noAdjustHandles="1" noChangeArrowheads="1" noChangeShapeType="1" noTextEdit="1"/>
-          </p:cNvSpPr>
-          <p:nvPr>
-            <p:extLst>
-              <p:ext uri="{386F3935-93C4-4BCD-93E2-E3B085C9AB24}">
-                <p16:designElem xmlns:p16="http://schemas.microsoft.com/office/powerpoint/2015/main" val="1"/>
-              </p:ext>
-            </p:extLst>
-          </p:nvPr>
-        </p:nvSpPr>
-        <p:spPr>
-          <a:xfrm rot="16200000">
-            <a:off x="3799868" y="-1534136"/>
-            <a:ext cx="4592270" cy="12192001"/>
-          </a:xfrm>
-          <a:prstGeom prst="rect">
-            <a:avLst/>
-          </a:prstGeom>
-          <a:gradFill>
-            <a:gsLst>
-              <a:gs pos="35000">
-                <a:schemeClr val="bg1">
-                  <a:alpha val="46000"/>
-                </a:schemeClr>
-              </a:gs>
-              <a:gs pos="21000">
-                <a:schemeClr val="bg1">
-                  <a:alpha val="30000"/>
-                </a:schemeClr>
-              </a:gs>
-              <a:gs pos="0">
-                <a:schemeClr val="bg1">
-                  <a:alpha val="0"/>
-                </a:schemeClr>
-              </a:gs>
-              <a:gs pos="100000">
-                <a:schemeClr val="bg1">
-                  <a:alpha val="90000"/>
-                </a:schemeClr>
-              </a:gs>
-            </a:gsLst>
-            <a:lin ang="10800000" scaled="0"/>
-          </a:gradFill>
-          <a:ln>
-            <a:noFill/>
-          </a:ln>
-        </p:spPr>
-        <p:style>
-          <a:lnRef idx="2">
-            <a:schemeClr val="accent1">
-              <a:shade val="50000"/>
-            </a:schemeClr>
-          </a:lnRef>
-          <a:fillRef idx="1">
-            <a:schemeClr val="accent1"/>
-          </a:fillRef>
-          <a:effectRef idx="0">
-            <a:schemeClr val="accent1"/>
-          </a:effectRef>
-          <a:fontRef idx="minor">
-            <a:schemeClr val="lt1"/>
-          </a:fontRef>
-        </p:style>
-        <p:txBody>
-          <a:bodyPr rtlCol="0" anchor="ctr"/>
-          <a:lstStyle/>
-          <a:p>
-            <a:pPr algn="ctr"/>
-            <a:endParaRPr lang="en-US" dirty="0"/>
-          </a:p>
-        </p:txBody>
-      </p:sp>
-      <p:sp>
-        <p:nvSpPr>
           <p:cNvPr id="2" name="Title 1">
             <a:extLst>
               <a:ext uri="{FF2B5EF4-FFF2-40B4-BE49-F238E27FC236}">
-                <a16:creationId xmlns:a16="http://schemas.microsoft.com/office/drawing/2014/main" id="{D03A4BF4-BA31-483C-B00D-6EC9B586A2EC}"/>
+                <a16:creationId xmlns:a16="http://schemas.microsoft.com/office/drawing/2014/main" id="{42C7D547-B15E-4841-A32C-0CC6B990528E}"/>
               </a:ext>
             </a:extLst>
           </p:cNvPr>
@@ -5281,90 +5128,27 @@
         </p:nvSpPr>
         <p:spPr>
           <a:xfrm>
-            <a:off x="404553" y="3091928"/>
-            <a:ext cx="11639596" cy="2387600"/>
-          </a:xfrm>
-        </p:spPr>
-        <p:txBody>
-          <a:bodyPr>
+            <a:off x="856209" y="718010"/>
+            <a:ext cx="5472401" cy="1185353"/>
+          </a:xfrm>
+        </p:spPr>
+        <p:txBody>
+          <a:bodyPr anchor="ctr">
             <a:normAutofit/>
           </a:bodyPr>
           <a:lstStyle/>
           <a:p>
             <a:r>
-              <a:rPr lang="en-US" sz="5100" dirty="0"/>
+              <a:rPr lang="en-US" sz="2600" dirty="0">
+                <a:solidFill>
+                  <a:schemeClr val="accent4">
+                    <a:lumMod val="75000"/>
+                  </a:schemeClr>
+                </a:solidFill>
+              </a:rPr>
               <a:t>Build FOOF Rubber Band Gun SW</a:t>
             </a:r>
           </a:p>
-          <a:p>
-            <a:pPr algn="l"/>
-            <a:endParaRPr lang="en-US" sz="4000" dirty="0"/>
-          </a:p>
-        </p:txBody>
-      </p:sp>
-      <p:sp>
-        <p:nvSpPr>
-          <p:cNvPr id="27" name="Rectangle: Rounded Corners 26">
-            <a:extLst>
-              <a:ext uri="{FF2B5EF4-FFF2-40B4-BE49-F238E27FC236}">
-                <a16:creationId xmlns:a16="http://schemas.microsoft.com/office/drawing/2014/main" id="{79F40191-0F44-4FD1-82CC-ACB507C14BE6}"/>
-              </a:ext>
-              <a:ext uri="{C183D7F6-B498-43B3-948B-1728B52AA6E4}">
-                <adec:decorative xmlns:adec="http://schemas.microsoft.com/office/drawing/2017/decorative" val="1"/>
-              </a:ext>
-            </a:extLst>
-          </p:cNvPr>
-          <p:cNvSpPr>
-            <a:spLocks noGrp="1" noRot="1" noChangeAspect="1" noMove="1" noResize="1" noEditPoints="1" noAdjustHandles="1" noChangeArrowheads="1" noChangeShapeType="1" noTextEdit="1"/>
-          </p:cNvSpPr>
-          <p:nvPr>
-            <p:extLst>
-              <p:ext uri="{386F3935-93C4-4BCD-93E2-E3B085C9AB24}">
-                <p16:designElem xmlns:p16="http://schemas.microsoft.com/office/powerpoint/2015/main" val="1"/>
-              </p:ext>
-            </p:extLst>
-          </p:nvPr>
-        </p:nvSpPr>
-        <p:spPr>
-          <a:xfrm>
-            <a:off x="0" y="5575039"/>
-            <a:ext cx="9785897" cy="685800"/>
-          </a:xfrm>
-          <a:prstGeom prst="roundRect">
-            <a:avLst>
-              <a:gd name="adj" fmla="val 0"/>
-            </a:avLst>
-          </a:prstGeom>
-          <a:solidFill>
-            <a:schemeClr val="accent1"/>
-          </a:solidFill>
-          <a:ln>
-            <a:noFill/>
-          </a:ln>
-        </p:spPr>
-        <p:style>
-          <a:lnRef idx="2">
-            <a:schemeClr val="accent1">
-              <a:shade val="50000"/>
-            </a:schemeClr>
-          </a:lnRef>
-          <a:fillRef idx="1">
-            <a:schemeClr val="accent1"/>
-          </a:fillRef>
-          <a:effectRef idx="0">
-            <a:schemeClr val="accent1"/>
-          </a:effectRef>
-          <a:fontRef idx="minor">
-            <a:schemeClr val="lt1"/>
-          </a:fontRef>
-        </p:style>
-        <p:txBody>
-          <a:bodyPr rtlCol="0" anchor="ctr"/>
-          <a:lstStyle/>
-          <a:p>
-            <a:pPr algn="ctr"/>
-            <a:endParaRPr lang="en-US"/>
-          </a:p>
         </p:txBody>
       </p:sp>
       <p:sp>
@@ -5372,7 +5156,7 @@
           <p:cNvPr id="3" name="Subtitle 2">
             <a:extLst>
               <a:ext uri="{FF2B5EF4-FFF2-40B4-BE49-F238E27FC236}">
-                <a16:creationId xmlns:a16="http://schemas.microsoft.com/office/drawing/2014/main" id="{20B9CBDC-360A-4AF7-A5F7-99311DA83177}"/>
+                <a16:creationId xmlns:a16="http://schemas.microsoft.com/office/drawing/2014/main" id="{58D4F969-9835-44EF-9222-43883CE01C87}"/>
               </a:ext>
             </a:extLst>
           </p:cNvPr>
@@ -5385,8 +5169,8 @@
         </p:nvSpPr>
         <p:spPr>
           <a:xfrm>
-            <a:off x="404553" y="5624945"/>
-            <a:ext cx="9078562" cy="592975"/>
+            <a:off x="3867357" y="2131719"/>
+            <a:ext cx="2228641" cy="1185353"/>
           </a:xfrm>
         </p:spPr>
         <p:txBody>
@@ -5395,21 +5179,15 @@
           </a:bodyPr>
           <a:lstStyle/>
           <a:p>
-            <a:pPr>
-              <a:lnSpc>
-                <a:spcPct val="100000"/>
-              </a:lnSpc>
-            </a:pPr>
-            <a:endParaRPr lang="en-US" sz="1100" dirty="0"/>
-          </a:p>
-          <a:p>
-            <a:pPr>
-              <a:lnSpc>
-                <a:spcPct val="100000"/>
-              </a:lnSpc>
-            </a:pPr>
-            <a:r>
-              <a:rPr lang="en-US" sz="1100" dirty="0"/>
+            <a:pPr algn="r"/>
+            <a:r>
+              <a:rPr lang="en-US" sz="1700" dirty="0">
+                <a:solidFill>
+                  <a:schemeClr val="accent4">
+                    <a:lumMod val="75000"/>
+                  </a:schemeClr>
+                </a:solidFill>
+              </a:rPr>
               <a:t>… the AWESOME</a:t>
             </a:r>
           </a:p>
@@ -5417,10 +5195,10 @@
       </p:sp>
       <p:pic>
         <p:nvPicPr>
-          <p:cNvPr id="6" name="Picture 5">
-            <a:extLst>
-              <a:ext uri="{FF2B5EF4-FFF2-40B4-BE49-F238E27FC236}">
-                <a16:creationId xmlns:a16="http://schemas.microsoft.com/office/drawing/2014/main" id="{8E66F70C-7E42-4613-9195-A954A8C3645A}"/>
+          <p:cNvPr id="10" name="Picture 9">
+            <a:extLst>
+              <a:ext uri="{FF2B5EF4-FFF2-40B4-BE49-F238E27FC236}">
+                <a16:creationId xmlns:a16="http://schemas.microsoft.com/office/drawing/2014/main" id="{5DB1EF4A-0534-4D1E-B1A2-6966B8603D63}"/>
               </a:ext>
             </a:extLst>
           </p:cNvPr>
@@ -5453,12 +5231,12 @@
     </p:spTree>
     <p:extLst>
       <p:ext uri="{BB962C8B-B14F-4D97-AF65-F5344CB8AC3E}">
-        <p14:creationId xmlns:p14="http://schemas.microsoft.com/office/powerpoint/2010/main" val="2732671539"/>
+        <p14:creationId xmlns:p14="http://schemas.microsoft.com/office/powerpoint/2010/main" val="435835124"/>
       </p:ext>
     </p:extLst>
   </p:cSld>
   <p:clrMapOvr>
-    <a:overrideClrMapping bg1="dk1" tx1="lt1" bg2="dk2" tx2="lt2" accent1="accent1" accent2="accent2" accent3="accent3" accent4="accent4" accent5="accent5" accent6="accent6" hlink="hlink" folHlink="folHlink"/>
+    <a:masterClrMapping/>
   </p:clrMapOvr>
 </p:sld>
 </file>

</xml_diff>

<commit_message>
some documentation for the Programming Arduino
</commit_message>
<xml_diff>
--- a/BuildRubberBandGunSoftware.pptx
+++ b/BuildRubberBandGunSoftware.pptx
@@ -11,6 +11,7 @@
     <p:sldId id="259" r:id="rId5"/>
     <p:sldId id="261" r:id="rId6"/>
     <p:sldId id="263" r:id="rId7"/>
+    <p:sldId id="265" r:id="rId8"/>
   </p:sldIdLst>
   <p:sldSz cx="12192000" cy="6858000"/>
   <p:notesSz cx="7315200" cy="9601200"/>
@@ -273,7 +274,7 @@
           <a:p>
             <a:fld id="{02AC24A9-CCB6-4F8D-B8DB-C2F3692CFA5A}" type="datetimeFigureOut">
               <a:rPr lang="en-US" smtClean="0"/>
-              <a:t>3/22/2020</a:t>
+              <a:t>9/10/2020</a:t>
             </a:fld>
             <a:endParaRPr lang="en-US" dirty="0"/>
           </a:p>
@@ -643,7 +644,7 @@
           <a:p>
             <a:fld id="{02AC24A9-CCB6-4F8D-B8DB-C2F3692CFA5A}" type="datetimeFigureOut">
               <a:rPr lang="en-US" smtClean="0"/>
-              <a:t>3/22/2020</a:t>
+              <a:t>9/10/2020</a:t>
             </a:fld>
             <a:endParaRPr lang="en-US"/>
           </a:p>
@@ -852,7 +853,7 @@
           <a:p>
             <a:fld id="{02AC24A9-CCB6-4F8D-B8DB-C2F3692CFA5A}" type="datetimeFigureOut">
               <a:rPr lang="en-US" smtClean="0"/>
-              <a:t>3/22/2020</a:t>
+              <a:t>9/10/2020</a:t>
             </a:fld>
             <a:endParaRPr lang="en-US"/>
           </a:p>
@@ -1322,7 +1323,7 @@
           <a:p>
             <a:fld id="{02AC24A9-CCB6-4F8D-B8DB-C2F3692CFA5A}" type="datetimeFigureOut">
               <a:rPr lang="en-US" smtClean="0"/>
-              <a:t>3/22/2020</a:t>
+              <a:t>9/10/2020</a:t>
             </a:fld>
             <a:endParaRPr lang="en-US"/>
           </a:p>
@@ -1776,7 +1777,7 @@
           <a:p>
             <a:fld id="{02AC24A9-CCB6-4F8D-B8DB-C2F3692CFA5A}" type="datetimeFigureOut">
               <a:rPr lang="en-US" smtClean="0"/>
-              <a:t>3/22/2020</a:t>
+              <a:t>9/10/2020</a:t>
             </a:fld>
             <a:endParaRPr lang="en-US"/>
           </a:p>
@@ -2308,7 +2309,7 @@
           <a:p>
             <a:fld id="{02AC24A9-CCB6-4F8D-B8DB-C2F3692CFA5A}" type="datetimeFigureOut">
               <a:rPr lang="en-US" smtClean="0"/>
-              <a:t>3/22/2020</a:t>
+              <a:t>9/10/2020</a:t>
             </a:fld>
             <a:endParaRPr lang="en-US"/>
           </a:p>
@@ -3007,7 +3008,7 @@
           <a:p>
             <a:fld id="{02AC24A9-CCB6-4F8D-B8DB-C2F3692CFA5A}" type="datetimeFigureOut">
               <a:rPr lang="en-US" smtClean="0"/>
-              <a:t>3/22/2020</a:t>
+              <a:t>9/10/2020</a:t>
             </a:fld>
             <a:endParaRPr lang="en-US"/>
           </a:p>
@@ -3336,7 +3337,7 @@
           <a:p>
             <a:fld id="{02AC24A9-CCB6-4F8D-B8DB-C2F3692CFA5A}" type="datetimeFigureOut">
               <a:rPr lang="en-US" smtClean="0"/>
-              <a:t>3/22/2020</a:t>
+              <a:t>9/10/2020</a:t>
             </a:fld>
             <a:endParaRPr lang="en-US"/>
           </a:p>
@@ -3449,7 +3450,7 @@
           <a:p>
             <a:fld id="{02AC24A9-CCB6-4F8D-B8DB-C2F3692CFA5A}" type="datetimeFigureOut">
               <a:rPr lang="en-US" smtClean="0"/>
-              <a:t>3/22/2020</a:t>
+              <a:t>9/10/2020</a:t>
             </a:fld>
             <a:endParaRPr lang="en-US"/>
           </a:p>
@@ -3944,7 +3945,7 @@
           <a:p>
             <a:fld id="{02AC24A9-CCB6-4F8D-B8DB-C2F3692CFA5A}" type="datetimeFigureOut">
               <a:rPr lang="en-US" smtClean="0"/>
-              <a:t>3/22/2020</a:t>
+              <a:t>9/10/2020</a:t>
             </a:fld>
             <a:endParaRPr lang="en-US" dirty="0"/>
           </a:p>
@@ -4421,7 +4422,7 @@
           <a:p>
             <a:fld id="{02AC24A9-CCB6-4F8D-B8DB-C2F3692CFA5A}" type="datetimeFigureOut">
               <a:rPr lang="en-US" smtClean="0"/>
-              <a:t>3/22/2020</a:t>
+              <a:t>9/10/2020</a:t>
             </a:fld>
             <a:endParaRPr lang="en-US"/>
           </a:p>
@@ -4664,7 +4665,7 @@
           <a:p>
             <a:fld id="{02AC24A9-CCB6-4F8D-B8DB-C2F3692CFA5A}" type="datetimeFigureOut">
               <a:rPr lang="en-US" smtClean="0"/>
-              <a:t>3/22/2020</a:t>
+              <a:t>9/10/2020</a:t>
             </a:fld>
             <a:endParaRPr lang="en-US"/>
           </a:p>
@@ -5129,7 +5130,7 @@
         <p:spPr>
           <a:xfrm>
             <a:off x="856209" y="718010"/>
-            <a:ext cx="5472401" cy="1185353"/>
+            <a:ext cx="8293807" cy="1185353"/>
           </a:xfrm>
         </p:spPr>
         <p:txBody>
@@ -5147,6 +5148,19 @@
                 </a:solidFill>
               </a:rPr>
               <a:t>Build FOOF Rubber Band Gun SW</a:t>
+            </a:r>
+            <a:br>
+              <a:rPr lang="en-US" sz="2600" dirty="0">
+                <a:solidFill>
+                  <a:schemeClr val="accent4">
+                    <a:lumMod val="75000"/>
+                  </a:schemeClr>
+                </a:solidFill>
+              </a:rPr>
+            </a:br>
+            <a:r>
+              <a:rPr lang="en-US" sz="2000" dirty="0"/>
+              <a:t>https://github.com/Mark-MDO47/RubberBandGun</a:t>
             </a:r>
           </a:p>
         </p:txBody>
@@ -10224,6 +10238,2058 @@
     <p:extLst>
       <p:ext uri="{BB962C8B-B14F-4D97-AF65-F5344CB8AC3E}">
         <p14:creationId xmlns:p14="http://schemas.microsoft.com/office/powerpoint/2010/main" val="1665323964"/>
+      </p:ext>
+    </p:extLst>
+  </p:cSld>
+  <p:clrMapOvr>
+    <a:masterClrMapping/>
+  </p:clrMapOvr>
+</p:sld>
+</file>
+
+<file path=ppt/slides/slide7.xml><?xml version="1.0" encoding="utf-8"?>
+<p:sld xmlns:a="http://schemas.openxmlformats.org/drawingml/2006/main" xmlns:r="http://schemas.openxmlformats.org/officeDocument/2006/relationships" xmlns:p="http://schemas.openxmlformats.org/presentationml/2006/main">
+  <p:cSld>
+    <p:spTree>
+      <p:nvGrpSpPr>
+        <p:cNvPr id="1" name=""/>
+        <p:cNvGrpSpPr/>
+        <p:nvPr/>
+      </p:nvGrpSpPr>
+      <p:grpSpPr>
+        <a:xfrm>
+          <a:off x="0" y="0"/>
+          <a:ext cx="0" cy="0"/>
+          <a:chOff x="0" y="0"/>
+          <a:chExt cx="0" cy="0"/>
+        </a:xfrm>
+      </p:grpSpPr>
+      <p:sp>
+        <p:nvSpPr>
+          <p:cNvPr id="2" name="Title 1">
+            <a:extLst>
+              <a:ext uri="{FF2B5EF4-FFF2-40B4-BE49-F238E27FC236}">
+                <a16:creationId xmlns:a16="http://schemas.microsoft.com/office/drawing/2014/main" id="{4E2272C3-2933-48F5-923A-A6570DEEFCCF}"/>
+              </a:ext>
+            </a:extLst>
+          </p:cNvPr>
+          <p:cNvSpPr>
+            <a:spLocks noGrp="1"/>
+          </p:cNvSpPr>
+          <p:nvPr>
+            <p:ph type="title"/>
+          </p:nvPr>
+        </p:nvSpPr>
+        <p:spPr/>
+        <p:txBody>
+          <a:bodyPr>
+            <a:normAutofit fontScale="90000"/>
+          </a:bodyPr>
+          <a:lstStyle/>
+          <a:p>
+            <a:pPr algn="ctr"/>
+            <a:r>
+              <a:rPr lang="en-US" dirty="0"/>
+              <a:t>FOOF Rubber Band Gun</a:t>
+            </a:r>
+            <a:br>
+              <a:rPr lang="en-US" dirty="0"/>
+            </a:br>
+            <a:r>
+              <a:rPr lang="en-US" dirty="0"/>
+              <a:t>Programming Arduino for Bluetooth</a:t>
+            </a:r>
+          </a:p>
+        </p:txBody>
+      </p:sp>
+      <p:sp>
+        <p:nvSpPr>
+          <p:cNvPr id="3" name="Content Placeholder 2">
+            <a:extLst>
+              <a:ext uri="{FF2B5EF4-FFF2-40B4-BE49-F238E27FC236}">
+                <a16:creationId xmlns:a16="http://schemas.microsoft.com/office/drawing/2014/main" id="{6FA38F56-2E24-4600-B93F-FBDF438A7340}"/>
+              </a:ext>
+            </a:extLst>
+          </p:cNvPr>
+          <p:cNvSpPr>
+            <a:spLocks noGrp="1"/>
+          </p:cNvSpPr>
+          <p:nvPr>
+            <p:ph idx="1"/>
+          </p:nvPr>
+        </p:nvSpPr>
+        <p:spPr>
+          <a:xfrm>
+            <a:off x="522475" y="3643522"/>
+            <a:ext cx="4037102" cy="1311145"/>
+          </a:xfrm>
+        </p:spPr>
+        <p:txBody>
+          <a:bodyPr>
+            <a:normAutofit/>
+          </a:bodyPr>
+          <a:lstStyle/>
+          <a:p>
+            <a:pPr marL="0" indent="0">
+              <a:buNone/>
+            </a:pPr>
+            <a:r>
+              <a:rPr lang="en-US" sz="1200" dirty="0"/>
+              <a:t>Connections to program the KCX-BT-EMITTER</a:t>
+            </a:r>
+          </a:p>
+          <a:p>
+            <a:r>
+              <a:rPr lang="en-US" sz="1000" dirty="0"/>
+              <a:t>See RubberBandGun_wiring.pdf</a:t>
+            </a:r>
+          </a:p>
+          <a:p>
+            <a:r>
+              <a:rPr lang="en-US" sz="1000" dirty="0"/>
+              <a:t>See ProgrammingArduino_SerialMonitor_SampleOutput.pdf</a:t>
+            </a:r>
+          </a:p>
+          <a:p>
+            <a:r>
+              <a:rPr lang="en-US" sz="1000" dirty="0"/>
+              <a:t>See </a:t>
+            </a:r>
+            <a:r>
+              <a:rPr lang="en-US" sz="1000" dirty="0" err="1"/>
+              <a:t>ProgrammingArduino.ino</a:t>
+            </a:r>
+            <a:endParaRPr lang="en-US" sz="1000" dirty="0"/>
+          </a:p>
+        </p:txBody>
+      </p:sp>
+      <p:sp>
+        <p:nvSpPr>
+          <p:cNvPr id="6" name="Rectangle 5">
+            <a:extLst>
+              <a:ext uri="{FF2B5EF4-FFF2-40B4-BE49-F238E27FC236}">
+                <a16:creationId xmlns:a16="http://schemas.microsoft.com/office/drawing/2014/main" id="{235F5C12-ADF8-4B05-8E93-AEC36CE91A1A}"/>
+              </a:ext>
+            </a:extLst>
+          </p:cNvPr>
+          <p:cNvSpPr/>
+          <p:nvPr/>
+        </p:nvSpPr>
+        <p:spPr>
+          <a:xfrm>
+            <a:off x="4722395" y="2267953"/>
+            <a:ext cx="6491234" cy="4120813"/>
+          </a:xfrm>
+          <a:prstGeom prst="rect">
+            <a:avLst/>
+          </a:prstGeom>
+          <a:solidFill>
+            <a:schemeClr val="accent3">
+              <a:lumMod val="40000"/>
+              <a:lumOff val="60000"/>
+            </a:schemeClr>
+          </a:solidFill>
+        </p:spPr>
+        <p:style>
+          <a:lnRef idx="2">
+            <a:schemeClr val="accent1">
+              <a:shade val="50000"/>
+            </a:schemeClr>
+          </a:lnRef>
+          <a:fillRef idx="1">
+            <a:schemeClr val="accent1"/>
+          </a:fillRef>
+          <a:effectRef idx="0">
+            <a:schemeClr val="accent1"/>
+          </a:effectRef>
+          <a:fontRef idx="minor">
+            <a:schemeClr val="lt1"/>
+          </a:fontRef>
+        </p:style>
+        <p:txBody>
+          <a:bodyPr rtlCol="0" anchor="ctr"/>
+          <a:lstStyle/>
+          <a:p>
+            <a:pPr algn="ctr"/>
+            <a:endParaRPr lang="en-US" dirty="0"/>
+          </a:p>
+        </p:txBody>
+      </p:sp>
+      <p:grpSp>
+        <p:nvGrpSpPr>
+          <p:cNvPr id="7" name="Group 6">
+            <a:extLst>
+              <a:ext uri="{FF2B5EF4-FFF2-40B4-BE49-F238E27FC236}">
+                <a16:creationId xmlns:a16="http://schemas.microsoft.com/office/drawing/2014/main" id="{FDD38489-A34F-4ACA-BE82-DC274CB73572}"/>
+              </a:ext>
+            </a:extLst>
+          </p:cNvPr>
+          <p:cNvGrpSpPr/>
+          <p:nvPr/>
+        </p:nvGrpSpPr>
+        <p:grpSpPr>
+          <a:xfrm>
+            <a:off x="7956975" y="2447340"/>
+            <a:ext cx="3054773" cy="3799838"/>
+            <a:chOff x="1009227" y="2409240"/>
+            <a:chExt cx="3054773" cy="3799838"/>
+          </a:xfrm>
+        </p:grpSpPr>
+        <p:grpSp>
+          <p:nvGrpSpPr>
+            <p:cNvPr id="8" name="Group 7">
+              <a:extLst>
+                <a:ext uri="{FF2B5EF4-FFF2-40B4-BE49-F238E27FC236}">
+                  <a16:creationId xmlns:a16="http://schemas.microsoft.com/office/drawing/2014/main" id="{6AA0749C-E01A-4583-B163-FA92E15AFD17}"/>
+                </a:ext>
+              </a:extLst>
+            </p:cNvPr>
+            <p:cNvGrpSpPr/>
+            <p:nvPr/>
+          </p:nvGrpSpPr>
+          <p:grpSpPr>
+            <a:xfrm>
+              <a:off x="1009227" y="2409240"/>
+              <a:ext cx="3054773" cy="3799838"/>
+              <a:chOff x="1009227" y="2404535"/>
+              <a:chExt cx="3054773" cy="3799838"/>
+            </a:xfrm>
+          </p:grpSpPr>
+          <p:cxnSp>
+            <p:nvCxnSpPr>
+              <p:cNvPr id="17" name="Straight Connector 16">
+                <a:extLst>
+                  <a:ext uri="{FF2B5EF4-FFF2-40B4-BE49-F238E27FC236}">
+                    <a16:creationId xmlns:a16="http://schemas.microsoft.com/office/drawing/2014/main" id="{FB6E9B18-5C12-4524-9B5A-7338D2871FFA}"/>
+                  </a:ext>
+                </a:extLst>
+              </p:cNvPr>
+              <p:cNvCxnSpPr/>
+              <p:nvPr/>
+            </p:nvCxnSpPr>
+            <p:spPr>
+              <a:xfrm>
+                <a:off x="1009227" y="2411307"/>
+                <a:ext cx="2160693" cy="0"/>
+              </a:xfrm>
+              <a:prstGeom prst="line">
+                <a:avLst/>
+              </a:prstGeom>
+              <a:ln/>
+            </p:spPr>
+            <p:style>
+              <a:lnRef idx="3">
+                <a:schemeClr val="dk1"/>
+              </a:lnRef>
+              <a:fillRef idx="0">
+                <a:schemeClr val="dk1"/>
+              </a:fillRef>
+              <a:effectRef idx="2">
+                <a:schemeClr val="dk1"/>
+              </a:effectRef>
+              <a:fontRef idx="minor">
+                <a:schemeClr val="tx1"/>
+              </a:fontRef>
+            </p:style>
+          </p:cxnSp>
+          <p:cxnSp>
+            <p:nvCxnSpPr>
+              <p:cNvPr id="18" name="Straight Connector 17">
+                <a:extLst>
+                  <a:ext uri="{FF2B5EF4-FFF2-40B4-BE49-F238E27FC236}">
+                    <a16:creationId xmlns:a16="http://schemas.microsoft.com/office/drawing/2014/main" id="{AD3CCD17-FC9F-4E55-8EE8-3153FCBD427F}"/>
+                  </a:ext>
+                </a:extLst>
+              </p:cNvPr>
+              <p:cNvCxnSpPr/>
+              <p:nvPr/>
+            </p:nvCxnSpPr>
+            <p:spPr>
+              <a:xfrm>
+                <a:off x="3156373" y="2418080"/>
+                <a:ext cx="0" cy="765387"/>
+              </a:xfrm>
+              <a:prstGeom prst="line">
+                <a:avLst/>
+              </a:prstGeom>
+              <a:ln/>
+            </p:spPr>
+            <p:style>
+              <a:lnRef idx="3">
+                <a:schemeClr val="dk1"/>
+              </a:lnRef>
+              <a:fillRef idx="0">
+                <a:schemeClr val="dk1"/>
+              </a:fillRef>
+              <a:effectRef idx="2">
+                <a:schemeClr val="dk1"/>
+              </a:effectRef>
+              <a:fontRef idx="minor">
+                <a:schemeClr val="tx1"/>
+              </a:fontRef>
+            </p:style>
+          </p:cxnSp>
+          <p:cxnSp>
+            <p:nvCxnSpPr>
+              <p:cNvPr id="19" name="Straight Connector 18">
+                <a:extLst>
+                  <a:ext uri="{FF2B5EF4-FFF2-40B4-BE49-F238E27FC236}">
+                    <a16:creationId xmlns:a16="http://schemas.microsoft.com/office/drawing/2014/main" id="{EAABA448-5997-47B2-B5E8-40B9E042408D}"/>
+                  </a:ext>
+                </a:extLst>
+              </p:cNvPr>
+              <p:cNvCxnSpPr/>
+              <p:nvPr/>
+            </p:nvCxnSpPr>
+            <p:spPr>
+              <a:xfrm>
+                <a:off x="3169920" y="3183467"/>
+                <a:ext cx="894080" cy="3020906"/>
+              </a:xfrm>
+              <a:prstGeom prst="line">
+                <a:avLst/>
+              </a:prstGeom>
+              <a:ln/>
+            </p:spPr>
+            <p:style>
+              <a:lnRef idx="3">
+                <a:schemeClr val="dk1"/>
+              </a:lnRef>
+              <a:fillRef idx="0">
+                <a:schemeClr val="dk1"/>
+              </a:fillRef>
+              <a:effectRef idx="2">
+                <a:schemeClr val="dk1"/>
+              </a:effectRef>
+              <a:fontRef idx="minor">
+                <a:schemeClr val="tx1"/>
+              </a:fontRef>
+            </p:style>
+          </p:cxnSp>
+          <p:cxnSp>
+            <p:nvCxnSpPr>
+              <p:cNvPr id="20" name="Straight Connector 19">
+                <a:extLst>
+                  <a:ext uri="{FF2B5EF4-FFF2-40B4-BE49-F238E27FC236}">
+                    <a16:creationId xmlns:a16="http://schemas.microsoft.com/office/drawing/2014/main" id="{CAE3830A-B487-4B2A-9459-E8B04E665EBD}"/>
+                  </a:ext>
+                </a:extLst>
+              </p:cNvPr>
+              <p:cNvCxnSpPr/>
+              <p:nvPr/>
+            </p:nvCxnSpPr>
+            <p:spPr>
+              <a:xfrm flipH="1">
+                <a:off x="2465493" y="6204372"/>
+                <a:ext cx="1598506" cy="0"/>
+              </a:xfrm>
+              <a:prstGeom prst="line">
+                <a:avLst/>
+              </a:prstGeom>
+              <a:ln/>
+            </p:spPr>
+            <p:style>
+              <a:lnRef idx="3">
+                <a:schemeClr val="dk1"/>
+              </a:lnRef>
+              <a:fillRef idx="0">
+                <a:schemeClr val="dk1"/>
+              </a:fillRef>
+              <a:effectRef idx="2">
+                <a:schemeClr val="dk1"/>
+              </a:effectRef>
+              <a:fontRef idx="minor">
+                <a:schemeClr val="tx1"/>
+              </a:fontRef>
+            </p:style>
+          </p:cxnSp>
+          <p:cxnSp>
+            <p:nvCxnSpPr>
+              <p:cNvPr id="21" name="Straight Connector 20">
+                <a:extLst>
+                  <a:ext uri="{FF2B5EF4-FFF2-40B4-BE49-F238E27FC236}">
+                    <a16:creationId xmlns:a16="http://schemas.microsoft.com/office/drawing/2014/main" id="{31C5745F-4EC3-432A-9698-D7AA9F25C14A}"/>
+                  </a:ext>
+                </a:extLst>
+              </p:cNvPr>
+              <p:cNvCxnSpPr/>
+              <p:nvPr/>
+            </p:nvCxnSpPr>
+            <p:spPr>
+              <a:xfrm flipV="1">
+                <a:off x="2458720" y="5784427"/>
+                <a:ext cx="358987" cy="419946"/>
+              </a:xfrm>
+              <a:prstGeom prst="line">
+                <a:avLst/>
+              </a:prstGeom>
+              <a:ln/>
+            </p:spPr>
+            <p:style>
+              <a:lnRef idx="3">
+                <a:schemeClr val="dk1"/>
+              </a:lnRef>
+              <a:fillRef idx="0">
+                <a:schemeClr val="dk1"/>
+              </a:fillRef>
+              <a:effectRef idx="2">
+                <a:schemeClr val="dk1"/>
+              </a:effectRef>
+              <a:fontRef idx="minor">
+                <a:schemeClr val="tx1"/>
+              </a:fontRef>
+            </p:style>
+          </p:cxnSp>
+          <p:cxnSp>
+            <p:nvCxnSpPr>
+              <p:cNvPr id="22" name="Straight Connector 21">
+                <a:extLst>
+                  <a:ext uri="{FF2B5EF4-FFF2-40B4-BE49-F238E27FC236}">
+                    <a16:creationId xmlns:a16="http://schemas.microsoft.com/office/drawing/2014/main" id="{6FF9FBF6-49D3-45A3-8095-E279AAF75D02}"/>
+                  </a:ext>
+                </a:extLst>
+              </p:cNvPr>
+              <p:cNvCxnSpPr/>
+              <p:nvPr/>
+            </p:nvCxnSpPr>
+            <p:spPr>
+              <a:xfrm flipH="1" flipV="1">
+                <a:off x="2025227" y="3183467"/>
+                <a:ext cx="792480" cy="2600961"/>
+              </a:xfrm>
+              <a:prstGeom prst="line">
+                <a:avLst/>
+              </a:prstGeom>
+              <a:ln/>
+            </p:spPr>
+            <p:style>
+              <a:lnRef idx="3">
+                <a:schemeClr val="dk1"/>
+              </a:lnRef>
+              <a:fillRef idx="0">
+                <a:schemeClr val="dk1"/>
+              </a:fillRef>
+              <a:effectRef idx="2">
+                <a:schemeClr val="dk1"/>
+              </a:effectRef>
+              <a:fontRef idx="minor">
+                <a:schemeClr val="tx1"/>
+              </a:fontRef>
+            </p:style>
+          </p:cxnSp>
+          <p:cxnSp>
+            <p:nvCxnSpPr>
+              <p:cNvPr id="23" name="Straight Connector 22">
+                <a:extLst>
+                  <a:ext uri="{FF2B5EF4-FFF2-40B4-BE49-F238E27FC236}">
+                    <a16:creationId xmlns:a16="http://schemas.microsoft.com/office/drawing/2014/main" id="{FA944F93-E570-4F8A-98B3-17D84DEDFEC1}"/>
+                  </a:ext>
+                </a:extLst>
+              </p:cNvPr>
+              <p:cNvCxnSpPr/>
+              <p:nvPr/>
+            </p:nvCxnSpPr>
+            <p:spPr>
+              <a:xfrm flipH="1">
+                <a:off x="1456267" y="3183467"/>
+                <a:ext cx="568961" cy="0"/>
+              </a:xfrm>
+              <a:prstGeom prst="line">
+                <a:avLst/>
+              </a:prstGeom>
+              <a:ln/>
+            </p:spPr>
+            <p:style>
+              <a:lnRef idx="3">
+                <a:schemeClr val="dk1"/>
+              </a:lnRef>
+              <a:fillRef idx="0">
+                <a:schemeClr val="dk1"/>
+              </a:fillRef>
+              <a:effectRef idx="2">
+                <a:schemeClr val="dk1"/>
+              </a:effectRef>
+              <a:fontRef idx="minor">
+                <a:schemeClr val="tx1"/>
+              </a:fontRef>
+            </p:style>
+          </p:cxnSp>
+          <p:cxnSp>
+            <p:nvCxnSpPr>
+              <p:cNvPr id="24" name="Straight Connector 23">
+                <a:extLst>
+                  <a:ext uri="{FF2B5EF4-FFF2-40B4-BE49-F238E27FC236}">
+                    <a16:creationId xmlns:a16="http://schemas.microsoft.com/office/drawing/2014/main" id="{CACA00CE-F432-40AA-A88E-8AECE0915AB2}"/>
+                  </a:ext>
+                </a:extLst>
+              </p:cNvPr>
+              <p:cNvCxnSpPr/>
+              <p:nvPr/>
+            </p:nvCxnSpPr>
+            <p:spPr>
+              <a:xfrm flipH="1" flipV="1">
+                <a:off x="1009227" y="2871893"/>
+                <a:ext cx="440266" cy="311574"/>
+              </a:xfrm>
+              <a:prstGeom prst="line">
+                <a:avLst/>
+              </a:prstGeom>
+              <a:ln/>
+            </p:spPr>
+            <p:style>
+              <a:lnRef idx="3">
+                <a:schemeClr val="dk1"/>
+              </a:lnRef>
+              <a:fillRef idx="0">
+                <a:schemeClr val="dk1"/>
+              </a:fillRef>
+              <a:effectRef idx="2">
+                <a:schemeClr val="dk1"/>
+              </a:effectRef>
+              <a:fontRef idx="minor">
+                <a:schemeClr val="tx1"/>
+              </a:fontRef>
+            </p:style>
+          </p:cxnSp>
+          <p:cxnSp>
+            <p:nvCxnSpPr>
+              <p:cNvPr id="25" name="Straight Connector 24">
+                <a:extLst>
+                  <a:ext uri="{FF2B5EF4-FFF2-40B4-BE49-F238E27FC236}">
+                    <a16:creationId xmlns:a16="http://schemas.microsoft.com/office/drawing/2014/main" id="{D8E496F6-F1DC-4EB1-A0B8-79C411F166D4}"/>
+                  </a:ext>
+                </a:extLst>
+              </p:cNvPr>
+              <p:cNvCxnSpPr/>
+              <p:nvPr/>
+            </p:nvCxnSpPr>
+            <p:spPr>
+              <a:xfrm flipV="1">
+                <a:off x="1009227" y="2404535"/>
+                <a:ext cx="0" cy="467359"/>
+              </a:xfrm>
+              <a:prstGeom prst="line">
+                <a:avLst/>
+              </a:prstGeom>
+              <a:ln/>
+            </p:spPr>
+            <p:style>
+              <a:lnRef idx="3">
+                <a:schemeClr val="dk1"/>
+              </a:lnRef>
+              <a:fillRef idx="0">
+                <a:schemeClr val="dk1"/>
+              </a:fillRef>
+              <a:effectRef idx="2">
+                <a:schemeClr val="dk1"/>
+              </a:effectRef>
+              <a:fontRef idx="minor">
+                <a:schemeClr val="tx1"/>
+              </a:fontRef>
+            </p:style>
+          </p:cxnSp>
+        </p:grpSp>
+        <p:grpSp>
+          <p:nvGrpSpPr>
+            <p:cNvPr id="9" name="Group 8">
+              <a:extLst>
+                <a:ext uri="{FF2B5EF4-FFF2-40B4-BE49-F238E27FC236}">
+                  <a16:creationId xmlns:a16="http://schemas.microsoft.com/office/drawing/2014/main" id="{4A8FD470-6289-4C73-B8F6-BE0C175CF66C}"/>
+                </a:ext>
+              </a:extLst>
+            </p:cNvPr>
+            <p:cNvGrpSpPr/>
+            <p:nvPr/>
+          </p:nvGrpSpPr>
+          <p:grpSpPr>
+            <a:xfrm>
+              <a:off x="2083406" y="3824273"/>
+              <a:ext cx="393094" cy="317492"/>
+              <a:chOff x="2083406" y="3819568"/>
+              <a:chExt cx="393094" cy="317492"/>
+            </a:xfrm>
+          </p:grpSpPr>
+          <p:sp>
+            <p:nvSpPr>
+              <p:cNvPr id="14" name="Rectangle 13">
+                <a:extLst>
+                  <a:ext uri="{FF2B5EF4-FFF2-40B4-BE49-F238E27FC236}">
+                    <a16:creationId xmlns:a16="http://schemas.microsoft.com/office/drawing/2014/main" id="{0E248137-2717-4EA3-BBAE-BB59B05B3A4B}"/>
+                  </a:ext>
+                </a:extLst>
+              </p:cNvPr>
+              <p:cNvSpPr/>
+              <p:nvPr/>
+            </p:nvSpPr>
+            <p:spPr>
+              <a:xfrm rot="20597776">
+                <a:off x="2083406" y="3819568"/>
+                <a:ext cx="304800" cy="317492"/>
+              </a:xfrm>
+              <a:prstGeom prst="rect">
+                <a:avLst/>
+              </a:prstGeom>
+              <a:solidFill>
+                <a:schemeClr val="tx1"/>
+              </a:solidFill>
+            </p:spPr>
+            <p:style>
+              <a:lnRef idx="2">
+                <a:schemeClr val="accent1">
+                  <a:shade val="50000"/>
+                </a:schemeClr>
+              </a:lnRef>
+              <a:fillRef idx="1">
+                <a:schemeClr val="accent1"/>
+              </a:fillRef>
+              <a:effectRef idx="0">
+                <a:schemeClr val="accent1"/>
+              </a:effectRef>
+              <a:fontRef idx="minor">
+                <a:schemeClr val="lt1"/>
+              </a:fontRef>
+            </p:style>
+            <p:txBody>
+              <a:bodyPr rtlCol="0" anchor="ctr"/>
+              <a:lstStyle/>
+              <a:p>
+                <a:pPr algn="ctr"/>
+                <a:endParaRPr lang="en-US"/>
+              </a:p>
+            </p:txBody>
+          </p:sp>
+          <p:sp>
+            <p:nvSpPr>
+              <p:cNvPr id="15" name="Rectangle 14">
+                <a:extLst>
+                  <a:ext uri="{FF2B5EF4-FFF2-40B4-BE49-F238E27FC236}">
+                    <a16:creationId xmlns:a16="http://schemas.microsoft.com/office/drawing/2014/main" id="{F29065A9-663E-4B88-950F-207B23255325}"/>
+                  </a:ext>
+                </a:extLst>
+              </p:cNvPr>
+              <p:cNvSpPr/>
+              <p:nvPr/>
+            </p:nvSpPr>
+            <p:spPr>
+              <a:xfrm rot="20475956">
+                <a:off x="2336800" y="3860800"/>
+                <a:ext cx="114300" cy="45719"/>
+              </a:xfrm>
+              <a:prstGeom prst="rect">
+                <a:avLst/>
+              </a:prstGeom>
+              <a:solidFill>
+                <a:schemeClr val="tx1"/>
+              </a:solidFill>
+            </p:spPr>
+            <p:style>
+              <a:lnRef idx="2">
+                <a:schemeClr val="accent1">
+                  <a:shade val="50000"/>
+                </a:schemeClr>
+              </a:lnRef>
+              <a:fillRef idx="1">
+                <a:schemeClr val="accent1"/>
+              </a:fillRef>
+              <a:effectRef idx="0">
+                <a:schemeClr val="accent1"/>
+              </a:effectRef>
+              <a:fontRef idx="minor">
+                <a:schemeClr val="lt1"/>
+              </a:fontRef>
+            </p:style>
+            <p:txBody>
+              <a:bodyPr rtlCol="0" anchor="ctr"/>
+              <a:lstStyle/>
+              <a:p>
+                <a:pPr algn="ctr"/>
+                <a:endParaRPr lang="en-US"/>
+              </a:p>
+            </p:txBody>
+          </p:sp>
+          <p:sp>
+            <p:nvSpPr>
+              <p:cNvPr id="16" name="Rectangle 15">
+                <a:extLst>
+                  <a:ext uri="{FF2B5EF4-FFF2-40B4-BE49-F238E27FC236}">
+                    <a16:creationId xmlns:a16="http://schemas.microsoft.com/office/drawing/2014/main" id="{6BBD8906-09AA-461E-84D4-F30D0BED9178}"/>
+                  </a:ext>
+                </a:extLst>
+              </p:cNvPr>
+              <p:cNvSpPr/>
+              <p:nvPr/>
+            </p:nvSpPr>
+            <p:spPr>
+              <a:xfrm rot="20475956">
+                <a:off x="2362200" y="3930650"/>
+                <a:ext cx="114300" cy="45719"/>
+              </a:xfrm>
+              <a:prstGeom prst="rect">
+                <a:avLst/>
+              </a:prstGeom>
+              <a:solidFill>
+                <a:schemeClr val="tx1"/>
+              </a:solidFill>
+            </p:spPr>
+            <p:style>
+              <a:lnRef idx="2">
+                <a:schemeClr val="accent1">
+                  <a:shade val="50000"/>
+                </a:schemeClr>
+              </a:lnRef>
+              <a:fillRef idx="1">
+                <a:schemeClr val="accent1"/>
+              </a:fillRef>
+              <a:effectRef idx="0">
+                <a:schemeClr val="accent1"/>
+              </a:effectRef>
+              <a:fontRef idx="minor">
+                <a:schemeClr val="lt1"/>
+              </a:fontRef>
+            </p:style>
+            <p:txBody>
+              <a:bodyPr rtlCol="0" anchor="ctr"/>
+              <a:lstStyle/>
+              <a:p>
+                <a:pPr algn="ctr"/>
+                <a:endParaRPr lang="en-US"/>
+              </a:p>
+            </p:txBody>
+          </p:sp>
+        </p:grpSp>
+        <p:grpSp>
+          <p:nvGrpSpPr>
+            <p:cNvPr id="10" name="Group 9">
+              <a:extLst>
+                <a:ext uri="{FF2B5EF4-FFF2-40B4-BE49-F238E27FC236}">
+                  <a16:creationId xmlns:a16="http://schemas.microsoft.com/office/drawing/2014/main" id="{0AE5BDBB-E101-4EBF-B271-275E8025917D}"/>
+                </a:ext>
+              </a:extLst>
+            </p:cNvPr>
+            <p:cNvGrpSpPr/>
+            <p:nvPr/>
+          </p:nvGrpSpPr>
+          <p:grpSpPr>
+            <a:xfrm>
+              <a:off x="1070531" y="2628142"/>
+              <a:ext cx="577816" cy="636933"/>
+              <a:chOff x="1070531" y="2628142"/>
+              <a:chExt cx="577816" cy="636933"/>
+            </a:xfrm>
+          </p:grpSpPr>
+          <p:sp>
+            <p:nvSpPr>
+              <p:cNvPr id="11" name="Rectangle 10">
+                <a:extLst>
+                  <a:ext uri="{FF2B5EF4-FFF2-40B4-BE49-F238E27FC236}">
+                    <a16:creationId xmlns:a16="http://schemas.microsoft.com/office/drawing/2014/main" id="{0FE00938-E70D-4273-9B0F-1EBB063F295F}"/>
+                  </a:ext>
+                </a:extLst>
+              </p:cNvPr>
+              <p:cNvSpPr/>
+              <p:nvPr/>
+            </p:nvSpPr>
+            <p:spPr>
+              <a:xfrm rot="18054809">
+                <a:off x="1047905" y="2809102"/>
+                <a:ext cx="478599" cy="433348"/>
+              </a:xfrm>
+              <a:prstGeom prst="rect">
+                <a:avLst/>
+              </a:prstGeom>
+              <a:solidFill>
+                <a:schemeClr val="tx1">
+                  <a:lumMod val="95000"/>
+                  <a:lumOff val="5000"/>
+                </a:schemeClr>
+              </a:solidFill>
+            </p:spPr>
+            <p:style>
+              <a:lnRef idx="2">
+                <a:schemeClr val="accent1">
+                  <a:shade val="50000"/>
+                </a:schemeClr>
+              </a:lnRef>
+              <a:fillRef idx="1">
+                <a:schemeClr val="accent1"/>
+              </a:fillRef>
+              <a:effectRef idx="0">
+                <a:schemeClr val="accent1"/>
+              </a:effectRef>
+              <a:fontRef idx="minor">
+                <a:schemeClr val="lt1"/>
+              </a:fontRef>
+            </p:style>
+            <p:txBody>
+              <a:bodyPr rtlCol="0" anchor="ctr"/>
+              <a:lstStyle/>
+              <a:p>
+                <a:pPr algn="ctr"/>
+                <a:endParaRPr lang="en-US"/>
+              </a:p>
+            </p:txBody>
+          </p:sp>
+          <p:sp>
+            <p:nvSpPr>
+              <p:cNvPr id="12" name="Rectangle 11">
+                <a:extLst>
+                  <a:ext uri="{FF2B5EF4-FFF2-40B4-BE49-F238E27FC236}">
+                    <a16:creationId xmlns:a16="http://schemas.microsoft.com/office/drawing/2014/main" id="{29B3F658-7F20-41CB-82F4-CD1E40CCF915}"/>
+                  </a:ext>
+                </a:extLst>
+              </p:cNvPr>
+              <p:cNvSpPr/>
+              <p:nvPr/>
+            </p:nvSpPr>
+            <p:spPr>
+              <a:xfrm rot="18213472">
+                <a:off x="1412677" y="2715997"/>
+                <a:ext cx="221429" cy="45719"/>
+              </a:xfrm>
+              <a:prstGeom prst="rect">
+                <a:avLst/>
+              </a:prstGeom>
+              <a:solidFill>
+                <a:schemeClr val="tx1"/>
+              </a:solidFill>
+            </p:spPr>
+            <p:style>
+              <a:lnRef idx="2">
+                <a:schemeClr val="accent1">
+                  <a:shade val="50000"/>
+                </a:schemeClr>
+              </a:lnRef>
+              <a:fillRef idx="1">
+                <a:schemeClr val="accent1"/>
+              </a:fillRef>
+              <a:effectRef idx="0">
+                <a:schemeClr val="accent1"/>
+              </a:effectRef>
+              <a:fontRef idx="minor">
+                <a:schemeClr val="lt1"/>
+              </a:fontRef>
+            </p:style>
+            <p:txBody>
+              <a:bodyPr rtlCol="0" anchor="ctr"/>
+              <a:lstStyle/>
+              <a:p>
+                <a:pPr algn="ctr"/>
+                <a:endParaRPr lang="en-US"/>
+              </a:p>
+            </p:txBody>
+          </p:sp>
+          <p:sp>
+            <p:nvSpPr>
+              <p:cNvPr id="13" name="Rectangle 12">
+                <a:extLst>
+                  <a:ext uri="{FF2B5EF4-FFF2-40B4-BE49-F238E27FC236}">
+                    <a16:creationId xmlns:a16="http://schemas.microsoft.com/office/drawing/2014/main" id="{77B4914D-2AB2-49F4-8ACE-F669F9F6D678}"/>
+                  </a:ext>
+                </a:extLst>
+              </p:cNvPr>
+              <p:cNvSpPr/>
+              <p:nvPr/>
+            </p:nvSpPr>
+            <p:spPr>
+              <a:xfrm rot="18213472">
+                <a:off x="1514773" y="2779497"/>
+                <a:ext cx="221429" cy="45719"/>
+              </a:xfrm>
+              <a:prstGeom prst="rect">
+                <a:avLst/>
+              </a:prstGeom>
+              <a:solidFill>
+                <a:schemeClr val="tx1"/>
+              </a:solidFill>
+            </p:spPr>
+            <p:style>
+              <a:lnRef idx="2">
+                <a:schemeClr val="accent1">
+                  <a:shade val="50000"/>
+                </a:schemeClr>
+              </a:lnRef>
+              <a:fillRef idx="1">
+                <a:schemeClr val="accent1"/>
+              </a:fillRef>
+              <a:effectRef idx="0">
+                <a:schemeClr val="accent1"/>
+              </a:effectRef>
+              <a:fontRef idx="minor">
+                <a:schemeClr val="lt1"/>
+              </a:fontRef>
+            </p:style>
+            <p:txBody>
+              <a:bodyPr rtlCol="0" anchor="ctr"/>
+              <a:lstStyle/>
+              <a:p>
+                <a:pPr algn="ctr"/>
+                <a:endParaRPr lang="en-US"/>
+              </a:p>
+            </p:txBody>
+          </p:sp>
+        </p:grpSp>
+      </p:grpSp>
+      <p:sp>
+        <p:nvSpPr>
+          <p:cNvPr id="26" name="Rectangle 25">
+            <a:extLst>
+              <a:ext uri="{FF2B5EF4-FFF2-40B4-BE49-F238E27FC236}">
+                <a16:creationId xmlns:a16="http://schemas.microsoft.com/office/drawing/2014/main" id="{3363469C-B5E3-4850-A601-11AD41D4BBCB}"/>
+              </a:ext>
+            </a:extLst>
+          </p:cNvPr>
+          <p:cNvSpPr/>
+          <p:nvPr/>
+        </p:nvSpPr>
+        <p:spPr>
+          <a:xfrm rot="15064516">
+            <a:off x="9492362" y="3832303"/>
+            <a:ext cx="850988" cy="331313"/>
+          </a:xfrm>
+          <a:prstGeom prst="rect">
+            <a:avLst/>
+          </a:prstGeom>
+        </p:spPr>
+        <p:style>
+          <a:lnRef idx="2">
+            <a:schemeClr val="accent5">
+              <a:shade val="50000"/>
+            </a:schemeClr>
+          </a:lnRef>
+          <a:fillRef idx="1">
+            <a:schemeClr val="accent5"/>
+          </a:fillRef>
+          <a:effectRef idx="0">
+            <a:schemeClr val="accent5"/>
+          </a:effectRef>
+          <a:fontRef idx="minor">
+            <a:schemeClr val="lt1"/>
+          </a:fontRef>
+        </p:style>
+        <p:txBody>
+          <a:bodyPr rtlCol="0" anchor="ctr"/>
+          <a:lstStyle/>
+          <a:p>
+            <a:pPr algn="ctr"/>
+            <a:r>
+              <a:rPr lang="en-US" dirty="0"/>
+              <a:t> UBEC</a:t>
+            </a:r>
+          </a:p>
+        </p:txBody>
+      </p:sp>
+      <p:sp>
+        <p:nvSpPr>
+          <p:cNvPr id="27" name="Rectangle 26">
+            <a:extLst>
+              <a:ext uri="{FF2B5EF4-FFF2-40B4-BE49-F238E27FC236}">
+                <a16:creationId xmlns:a16="http://schemas.microsoft.com/office/drawing/2014/main" id="{04F83FCE-AF0E-4EAF-89D5-421E40656273}"/>
+              </a:ext>
+            </a:extLst>
+          </p:cNvPr>
+          <p:cNvSpPr/>
+          <p:nvPr/>
+        </p:nvSpPr>
+        <p:spPr>
+          <a:xfrm rot="3355565">
+            <a:off x="9665928" y="3308220"/>
+            <a:ext cx="175572" cy="336594"/>
+          </a:xfrm>
+          <a:prstGeom prst="rect">
+            <a:avLst/>
+          </a:prstGeom>
+          <a:solidFill>
+            <a:schemeClr val="accent6">
+              <a:lumMod val="40000"/>
+              <a:lumOff val="60000"/>
+            </a:schemeClr>
+          </a:solidFill>
+        </p:spPr>
+        <p:style>
+          <a:lnRef idx="2">
+            <a:schemeClr val="accent1">
+              <a:shade val="50000"/>
+            </a:schemeClr>
+          </a:lnRef>
+          <a:fillRef idx="1">
+            <a:schemeClr val="accent1"/>
+          </a:fillRef>
+          <a:effectRef idx="0">
+            <a:schemeClr val="accent1"/>
+          </a:effectRef>
+          <a:fontRef idx="minor">
+            <a:schemeClr val="lt1"/>
+          </a:fontRef>
+        </p:style>
+        <p:txBody>
+          <a:bodyPr rtlCol="0" anchor="ctr"/>
+          <a:lstStyle/>
+          <a:p>
+            <a:pPr algn="ctr"/>
+            <a:endParaRPr lang="en-US"/>
+          </a:p>
+        </p:txBody>
+      </p:sp>
+      <p:sp>
+        <p:nvSpPr>
+          <p:cNvPr id="28" name="Rectangle 27">
+            <a:extLst>
+              <a:ext uri="{FF2B5EF4-FFF2-40B4-BE49-F238E27FC236}">
+                <a16:creationId xmlns:a16="http://schemas.microsoft.com/office/drawing/2014/main" id="{0C0745D1-29C7-4D8D-8FD7-54778457E517}"/>
+              </a:ext>
+            </a:extLst>
+          </p:cNvPr>
+          <p:cNvSpPr/>
+          <p:nvPr/>
+        </p:nvSpPr>
+        <p:spPr>
+          <a:xfrm rot="4359892">
+            <a:off x="9600943" y="5090236"/>
+            <a:ext cx="1126941" cy="417140"/>
+          </a:xfrm>
+          <a:prstGeom prst="rect">
+            <a:avLst/>
+          </a:prstGeom>
+          <a:solidFill>
+            <a:schemeClr val="accent5"/>
+          </a:solidFill>
+          <a:ln>
+            <a:solidFill>
+              <a:schemeClr val="accent5"/>
+            </a:solidFill>
+          </a:ln>
+        </p:spPr>
+        <p:style>
+          <a:lnRef idx="2">
+            <a:schemeClr val="accent1">
+              <a:shade val="50000"/>
+            </a:schemeClr>
+          </a:lnRef>
+          <a:fillRef idx="1">
+            <a:schemeClr val="accent1"/>
+          </a:fillRef>
+          <a:effectRef idx="0">
+            <a:schemeClr val="accent1"/>
+          </a:effectRef>
+          <a:fontRef idx="minor">
+            <a:schemeClr val="lt1"/>
+          </a:fontRef>
+        </p:style>
+        <p:txBody>
+          <a:bodyPr rtlCol="0" anchor="ctr"/>
+          <a:lstStyle/>
+          <a:p>
+            <a:pPr algn="ctr"/>
+            <a:r>
+              <a:rPr lang="en-US" dirty="0" err="1"/>
+              <a:t>Ardu</a:t>
+            </a:r>
+            <a:endParaRPr lang="en-US" dirty="0"/>
+          </a:p>
+        </p:txBody>
+      </p:sp>
+      <p:sp>
+        <p:nvSpPr>
+          <p:cNvPr id="29" name="Rectangle 28">
+            <a:extLst>
+              <a:ext uri="{FF2B5EF4-FFF2-40B4-BE49-F238E27FC236}">
+                <a16:creationId xmlns:a16="http://schemas.microsoft.com/office/drawing/2014/main" id="{75DA5D87-A5F5-41FF-9E5B-BA8DCA2D83B5}"/>
+              </a:ext>
+            </a:extLst>
+          </p:cNvPr>
+          <p:cNvSpPr/>
+          <p:nvPr/>
+        </p:nvSpPr>
+        <p:spPr>
+          <a:xfrm rot="20653546">
+            <a:off x="10693744" y="5042581"/>
+            <a:ext cx="64302" cy="784651"/>
+          </a:xfrm>
+          <a:prstGeom prst="rect">
+            <a:avLst/>
+          </a:prstGeom>
+          <a:solidFill>
+            <a:schemeClr val="accent4">
+              <a:lumMod val="60000"/>
+              <a:lumOff val="40000"/>
+            </a:schemeClr>
+          </a:solidFill>
+        </p:spPr>
+        <p:style>
+          <a:lnRef idx="2">
+            <a:schemeClr val="accent1">
+              <a:shade val="50000"/>
+            </a:schemeClr>
+          </a:lnRef>
+          <a:fillRef idx="1">
+            <a:schemeClr val="accent1"/>
+          </a:fillRef>
+          <a:effectRef idx="0">
+            <a:schemeClr val="accent1"/>
+          </a:effectRef>
+          <a:fontRef idx="minor">
+            <a:schemeClr val="lt1"/>
+          </a:fontRef>
+        </p:style>
+        <p:txBody>
+          <a:bodyPr rtlCol="0" anchor="ctr"/>
+          <a:lstStyle/>
+          <a:p>
+            <a:pPr algn="ctr"/>
+            <a:endParaRPr lang="en-US"/>
+          </a:p>
+        </p:txBody>
+      </p:sp>
+      <p:sp>
+        <p:nvSpPr>
+          <p:cNvPr id="30" name="Rectangle 29">
+            <a:extLst>
+              <a:ext uri="{FF2B5EF4-FFF2-40B4-BE49-F238E27FC236}">
+                <a16:creationId xmlns:a16="http://schemas.microsoft.com/office/drawing/2014/main" id="{20733B9B-7E8B-4845-B636-05948F6F81E0}"/>
+              </a:ext>
+            </a:extLst>
+          </p:cNvPr>
+          <p:cNvSpPr/>
+          <p:nvPr/>
+        </p:nvSpPr>
+        <p:spPr>
+          <a:xfrm>
+            <a:off x="10024535" y="2508710"/>
+            <a:ext cx="248778" cy="98118"/>
+          </a:xfrm>
+          <a:prstGeom prst="rect">
+            <a:avLst/>
+          </a:prstGeom>
+          <a:solidFill>
+            <a:srgbClr val="36F856"/>
+          </a:solidFill>
+        </p:spPr>
+        <p:style>
+          <a:lnRef idx="2">
+            <a:schemeClr val="accent1">
+              <a:shade val="50000"/>
+            </a:schemeClr>
+          </a:lnRef>
+          <a:fillRef idx="1">
+            <a:schemeClr val="accent1"/>
+          </a:fillRef>
+          <a:effectRef idx="0">
+            <a:schemeClr val="accent1"/>
+          </a:effectRef>
+          <a:fontRef idx="minor">
+            <a:schemeClr val="lt1"/>
+          </a:fontRef>
+        </p:style>
+        <p:txBody>
+          <a:bodyPr rtlCol="0" anchor="ctr"/>
+          <a:lstStyle/>
+          <a:p>
+            <a:pPr algn="ctr"/>
+            <a:endParaRPr lang="en-US"/>
+          </a:p>
+        </p:txBody>
+      </p:sp>
+      <p:grpSp>
+        <p:nvGrpSpPr>
+          <p:cNvPr id="31" name="Group 30">
+            <a:extLst>
+              <a:ext uri="{FF2B5EF4-FFF2-40B4-BE49-F238E27FC236}">
+                <a16:creationId xmlns:a16="http://schemas.microsoft.com/office/drawing/2014/main" id="{744AD4F3-A33E-447C-B6B1-BB4804E55FA9}"/>
+              </a:ext>
+            </a:extLst>
+          </p:cNvPr>
+          <p:cNvGrpSpPr/>
+          <p:nvPr/>
+        </p:nvGrpSpPr>
+        <p:grpSpPr>
+          <a:xfrm>
+            <a:off x="8599866" y="2592467"/>
+            <a:ext cx="549138" cy="600209"/>
+            <a:chOff x="8599866" y="2592467"/>
+            <a:chExt cx="549138" cy="600209"/>
+          </a:xfrm>
+        </p:grpSpPr>
+        <p:sp>
+          <p:nvSpPr>
+            <p:cNvPr id="32" name="Rectangle 31">
+              <a:extLst>
+                <a:ext uri="{FF2B5EF4-FFF2-40B4-BE49-F238E27FC236}">
+                  <a16:creationId xmlns:a16="http://schemas.microsoft.com/office/drawing/2014/main" id="{05A7CA1D-1BAC-48E6-B333-C8E69C238C03}"/>
+                </a:ext>
+              </a:extLst>
+            </p:cNvPr>
+            <p:cNvSpPr/>
+            <p:nvPr/>
+          </p:nvSpPr>
+          <p:spPr>
+            <a:xfrm>
+              <a:off x="8599866" y="2620374"/>
+              <a:ext cx="549138" cy="572302"/>
+            </a:xfrm>
+            <a:prstGeom prst="rect">
+              <a:avLst/>
+            </a:prstGeom>
+            <a:solidFill>
+              <a:schemeClr val="accent5"/>
+            </a:solidFill>
+            <a:ln>
+              <a:solidFill>
+                <a:srgbClr val="0070C0"/>
+              </a:solidFill>
+            </a:ln>
+          </p:spPr>
+          <p:style>
+            <a:lnRef idx="2">
+              <a:schemeClr val="accent1">
+                <a:shade val="50000"/>
+              </a:schemeClr>
+            </a:lnRef>
+            <a:fillRef idx="1">
+              <a:schemeClr val="accent1"/>
+            </a:fillRef>
+            <a:effectRef idx="0">
+              <a:schemeClr val="accent1"/>
+            </a:effectRef>
+            <a:fontRef idx="minor">
+              <a:schemeClr val="lt1"/>
+            </a:fontRef>
+          </p:style>
+          <p:txBody>
+            <a:bodyPr rtlCol="0" anchor="ctr"/>
+            <a:lstStyle/>
+            <a:p>
+              <a:pPr algn="ctr"/>
+              <a:r>
+                <a:rPr lang="en-US" sz="1200" dirty="0"/>
+                <a:t>YX</a:t>
+              </a:r>
+            </a:p>
+            <a:p>
+              <a:pPr algn="ctr"/>
+              <a:r>
+                <a:rPr lang="en-US" sz="1200" dirty="0"/>
+                <a:t>5200</a:t>
+              </a:r>
+            </a:p>
+          </p:txBody>
+        </p:sp>
+        <p:sp>
+          <p:nvSpPr>
+            <p:cNvPr id="33" name="Oval 32">
+              <a:extLst>
+                <a:ext uri="{FF2B5EF4-FFF2-40B4-BE49-F238E27FC236}">
+                  <a16:creationId xmlns:a16="http://schemas.microsoft.com/office/drawing/2014/main" id="{E41082DF-47E4-4746-9F65-F9CC44CB7624}"/>
+                </a:ext>
+              </a:extLst>
+            </p:cNvPr>
+            <p:cNvSpPr/>
+            <p:nvPr/>
+          </p:nvSpPr>
+          <p:spPr>
+            <a:xfrm>
+              <a:off x="8838064" y="2592467"/>
+              <a:ext cx="54186" cy="46399"/>
+            </a:xfrm>
+            <a:prstGeom prst="ellipse">
+              <a:avLst/>
+            </a:prstGeom>
+            <a:solidFill>
+              <a:schemeClr val="accent3">
+                <a:lumMod val="40000"/>
+                <a:lumOff val="60000"/>
+              </a:schemeClr>
+            </a:solidFill>
+            <a:ln>
+              <a:solidFill>
+                <a:schemeClr val="accent3">
+                  <a:lumMod val="40000"/>
+                  <a:lumOff val="60000"/>
+                </a:schemeClr>
+              </a:solidFill>
+            </a:ln>
+          </p:spPr>
+          <p:style>
+            <a:lnRef idx="2">
+              <a:schemeClr val="accent1">
+                <a:shade val="50000"/>
+              </a:schemeClr>
+            </a:lnRef>
+            <a:fillRef idx="1">
+              <a:schemeClr val="accent1"/>
+            </a:fillRef>
+            <a:effectRef idx="0">
+              <a:schemeClr val="accent1"/>
+            </a:effectRef>
+            <a:fontRef idx="minor">
+              <a:schemeClr val="lt1"/>
+            </a:fontRef>
+          </p:style>
+          <p:txBody>
+            <a:bodyPr rtlCol="0" anchor="ctr"/>
+            <a:lstStyle/>
+            <a:p>
+              <a:pPr algn="ctr"/>
+              <a:endParaRPr lang="en-US"/>
+            </a:p>
+          </p:txBody>
+        </p:sp>
+      </p:grpSp>
+      <p:grpSp>
+        <p:nvGrpSpPr>
+          <p:cNvPr id="34" name="Group 33">
+            <a:extLst>
+              <a:ext uri="{FF2B5EF4-FFF2-40B4-BE49-F238E27FC236}">
+                <a16:creationId xmlns:a16="http://schemas.microsoft.com/office/drawing/2014/main" id="{9BD12F2A-1262-45F6-9303-EA90AEA4C8CA}"/>
+              </a:ext>
+            </a:extLst>
+          </p:cNvPr>
+          <p:cNvGrpSpPr/>
+          <p:nvPr/>
+        </p:nvGrpSpPr>
+        <p:grpSpPr>
+          <a:xfrm rot="16019730">
+            <a:off x="9227780" y="4363881"/>
+            <a:ext cx="534377" cy="189534"/>
+            <a:chOff x="9382567" y="3220117"/>
+            <a:chExt cx="534377" cy="189534"/>
+          </a:xfrm>
+        </p:grpSpPr>
+        <p:sp>
+          <p:nvSpPr>
+            <p:cNvPr id="35" name="Rectangle 34">
+              <a:extLst>
+                <a:ext uri="{FF2B5EF4-FFF2-40B4-BE49-F238E27FC236}">
+                  <a16:creationId xmlns:a16="http://schemas.microsoft.com/office/drawing/2014/main" id="{1919EAF8-3FE6-4254-9BEE-C5331042D628}"/>
+                </a:ext>
+              </a:extLst>
+            </p:cNvPr>
+            <p:cNvSpPr/>
+            <p:nvPr/>
+          </p:nvSpPr>
+          <p:spPr>
+            <a:xfrm rot="20675816">
+              <a:off x="9382567" y="3230531"/>
+              <a:ext cx="517241" cy="179120"/>
+            </a:xfrm>
+            <a:prstGeom prst="rect">
+              <a:avLst/>
+            </a:prstGeom>
+          </p:spPr>
+          <p:style>
+            <a:lnRef idx="2">
+              <a:schemeClr val="accent1">
+                <a:shade val="50000"/>
+              </a:schemeClr>
+            </a:lnRef>
+            <a:fillRef idx="1">
+              <a:schemeClr val="accent1"/>
+            </a:fillRef>
+            <a:effectRef idx="0">
+              <a:schemeClr val="accent1"/>
+            </a:effectRef>
+            <a:fontRef idx="minor">
+              <a:schemeClr val="lt1"/>
+            </a:fontRef>
+          </p:style>
+          <p:txBody>
+            <a:bodyPr rtlCol="0" anchor="ctr"/>
+            <a:lstStyle/>
+            <a:p>
+              <a:pPr algn="ctr"/>
+              <a:r>
+                <a:rPr lang="en-US" sz="1400" dirty="0"/>
+                <a:t>125</a:t>
+              </a:r>
+            </a:p>
+          </p:txBody>
+        </p:sp>
+        <p:sp>
+          <p:nvSpPr>
+            <p:cNvPr id="36" name="Oval 35">
+              <a:extLst>
+                <a:ext uri="{FF2B5EF4-FFF2-40B4-BE49-F238E27FC236}">
+                  <a16:creationId xmlns:a16="http://schemas.microsoft.com/office/drawing/2014/main" id="{595B925E-A2CA-42F7-B52C-5017BAB5F06A}"/>
+                </a:ext>
+              </a:extLst>
+            </p:cNvPr>
+            <p:cNvSpPr/>
+            <p:nvPr/>
+          </p:nvSpPr>
+          <p:spPr>
+            <a:xfrm>
+              <a:off x="9862758" y="3220117"/>
+              <a:ext cx="54186" cy="46399"/>
+            </a:xfrm>
+            <a:prstGeom prst="ellipse">
+              <a:avLst/>
+            </a:prstGeom>
+            <a:solidFill>
+              <a:schemeClr val="accent3">
+                <a:lumMod val="40000"/>
+                <a:lumOff val="60000"/>
+              </a:schemeClr>
+            </a:solidFill>
+            <a:ln>
+              <a:solidFill>
+                <a:schemeClr val="accent3">
+                  <a:lumMod val="40000"/>
+                  <a:lumOff val="60000"/>
+                </a:schemeClr>
+              </a:solidFill>
+            </a:ln>
+          </p:spPr>
+          <p:style>
+            <a:lnRef idx="2">
+              <a:schemeClr val="accent1">
+                <a:shade val="50000"/>
+              </a:schemeClr>
+            </a:lnRef>
+            <a:fillRef idx="1">
+              <a:schemeClr val="accent1"/>
+            </a:fillRef>
+            <a:effectRef idx="0">
+              <a:schemeClr val="accent1"/>
+            </a:effectRef>
+            <a:fontRef idx="minor">
+              <a:schemeClr val="lt1"/>
+            </a:fontRef>
+          </p:style>
+          <p:txBody>
+            <a:bodyPr rtlCol="0" anchor="ctr"/>
+            <a:lstStyle/>
+            <a:p>
+              <a:pPr algn="ctr"/>
+              <a:endParaRPr lang="en-US"/>
+            </a:p>
+          </p:txBody>
+        </p:sp>
+      </p:grpSp>
+      <p:sp>
+        <p:nvSpPr>
+          <p:cNvPr id="37" name="Rectangle: Rounded Corners 36">
+            <a:extLst>
+              <a:ext uri="{FF2B5EF4-FFF2-40B4-BE49-F238E27FC236}">
+                <a16:creationId xmlns:a16="http://schemas.microsoft.com/office/drawing/2014/main" id="{EA31ED77-EBE9-473C-9F4A-00083603A923}"/>
+              </a:ext>
+            </a:extLst>
+          </p:cNvPr>
+          <p:cNvSpPr/>
+          <p:nvPr/>
+        </p:nvSpPr>
+        <p:spPr>
+          <a:xfrm rot="20513597">
+            <a:off x="9943038" y="4757349"/>
+            <a:ext cx="134315" cy="180926"/>
+          </a:xfrm>
+          <a:prstGeom prst="roundRect">
+            <a:avLst/>
+          </a:prstGeom>
+          <a:solidFill>
+            <a:schemeClr val="bg1"/>
+          </a:solidFill>
+        </p:spPr>
+        <p:style>
+          <a:lnRef idx="2">
+            <a:schemeClr val="accent1">
+              <a:shade val="50000"/>
+            </a:schemeClr>
+          </a:lnRef>
+          <a:fillRef idx="1">
+            <a:schemeClr val="accent1"/>
+          </a:fillRef>
+          <a:effectRef idx="0">
+            <a:schemeClr val="accent1"/>
+          </a:effectRef>
+          <a:fontRef idx="minor">
+            <a:schemeClr val="lt1"/>
+          </a:fontRef>
+        </p:style>
+        <p:txBody>
+          <a:bodyPr rtlCol="0" anchor="ctr"/>
+          <a:lstStyle/>
+          <a:p>
+            <a:pPr algn="ctr"/>
+            <a:endParaRPr lang="en-US"/>
+          </a:p>
+        </p:txBody>
+      </p:sp>
+      <p:sp>
+        <p:nvSpPr>
+          <p:cNvPr id="38" name="TextBox 37">
+            <a:extLst>
+              <a:ext uri="{FF2B5EF4-FFF2-40B4-BE49-F238E27FC236}">
+                <a16:creationId xmlns:a16="http://schemas.microsoft.com/office/drawing/2014/main" id="{3640D38F-85CB-449C-B536-E537606B3102}"/>
+              </a:ext>
+            </a:extLst>
+          </p:cNvPr>
+          <p:cNvSpPr txBox="1"/>
+          <p:nvPr/>
+        </p:nvSpPr>
+        <p:spPr>
+          <a:xfrm rot="20266484">
+            <a:off x="9895418" y="4241706"/>
+            <a:ext cx="290464" cy="215444"/>
+          </a:xfrm>
+          <a:prstGeom prst="rect">
+            <a:avLst/>
+          </a:prstGeom>
+          <a:noFill/>
+        </p:spPr>
+        <p:txBody>
+          <a:bodyPr wrap="none" rtlCol="0">
+            <a:spAutoFit/>
+          </a:bodyPr>
+          <a:lstStyle/>
+          <a:p>
+            <a:r>
+              <a:rPr lang="en-US" sz="800" dirty="0">
+                <a:solidFill>
+                  <a:schemeClr val="bg1"/>
+                </a:solidFill>
+              </a:rPr>
+              <a:t>IN</a:t>
+            </a:r>
+          </a:p>
+        </p:txBody>
+      </p:sp>
+      <p:grpSp>
+        <p:nvGrpSpPr>
+          <p:cNvPr id="39" name="Group 38">
+            <a:extLst>
+              <a:ext uri="{FF2B5EF4-FFF2-40B4-BE49-F238E27FC236}">
+                <a16:creationId xmlns:a16="http://schemas.microsoft.com/office/drawing/2014/main" id="{EC8881DB-3E86-439C-9FDE-52D09AF68151}"/>
+              </a:ext>
+            </a:extLst>
+          </p:cNvPr>
+          <p:cNvGrpSpPr/>
+          <p:nvPr/>
+        </p:nvGrpSpPr>
+        <p:grpSpPr>
+          <a:xfrm rot="16019730">
+            <a:off x="9454507" y="5131573"/>
+            <a:ext cx="534377" cy="189534"/>
+            <a:chOff x="9382567" y="3220117"/>
+            <a:chExt cx="534377" cy="189534"/>
+          </a:xfrm>
+        </p:grpSpPr>
+        <p:sp>
+          <p:nvSpPr>
+            <p:cNvPr id="40" name="Rectangle 39">
+              <a:extLst>
+                <a:ext uri="{FF2B5EF4-FFF2-40B4-BE49-F238E27FC236}">
+                  <a16:creationId xmlns:a16="http://schemas.microsoft.com/office/drawing/2014/main" id="{BF652637-5C03-40F0-B695-30A6E3AB22A1}"/>
+                </a:ext>
+              </a:extLst>
+            </p:cNvPr>
+            <p:cNvSpPr/>
+            <p:nvPr/>
+          </p:nvSpPr>
+          <p:spPr>
+            <a:xfrm rot="20675816">
+              <a:off x="9382567" y="3230531"/>
+              <a:ext cx="517241" cy="179120"/>
+            </a:xfrm>
+            <a:prstGeom prst="rect">
+              <a:avLst/>
+            </a:prstGeom>
+          </p:spPr>
+          <p:style>
+            <a:lnRef idx="2">
+              <a:schemeClr val="accent1">
+                <a:shade val="50000"/>
+              </a:schemeClr>
+            </a:lnRef>
+            <a:fillRef idx="1">
+              <a:schemeClr val="accent1"/>
+            </a:fillRef>
+            <a:effectRef idx="0">
+              <a:schemeClr val="accent1"/>
+            </a:effectRef>
+            <a:fontRef idx="minor">
+              <a:schemeClr val="lt1"/>
+            </a:fontRef>
+          </p:style>
+          <p:txBody>
+            <a:bodyPr rtlCol="0" anchor="ctr"/>
+            <a:lstStyle/>
+            <a:p>
+              <a:pPr algn="ctr"/>
+              <a:r>
+                <a:rPr lang="en-US" sz="1200" dirty="0"/>
+                <a:t>KCX</a:t>
+              </a:r>
+            </a:p>
+          </p:txBody>
+        </p:sp>
+        <p:sp>
+          <p:nvSpPr>
+            <p:cNvPr id="41" name="Oval 40">
+              <a:extLst>
+                <a:ext uri="{FF2B5EF4-FFF2-40B4-BE49-F238E27FC236}">
+                  <a16:creationId xmlns:a16="http://schemas.microsoft.com/office/drawing/2014/main" id="{F24FD21A-F125-4BA5-A023-3A28F82D3892}"/>
+                </a:ext>
+              </a:extLst>
+            </p:cNvPr>
+            <p:cNvSpPr/>
+            <p:nvPr/>
+          </p:nvSpPr>
+          <p:spPr>
+            <a:xfrm>
+              <a:off x="9862758" y="3220117"/>
+              <a:ext cx="54186" cy="46399"/>
+            </a:xfrm>
+            <a:prstGeom prst="ellipse">
+              <a:avLst/>
+            </a:prstGeom>
+            <a:solidFill>
+              <a:schemeClr val="accent3">
+                <a:lumMod val="40000"/>
+                <a:lumOff val="60000"/>
+              </a:schemeClr>
+            </a:solidFill>
+            <a:ln>
+              <a:solidFill>
+                <a:schemeClr val="accent3">
+                  <a:lumMod val="40000"/>
+                  <a:lumOff val="60000"/>
+                </a:schemeClr>
+              </a:solidFill>
+            </a:ln>
+          </p:spPr>
+          <p:style>
+            <a:lnRef idx="2">
+              <a:schemeClr val="accent1">
+                <a:shade val="50000"/>
+              </a:schemeClr>
+            </a:lnRef>
+            <a:fillRef idx="1">
+              <a:schemeClr val="accent1"/>
+            </a:fillRef>
+            <a:effectRef idx="0">
+              <a:schemeClr val="accent1"/>
+            </a:effectRef>
+            <a:fontRef idx="minor">
+              <a:schemeClr val="lt1"/>
+            </a:fontRef>
+          </p:style>
+          <p:txBody>
+            <a:bodyPr rtlCol="0" anchor="ctr"/>
+            <a:lstStyle/>
+            <a:p>
+              <a:pPr algn="ctr"/>
+              <a:endParaRPr lang="en-US" sz="1200"/>
+            </a:p>
+          </p:txBody>
+        </p:sp>
+      </p:grpSp>
+      <p:sp>
+        <p:nvSpPr>
+          <p:cNvPr id="4" name="Rectangle 3">
+            <a:extLst>
+              <a:ext uri="{FF2B5EF4-FFF2-40B4-BE49-F238E27FC236}">
+                <a16:creationId xmlns:a16="http://schemas.microsoft.com/office/drawing/2014/main" id="{13495F2B-8FCE-446D-8B24-ACAE63D3707C}"/>
+              </a:ext>
+            </a:extLst>
+          </p:cNvPr>
+          <p:cNvSpPr/>
+          <p:nvPr/>
+        </p:nvSpPr>
+        <p:spPr>
+          <a:xfrm rot="5400000">
+            <a:off x="7853957" y="5102742"/>
+            <a:ext cx="1126941" cy="508003"/>
+          </a:xfrm>
+          <a:prstGeom prst="rect">
+            <a:avLst/>
+          </a:prstGeom>
+          <a:solidFill>
+            <a:schemeClr val="accent5"/>
+          </a:solidFill>
+          <a:ln>
+            <a:solidFill>
+              <a:schemeClr val="accent5"/>
+            </a:solidFill>
+          </a:ln>
+        </p:spPr>
+        <p:style>
+          <a:lnRef idx="2">
+            <a:schemeClr val="accent1">
+              <a:shade val="50000"/>
+            </a:schemeClr>
+          </a:lnRef>
+          <a:fillRef idx="1">
+            <a:schemeClr val="accent1"/>
+          </a:fillRef>
+          <a:effectRef idx="0">
+            <a:schemeClr val="accent1"/>
+          </a:effectRef>
+          <a:fontRef idx="minor">
+            <a:schemeClr val="lt1"/>
+          </a:fontRef>
+        </p:style>
+        <p:txBody>
+          <a:bodyPr rtlCol="0" anchor="ctr"/>
+          <a:lstStyle/>
+          <a:p>
+            <a:pPr algn="ctr"/>
+            <a:r>
+              <a:rPr lang="en-US" dirty="0"/>
+              <a:t>Prog </a:t>
+            </a:r>
+            <a:r>
+              <a:rPr lang="en-US" dirty="0" err="1"/>
+              <a:t>Ardu</a:t>
+            </a:r>
+            <a:endParaRPr lang="en-US" dirty="0"/>
+          </a:p>
+        </p:txBody>
+      </p:sp>
+      <p:cxnSp>
+        <p:nvCxnSpPr>
+          <p:cNvPr id="44" name="Straight Connector 43">
+            <a:extLst>
+              <a:ext uri="{FF2B5EF4-FFF2-40B4-BE49-F238E27FC236}">
+                <a16:creationId xmlns:a16="http://schemas.microsoft.com/office/drawing/2014/main" id="{590B4BA7-DFB4-4F73-8617-4CBE043770F3}"/>
+              </a:ext>
+            </a:extLst>
+          </p:cNvPr>
+          <p:cNvCxnSpPr>
+            <a:endCxn id="40" idx="0"/>
+          </p:cNvCxnSpPr>
+          <p:nvPr/>
+        </p:nvCxnSpPr>
+        <p:spPr>
+          <a:xfrm>
+            <a:off x="8653486" y="4962053"/>
+            <a:ext cx="988881" cy="300850"/>
+          </a:xfrm>
+          <a:prstGeom prst="line">
+            <a:avLst/>
+          </a:prstGeom>
+          <a:ln w="12700">
+            <a:solidFill>
+              <a:schemeClr val="tx1"/>
+            </a:solidFill>
+          </a:ln>
+        </p:spPr>
+        <p:style>
+          <a:lnRef idx="1">
+            <a:schemeClr val="accent1"/>
+          </a:lnRef>
+          <a:fillRef idx="0">
+            <a:schemeClr val="accent1"/>
+          </a:fillRef>
+          <a:effectRef idx="0">
+            <a:schemeClr val="accent1"/>
+          </a:effectRef>
+          <a:fontRef idx="minor">
+            <a:schemeClr val="tx1"/>
+          </a:fontRef>
+        </p:style>
+      </p:cxnSp>
+      <p:sp>
+        <p:nvSpPr>
+          <p:cNvPr id="45" name="TextBox 44">
+            <a:extLst>
+              <a:ext uri="{FF2B5EF4-FFF2-40B4-BE49-F238E27FC236}">
+                <a16:creationId xmlns:a16="http://schemas.microsoft.com/office/drawing/2014/main" id="{D1002E0D-FFDA-4212-A4C1-D47E37E7FB5C}"/>
+              </a:ext>
+            </a:extLst>
+          </p:cNvPr>
+          <p:cNvSpPr txBox="1"/>
+          <p:nvPr/>
+        </p:nvSpPr>
+        <p:spPr>
+          <a:xfrm>
+            <a:off x="8802618" y="5096123"/>
+            <a:ext cx="677237" cy="276999"/>
+          </a:xfrm>
+          <a:prstGeom prst="rect">
+            <a:avLst/>
+          </a:prstGeom>
+          <a:noFill/>
+        </p:spPr>
+        <p:txBody>
+          <a:bodyPr wrap="none" rtlCol="0">
+            <a:spAutoFit/>
+          </a:bodyPr>
+          <a:lstStyle/>
+          <a:p>
+            <a:r>
+              <a:rPr lang="en-US" sz="1200" dirty="0"/>
+              <a:t>3 wires</a:t>
+            </a:r>
+          </a:p>
+        </p:txBody>
+      </p:sp>
+      <p:sp>
+        <p:nvSpPr>
+          <p:cNvPr id="47" name="Rectangle: Rounded Corners 46">
+            <a:extLst>
+              <a:ext uri="{FF2B5EF4-FFF2-40B4-BE49-F238E27FC236}">
+                <a16:creationId xmlns:a16="http://schemas.microsoft.com/office/drawing/2014/main" id="{3D94BD1C-2593-49F2-BF89-6F318F52CB20}"/>
+              </a:ext>
+            </a:extLst>
+          </p:cNvPr>
+          <p:cNvSpPr/>
+          <p:nvPr/>
+        </p:nvSpPr>
+        <p:spPr>
+          <a:xfrm>
+            <a:off x="8350269" y="4787158"/>
+            <a:ext cx="134315" cy="180926"/>
+          </a:xfrm>
+          <a:prstGeom prst="roundRect">
+            <a:avLst/>
+          </a:prstGeom>
+          <a:solidFill>
+            <a:schemeClr val="bg1"/>
+          </a:solidFill>
+        </p:spPr>
+        <p:style>
+          <a:lnRef idx="2">
+            <a:schemeClr val="accent1">
+              <a:shade val="50000"/>
+            </a:schemeClr>
+          </a:lnRef>
+          <a:fillRef idx="1">
+            <a:schemeClr val="accent1"/>
+          </a:fillRef>
+          <a:effectRef idx="0">
+            <a:schemeClr val="accent1"/>
+          </a:effectRef>
+          <a:fontRef idx="minor">
+            <a:schemeClr val="lt1"/>
+          </a:fontRef>
+        </p:style>
+        <p:txBody>
+          <a:bodyPr rtlCol="0" anchor="ctr"/>
+          <a:lstStyle/>
+          <a:p>
+            <a:pPr algn="ctr"/>
+            <a:endParaRPr lang="en-US"/>
+          </a:p>
+        </p:txBody>
+      </p:sp>
+      <p:sp>
+        <p:nvSpPr>
+          <p:cNvPr id="49" name="Freeform: Shape 48">
+            <a:extLst>
+              <a:ext uri="{FF2B5EF4-FFF2-40B4-BE49-F238E27FC236}">
+                <a16:creationId xmlns:a16="http://schemas.microsoft.com/office/drawing/2014/main" id="{0171344A-A62F-440E-8A13-661F78F244AB}"/>
+              </a:ext>
+            </a:extLst>
+          </p:cNvPr>
+          <p:cNvSpPr/>
+          <p:nvPr/>
+        </p:nvSpPr>
+        <p:spPr>
+          <a:xfrm>
+            <a:off x="6394784" y="3783932"/>
+            <a:ext cx="2033628" cy="1004636"/>
+          </a:xfrm>
+          <a:custGeom>
+            <a:avLst/>
+            <a:gdLst>
+              <a:gd name="connsiteX0" fmla="*/ 2009274 w 2033628"/>
+              <a:gd name="connsiteY0" fmla="*/ 1004636 h 1004636"/>
+              <a:gd name="connsiteX1" fmla="*/ 1750595 w 2033628"/>
+              <a:gd name="connsiteY1" fmla="*/ 348915 h 1004636"/>
+              <a:gd name="connsiteX2" fmla="*/ 0 w 2033628"/>
+              <a:gd name="connsiteY2" fmla="*/ 0 h 1004636"/>
+            </a:gdLst>
+            <a:ahLst/>
+            <a:cxnLst>
+              <a:cxn ang="0">
+                <a:pos x="connsiteX0" y="connsiteY0"/>
+              </a:cxn>
+              <a:cxn ang="0">
+                <a:pos x="connsiteX1" y="connsiteY1"/>
+              </a:cxn>
+              <a:cxn ang="0">
+                <a:pos x="connsiteX2" y="connsiteY2"/>
+              </a:cxn>
+            </a:cxnLst>
+            <a:rect l="l" t="t" r="r" b="b"/>
+            <a:pathLst>
+              <a:path w="2033628" h="1004636">
+                <a:moveTo>
+                  <a:pt x="2009274" y="1004636"/>
+                </a:moveTo>
+                <a:cubicBezTo>
+                  <a:pt x="2047374" y="760495"/>
+                  <a:pt x="2085474" y="516354"/>
+                  <a:pt x="1750595" y="348915"/>
+                </a:cubicBezTo>
+                <a:cubicBezTo>
+                  <a:pt x="1415716" y="181476"/>
+                  <a:pt x="295776" y="60158"/>
+                  <a:pt x="0" y="0"/>
+                </a:cubicBezTo>
+              </a:path>
+            </a:pathLst>
+          </a:custGeom>
+          <a:noFill/>
+          <a:ln w="38100"/>
+        </p:spPr>
+        <p:style>
+          <a:lnRef idx="2">
+            <a:schemeClr val="accent1">
+              <a:shade val="50000"/>
+            </a:schemeClr>
+          </a:lnRef>
+          <a:fillRef idx="1">
+            <a:schemeClr val="accent1"/>
+          </a:fillRef>
+          <a:effectRef idx="0">
+            <a:schemeClr val="accent1"/>
+          </a:effectRef>
+          <a:fontRef idx="minor">
+            <a:schemeClr val="lt1"/>
+          </a:fontRef>
+        </p:style>
+        <p:txBody>
+          <a:bodyPr rtlCol="0" anchor="ctr"/>
+          <a:lstStyle/>
+          <a:p>
+            <a:pPr algn="ctr"/>
+            <a:endParaRPr lang="en-US"/>
+          </a:p>
+        </p:txBody>
+      </p:sp>
+      <p:sp>
+        <p:nvSpPr>
+          <p:cNvPr id="51" name="TextBox 50">
+            <a:extLst>
+              <a:ext uri="{FF2B5EF4-FFF2-40B4-BE49-F238E27FC236}">
+                <a16:creationId xmlns:a16="http://schemas.microsoft.com/office/drawing/2014/main" id="{89EA6A16-A414-41BA-ABBF-74B0C55D2D3C}"/>
+              </a:ext>
+            </a:extLst>
+          </p:cNvPr>
+          <p:cNvSpPr txBox="1"/>
+          <p:nvPr/>
+        </p:nvSpPr>
+        <p:spPr>
+          <a:xfrm>
+            <a:off x="7072979" y="3956310"/>
+            <a:ext cx="478016" cy="276999"/>
+          </a:xfrm>
+          <a:prstGeom prst="rect">
+            <a:avLst/>
+          </a:prstGeom>
+          <a:noFill/>
+        </p:spPr>
+        <p:txBody>
+          <a:bodyPr wrap="none" rtlCol="0">
+            <a:spAutoFit/>
+          </a:bodyPr>
+          <a:lstStyle/>
+          <a:p>
+            <a:r>
+              <a:rPr lang="en-US" sz="1200" dirty="0"/>
+              <a:t>USB</a:t>
+            </a:r>
+          </a:p>
+        </p:txBody>
+      </p:sp>
+      <p:pic>
+        <p:nvPicPr>
+          <p:cNvPr id="1028" name="Picture 4" descr="Image result for free clip art laptop">
+            <a:extLst>
+              <a:ext uri="{FF2B5EF4-FFF2-40B4-BE49-F238E27FC236}">
+                <a16:creationId xmlns:a16="http://schemas.microsoft.com/office/drawing/2014/main" id="{7F60D823-696C-4383-A952-1755FFB2183A}"/>
+              </a:ext>
+            </a:extLst>
+          </p:cNvPr>
+          <p:cNvPicPr>
+            <a:picLocks noChangeAspect="1" noChangeArrowheads="1"/>
+          </p:cNvPicPr>
+          <p:nvPr/>
+        </p:nvPicPr>
+        <p:blipFill>
+          <a:blip r:embed="rId2">
+            <a:extLst>
+              <a:ext uri="{28A0092B-C50C-407E-A947-70E740481C1C}">
+                <a14:useLocalDpi xmlns:a14="http://schemas.microsoft.com/office/drawing/2010/main" val="0"/>
+              </a:ext>
+            </a:extLst>
+          </a:blip>
+          <a:srcRect/>
+          <a:stretch>
+            <a:fillRect/>
+          </a:stretch>
+        </p:blipFill>
+        <p:spPr bwMode="auto">
+          <a:xfrm>
+            <a:off x="5358768" y="2991666"/>
+            <a:ext cx="1314450" cy="1219200"/>
+          </a:xfrm>
+          <a:prstGeom prst="rect">
+            <a:avLst/>
+          </a:prstGeom>
+          <a:noFill/>
+          <a:extLst>
+            <a:ext uri="{909E8E84-426E-40DD-AFC4-6F175D3DCCD1}">
+              <a14:hiddenFill xmlns:a14="http://schemas.microsoft.com/office/drawing/2010/main">
+                <a:solidFill>
+                  <a:srgbClr val="FFFFFF"/>
+                </a:solidFill>
+              </a14:hiddenFill>
+            </a:ext>
+          </a:extLst>
+        </p:spPr>
+      </p:pic>
+      <p:pic>
+        <p:nvPicPr>
+          <p:cNvPr id="1030" name="Picture 6" descr="Bluetooth Speakers, ZoeeTree S1Pro Speaker Bluetooth Wireless with 20W HD Sound &amp; Deep Bass, IPX7 Waterproof Speaker with 36Hours, 100Ft Wireless Range, Portable Speakers for Home, Outdoors, Travel">
+            <a:extLst>
+              <a:ext uri="{FF2B5EF4-FFF2-40B4-BE49-F238E27FC236}">
+                <a16:creationId xmlns:a16="http://schemas.microsoft.com/office/drawing/2014/main" id="{B65D2C01-14EA-4E28-BAF3-C6C76097C604}"/>
+              </a:ext>
+            </a:extLst>
+          </p:cNvPr>
+          <p:cNvPicPr>
+            <a:picLocks noChangeAspect="1" noChangeArrowheads="1"/>
+          </p:cNvPicPr>
+          <p:nvPr/>
+        </p:nvPicPr>
+        <p:blipFill>
+          <a:blip r:embed="rId3">
+            <a:extLst>
+              <a:ext uri="{28A0092B-C50C-407E-A947-70E740481C1C}">
+                <a14:useLocalDpi xmlns:a14="http://schemas.microsoft.com/office/drawing/2010/main" val="0"/>
+              </a:ext>
+            </a:extLst>
+          </a:blip>
+          <a:srcRect/>
+          <a:stretch>
+            <a:fillRect/>
+          </a:stretch>
+        </p:blipFill>
+        <p:spPr bwMode="auto">
+          <a:xfrm>
+            <a:off x="5950234" y="4877621"/>
+            <a:ext cx="833438" cy="833438"/>
+          </a:xfrm>
+          <a:prstGeom prst="rect">
+            <a:avLst/>
+          </a:prstGeom>
+          <a:noFill/>
+          <a:extLst>
+            <a:ext uri="{909E8E84-426E-40DD-AFC4-6F175D3DCCD1}">
+              <a14:hiddenFill xmlns:a14="http://schemas.microsoft.com/office/drawing/2010/main">
+                <a:solidFill>
+                  <a:srgbClr val="FFFFFF"/>
+                </a:solidFill>
+              </a14:hiddenFill>
+            </a:ext>
+          </a:extLst>
+        </p:spPr>
+      </p:pic>
+    </p:spTree>
+    <p:extLst>
+      <p:ext uri="{BB962C8B-B14F-4D97-AF65-F5344CB8AC3E}">
+        <p14:creationId xmlns:p14="http://schemas.microsoft.com/office/powerpoint/2010/main" val="4066749898"/>
       </p:ext>
     </p:extLst>
   </p:cSld>

</xml_diff>

<commit_message>
make one of the Trigger+Red arrows easier to follow
</commit_message>
<xml_diff>
--- a/BuildRubberBandGunSoftware.pptx
+++ b/BuildRubberBandGunSoftware.pptx
@@ -274,7 +274,7 @@
           <a:p>
             <a:fld id="{02AC24A9-CCB6-4F8D-B8DB-C2F3692CFA5A}" type="datetimeFigureOut">
               <a:rPr lang="en-US" smtClean="0"/>
-              <a:t>9/10/2020</a:t>
+              <a:t>9/18/2020</a:t>
             </a:fld>
             <a:endParaRPr lang="en-US" dirty="0"/>
           </a:p>
@@ -644,7 +644,7 @@
           <a:p>
             <a:fld id="{02AC24A9-CCB6-4F8D-B8DB-C2F3692CFA5A}" type="datetimeFigureOut">
               <a:rPr lang="en-US" smtClean="0"/>
-              <a:t>9/10/2020</a:t>
+              <a:t>9/18/2020</a:t>
             </a:fld>
             <a:endParaRPr lang="en-US"/>
           </a:p>
@@ -853,7 +853,7 @@
           <a:p>
             <a:fld id="{02AC24A9-CCB6-4F8D-B8DB-C2F3692CFA5A}" type="datetimeFigureOut">
               <a:rPr lang="en-US" smtClean="0"/>
-              <a:t>9/10/2020</a:t>
+              <a:t>9/18/2020</a:t>
             </a:fld>
             <a:endParaRPr lang="en-US"/>
           </a:p>
@@ -1323,7 +1323,7 @@
           <a:p>
             <a:fld id="{02AC24A9-CCB6-4F8D-B8DB-C2F3692CFA5A}" type="datetimeFigureOut">
               <a:rPr lang="en-US" smtClean="0"/>
-              <a:t>9/10/2020</a:t>
+              <a:t>9/18/2020</a:t>
             </a:fld>
             <a:endParaRPr lang="en-US"/>
           </a:p>
@@ -1777,7 +1777,7 @@
           <a:p>
             <a:fld id="{02AC24A9-CCB6-4F8D-B8DB-C2F3692CFA5A}" type="datetimeFigureOut">
               <a:rPr lang="en-US" smtClean="0"/>
-              <a:t>9/10/2020</a:t>
+              <a:t>9/18/2020</a:t>
             </a:fld>
             <a:endParaRPr lang="en-US"/>
           </a:p>
@@ -2309,7 +2309,7 @@
           <a:p>
             <a:fld id="{02AC24A9-CCB6-4F8D-B8DB-C2F3692CFA5A}" type="datetimeFigureOut">
               <a:rPr lang="en-US" smtClean="0"/>
-              <a:t>9/10/2020</a:t>
+              <a:t>9/18/2020</a:t>
             </a:fld>
             <a:endParaRPr lang="en-US"/>
           </a:p>
@@ -3008,7 +3008,7 @@
           <a:p>
             <a:fld id="{02AC24A9-CCB6-4F8D-B8DB-C2F3692CFA5A}" type="datetimeFigureOut">
               <a:rPr lang="en-US" smtClean="0"/>
-              <a:t>9/10/2020</a:t>
+              <a:t>9/18/2020</a:t>
             </a:fld>
             <a:endParaRPr lang="en-US"/>
           </a:p>
@@ -3337,7 +3337,7 @@
           <a:p>
             <a:fld id="{02AC24A9-CCB6-4F8D-B8DB-C2F3692CFA5A}" type="datetimeFigureOut">
               <a:rPr lang="en-US" smtClean="0"/>
-              <a:t>9/10/2020</a:t>
+              <a:t>9/18/2020</a:t>
             </a:fld>
             <a:endParaRPr lang="en-US"/>
           </a:p>
@@ -3450,7 +3450,7 @@
           <a:p>
             <a:fld id="{02AC24A9-CCB6-4F8D-B8DB-C2F3692CFA5A}" type="datetimeFigureOut">
               <a:rPr lang="en-US" smtClean="0"/>
-              <a:t>9/10/2020</a:t>
+              <a:t>9/18/2020</a:t>
             </a:fld>
             <a:endParaRPr lang="en-US"/>
           </a:p>
@@ -3945,7 +3945,7 @@
           <a:p>
             <a:fld id="{02AC24A9-CCB6-4F8D-B8DB-C2F3692CFA5A}" type="datetimeFigureOut">
               <a:rPr lang="en-US" smtClean="0"/>
-              <a:t>9/10/2020</a:t>
+              <a:t>9/18/2020</a:t>
             </a:fld>
             <a:endParaRPr lang="en-US" dirty="0"/>
           </a:p>
@@ -4422,7 +4422,7 @@
           <a:p>
             <a:fld id="{02AC24A9-CCB6-4F8D-B8DB-C2F3692CFA5A}" type="datetimeFigureOut">
               <a:rPr lang="en-US" smtClean="0"/>
-              <a:t>9/10/2020</a:t>
+              <a:t>9/18/2020</a:t>
             </a:fld>
             <a:endParaRPr lang="en-US"/>
           </a:p>
@@ -4665,7 +4665,7 @@
           <a:p>
             <a:fld id="{02AC24A9-CCB6-4F8D-B8DB-C2F3692CFA5A}" type="datetimeFigureOut">
               <a:rPr lang="en-US" smtClean="0"/>
-              <a:t>9/10/2020</a:t>
+              <a:t>9/18/2020</a:t>
             </a:fld>
             <a:endParaRPr lang="en-US"/>
           </a:p>
@@ -7029,7 +7029,7 @@
         </p:nvSpPr>
         <p:spPr>
           <a:xfrm>
-            <a:off x="8354979" y="3571111"/>
+            <a:off x="7652699" y="3756018"/>
             <a:ext cx="534121" cy="400110"/>
           </a:xfrm>
           <a:prstGeom prst="rect">
@@ -7069,19 +7069,19 @@
           </p:cNvPr>
           <p:cNvCxnSpPr>
             <a:cxnSpLocks/>
-            <a:stCxn id="87" idx="0"/>
             <a:endCxn id="4" idx="0"/>
           </p:cNvCxnSpPr>
           <p:nvPr/>
         </p:nvCxnSpPr>
         <p:spPr>
-          <a:xfrm rot="16200000" flipV="1">
-            <a:off x="4450803" y="-317951"/>
-            <a:ext cx="1030413" cy="7489605"/>
-          </a:xfrm>
-          <a:prstGeom prst="curvedConnector3">
+          <a:xfrm rot="10800000">
+            <a:off x="1221207" y="2911645"/>
+            <a:ext cx="6857983" cy="1226810"/>
+          </a:xfrm>
+          <a:prstGeom prst="curvedConnector4">
             <a:avLst>
-              <a:gd name="adj1" fmla="val 186989"/>
+              <a:gd name="adj1" fmla="val 1096"/>
+              <a:gd name="adj2" fmla="val 169631"/>
             </a:avLst>
           </a:prstGeom>
           <a:ln>

</xml_diff>

<commit_message>
adjust (finally) to swap of Red and Green config buttons
</commit_message>
<xml_diff>
--- a/BuildRubberBandGunSoftware.pptx
+++ b/BuildRubberBandGunSoftware.pptx
@@ -274,7 +274,7 @@
           <a:p>
             <a:fld id="{02AC24A9-CCB6-4F8D-B8DB-C2F3692CFA5A}" type="datetimeFigureOut">
               <a:rPr lang="en-US" smtClean="0"/>
-              <a:t>9/18/2020</a:t>
+              <a:t>9/20/2020</a:t>
             </a:fld>
             <a:endParaRPr lang="en-US" dirty="0"/>
           </a:p>
@@ -644,7 +644,7 @@
           <a:p>
             <a:fld id="{02AC24A9-CCB6-4F8D-B8DB-C2F3692CFA5A}" type="datetimeFigureOut">
               <a:rPr lang="en-US" smtClean="0"/>
-              <a:t>9/18/2020</a:t>
+              <a:t>9/20/2020</a:t>
             </a:fld>
             <a:endParaRPr lang="en-US"/>
           </a:p>
@@ -853,7 +853,7 @@
           <a:p>
             <a:fld id="{02AC24A9-CCB6-4F8D-B8DB-C2F3692CFA5A}" type="datetimeFigureOut">
               <a:rPr lang="en-US" smtClean="0"/>
-              <a:t>9/18/2020</a:t>
+              <a:t>9/20/2020</a:t>
             </a:fld>
             <a:endParaRPr lang="en-US"/>
           </a:p>
@@ -1323,7 +1323,7 @@
           <a:p>
             <a:fld id="{02AC24A9-CCB6-4F8D-B8DB-C2F3692CFA5A}" type="datetimeFigureOut">
               <a:rPr lang="en-US" smtClean="0"/>
-              <a:t>9/18/2020</a:t>
+              <a:t>9/20/2020</a:t>
             </a:fld>
             <a:endParaRPr lang="en-US"/>
           </a:p>
@@ -1777,7 +1777,7 @@
           <a:p>
             <a:fld id="{02AC24A9-CCB6-4F8D-B8DB-C2F3692CFA5A}" type="datetimeFigureOut">
               <a:rPr lang="en-US" smtClean="0"/>
-              <a:t>9/18/2020</a:t>
+              <a:t>9/20/2020</a:t>
             </a:fld>
             <a:endParaRPr lang="en-US"/>
           </a:p>
@@ -2309,7 +2309,7 @@
           <a:p>
             <a:fld id="{02AC24A9-CCB6-4F8D-B8DB-C2F3692CFA5A}" type="datetimeFigureOut">
               <a:rPr lang="en-US" smtClean="0"/>
-              <a:t>9/18/2020</a:t>
+              <a:t>9/20/2020</a:t>
             </a:fld>
             <a:endParaRPr lang="en-US"/>
           </a:p>
@@ -3008,7 +3008,7 @@
           <a:p>
             <a:fld id="{02AC24A9-CCB6-4F8D-B8DB-C2F3692CFA5A}" type="datetimeFigureOut">
               <a:rPr lang="en-US" smtClean="0"/>
-              <a:t>9/18/2020</a:t>
+              <a:t>9/20/2020</a:t>
             </a:fld>
             <a:endParaRPr lang="en-US"/>
           </a:p>
@@ -3337,7 +3337,7 @@
           <a:p>
             <a:fld id="{02AC24A9-CCB6-4F8D-B8DB-C2F3692CFA5A}" type="datetimeFigureOut">
               <a:rPr lang="en-US" smtClean="0"/>
-              <a:t>9/18/2020</a:t>
+              <a:t>9/20/2020</a:t>
             </a:fld>
             <a:endParaRPr lang="en-US"/>
           </a:p>
@@ -3450,7 +3450,7 @@
           <a:p>
             <a:fld id="{02AC24A9-CCB6-4F8D-B8DB-C2F3692CFA5A}" type="datetimeFigureOut">
               <a:rPr lang="en-US" smtClean="0"/>
-              <a:t>9/18/2020</a:t>
+              <a:t>9/20/2020</a:t>
             </a:fld>
             <a:endParaRPr lang="en-US"/>
           </a:p>
@@ -3945,7 +3945,7 @@
           <a:p>
             <a:fld id="{02AC24A9-CCB6-4F8D-B8DB-C2F3692CFA5A}" type="datetimeFigureOut">
               <a:rPr lang="en-US" smtClean="0"/>
-              <a:t>9/18/2020</a:t>
+              <a:t>9/20/2020</a:t>
             </a:fld>
             <a:endParaRPr lang="en-US" dirty="0"/>
           </a:p>
@@ -4422,7 +4422,7 @@
           <a:p>
             <a:fld id="{02AC24A9-CCB6-4F8D-B8DB-C2F3692CFA5A}" type="datetimeFigureOut">
               <a:rPr lang="en-US" smtClean="0"/>
-              <a:t>9/18/2020</a:t>
+              <a:t>9/20/2020</a:t>
             </a:fld>
             <a:endParaRPr lang="en-US"/>
           </a:p>
@@ -4665,7 +4665,7 @@
           <a:p>
             <a:fld id="{02AC24A9-CCB6-4F8D-B8DB-C2F3692CFA5A}" type="datetimeFigureOut">
               <a:rPr lang="en-US" smtClean="0"/>
-              <a:t>9/18/2020</a:t>
+              <a:t>9/20/2020</a:t>
             </a:fld>
             <a:endParaRPr lang="en-US"/>
           </a:p>
@@ -5242,6 +5242,41 @@
           </a:prstGeom>
         </p:spPr>
       </p:pic>
+      <p:sp>
+        <p:nvSpPr>
+          <p:cNvPr id="5" name="TextBox 4">
+            <a:extLst>
+              <a:ext uri="{FF2B5EF4-FFF2-40B4-BE49-F238E27FC236}">
+                <a16:creationId xmlns:a16="http://schemas.microsoft.com/office/drawing/2014/main" id="{924C25B1-C004-4F15-828D-FBB1BD0E3CB0}"/>
+              </a:ext>
+            </a:extLst>
+          </p:cNvPr>
+          <p:cNvSpPr txBox="1"/>
+          <p:nvPr/>
+        </p:nvSpPr>
+        <p:spPr>
+          <a:xfrm>
+            <a:off x="856209" y="1718697"/>
+            <a:ext cx="1588897" cy="369332"/>
+          </a:xfrm>
+          <a:prstGeom prst="rect">
+            <a:avLst/>
+          </a:prstGeom>
+          <a:noFill/>
+        </p:spPr>
+        <p:txBody>
+          <a:bodyPr wrap="none" rtlCol="0">
+            <a:spAutoFit/>
+          </a:bodyPr>
+          <a:lstStyle/>
+          <a:p>
+            <a:r>
+              <a:rPr lang="en-US" dirty="0"/>
+              <a:t>20 Sept 2020</a:t>
+            </a:r>
+          </a:p>
+        </p:txBody>
+      </p:sp>
     </p:spTree>
     <p:extLst>
       <p:ext uri="{BB962C8B-B14F-4D97-AF65-F5344CB8AC3E}">
@@ -5696,8 +5731,8 @@
         </p:nvSpPr>
         <p:spPr>
           <a:xfrm>
-            <a:off x="3382674" y="4074221"/>
-            <a:ext cx="526106" cy="400110"/>
+            <a:off x="3393895" y="4074221"/>
+            <a:ext cx="503664" cy="400110"/>
           </a:xfrm>
           <a:prstGeom prst="rect">
             <a:avLst/>
@@ -5720,7 +5755,7 @@
             <a:pPr algn="ctr"/>
             <a:r>
               <a:rPr lang="en-US" sz="1000" dirty="0"/>
-              <a:t>+ G/Y</a:t>
+              <a:t>+ R/Y</a:t>
             </a:r>
           </a:p>
         </p:txBody>
@@ -6197,8 +6232,8 @@
         </p:nvSpPr>
         <p:spPr>
           <a:xfrm>
-            <a:off x="4060437" y="5474022"/>
-            <a:ext cx="534121" cy="400110"/>
+            <a:off x="3993111" y="5474022"/>
+            <a:ext cx="668773" cy="400110"/>
           </a:xfrm>
           <a:prstGeom prst="rect">
             <a:avLst/>
@@ -6221,7 +6256,7 @@
             <a:pPr algn="ctr"/>
             <a:r>
               <a:rPr lang="en-US" sz="1000" dirty="0"/>
-              <a:t>+ Red</a:t>
+              <a:t>+ Green</a:t>
             </a:r>
           </a:p>
         </p:txBody>
@@ -6286,7 +6321,7 @@
         <p:spPr>
           <a:xfrm>
             <a:off x="5788806" y="2205127"/>
-            <a:ext cx="534121" cy="400110"/>
+            <a:ext cx="609071" cy="553998"/>
           </a:xfrm>
           <a:prstGeom prst="rect">
             <a:avLst/>
@@ -6309,7 +6344,7 @@
             <a:pPr algn="ctr"/>
             <a:r>
               <a:rPr lang="en-US" sz="1000" dirty="0"/>
-              <a:t>+ Red</a:t>
+              <a:t>+ Green</a:t>
             </a:r>
           </a:p>
         </p:txBody>
@@ -6418,8 +6453,8 @@
         </p:nvSpPr>
         <p:spPr>
           <a:xfrm>
-            <a:off x="6168804" y="3463740"/>
-            <a:ext cx="534121" cy="400110"/>
+            <a:off x="6116594" y="3463740"/>
+            <a:ext cx="586332" cy="553998"/>
           </a:xfrm>
           <a:prstGeom prst="rect">
             <a:avLst/>
@@ -6442,7 +6477,7 @@
             <a:pPr algn="ctr"/>
             <a:r>
               <a:rPr lang="en-US" sz="1000" dirty="0"/>
-              <a:t>+ Red</a:t>
+              <a:t>+ Green</a:t>
             </a:r>
           </a:p>
         </p:txBody>
@@ -6461,8 +6496,8 @@
         </p:nvSpPr>
         <p:spPr>
           <a:xfrm>
-            <a:off x="6041902" y="6237018"/>
-            <a:ext cx="534121" cy="400110"/>
+            <a:off x="5926708" y="6107211"/>
+            <a:ext cx="661023" cy="553998"/>
           </a:xfrm>
           <a:prstGeom prst="rect">
             <a:avLst/>
@@ -6485,7 +6520,7 @@
             <a:pPr algn="ctr"/>
             <a:r>
               <a:rPr lang="en-US" sz="1000" dirty="0"/>
-              <a:t>+ Red</a:t>
+              <a:t>+ Green</a:t>
             </a:r>
           </a:p>
         </p:txBody>
@@ -6550,7 +6585,7 @@
         <p:spPr>
           <a:xfrm>
             <a:off x="7912850" y="2176320"/>
-            <a:ext cx="534121" cy="400110"/>
+            <a:ext cx="609071" cy="553998"/>
           </a:xfrm>
           <a:prstGeom prst="rect">
             <a:avLst/>
@@ -6573,7 +6608,7 @@
             <a:pPr algn="ctr"/>
             <a:r>
               <a:rPr lang="en-US" sz="1000" dirty="0"/>
-              <a:t>+ Red</a:t>
+              <a:t>+ Green</a:t>
             </a:r>
           </a:p>
         </p:txBody>
@@ -6637,8 +6672,8 @@
         </p:nvSpPr>
         <p:spPr>
           <a:xfrm>
-            <a:off x="5127098" y="4138455"/>
-            <a:ext cx="526106" cy="400110"/>
+            <a:off x="5138319" y="4138455"/>
+            <a:ext cx="503664" cy="400110"/>
           </a:xfrm>
           <a:prstGeom prst="rect">
             <a:avLst/>
@@ -6661,7 +6696,7 @@
             <a:pPr algn="ctr"/>
             <a:r>
               <a:rPr lang="en-US" sz="1000" dirty="0"/>
-              <a:t>+ G/Y</a:t>
+              <a:t>+ R/Y</a:t>
             </a:r>
           </a:p>
         </p:txBody>
@@ -6680,8 +6715,8 @@
         </p:nvSpPr>
         <p:spPr>
           <a:xfrm>
-            <a:off x="5485008" y="4815910"/>
-            <a:ext cx="526106" cy="400110"/>
+            <a:off x="5496229" y="4815910"/>
+            <a:ext cx="503664" cy="400110"/>
           </a:xfrm>
           <a:prstGeom prst="rect">
             <a:avLst/>
@@ -6704,7 +6739,7 @@
             <a:pPr algn="ctr"/>
             <a:r>
               <a:rPr lang="en-US" sz="1000" dirty="0"/>
-              <a:t>+ G/Y</a:t>
+              <a:t>+ R/Y</a:t>
             </a:r>
           </a:p>
         </p:txBody>
@@ -6723,8 +6758,8 @@
         </p:nvSpPr>
         <p:spPr>
           <a:xfrm>
-            <a:off x="5322172" y="5478764"/>
-            <a:ext cx="526106" cy="400110"/>
+            <a:off x="5333393" y="5478764"/>
+            <a:ext cx="503664" cy="400110"/>
           </a:xfrm>
           <a:prstGeom prst="rect">
             <a:avLst/>
@@ -6747,7 +6782,7 @@
             <a:pPr algn="ctr"/>
             <a:r>
               <a:rPr lang="en-US" sz="1000" dirty="0"/>
-              <a:t>+ G/Y</a:t>
+              <a:t>+ R/Y</a:t>
             </a:r>
           </a:p>
         </p:txBody>
@@ -7029,8 +7064,8 @@
         </p:nvSpPr>
         <p:spPr>
           <a:xfrm>
-            <a:off x="7652699" y="3756018"/>
-            <a:ext cx="534121" cy="400110"/>
+            <a:off x="7745407" y="3623008"/>
+            <a:ext cx="570724" cy="553998"/>
           </a:xfrm>
           <a:prstGeom prst="rect">
             <a:avLst/>
@@ -7053,7 +7088,7 @@
             <a:pPr algn="ctr"/>
             <a:r>
               <a:rPr lang="en-US" sz="1000" dirty="0"/>
-              <a:t>+ Red</a:t>
+              <a:t>+ Green</a:t>
             </a:r>
           </a:p>
         </p:txBody>
@@ -7117,8 +7152,8 @@
         </p:nvSpPr>
         <p:spPr>
           <a:xfrm>
-            <a:off x="9259871" y="2763320"/>
-            <a:ext cx="526106" cy="400110"/>
+            <a:off x="9271092" y="2763320"/>
+            <a:ext cx="503664" cy="400110"/>
           </a:xfrm>
           <a:prstGeom prst="rect">
             <a:avLst/>
@@ -7141,7 +7176,7 @@
             <a:pPr algn="ctr"/>
             <a:r>
               <a:rPr lang="en-US" sz="1000" dirty="0"/>
-              <a:t>+ G/Y</a:t>
+              <a:t>+ R/Y</a:t>
             </a:r>
           </a:p>
         </p:txBody>
@@ -7160,8 +7195,8 @@
         </p:nvSpPr>
         <p:spPr>
           <a:xfrm>
-            <a:off x="9404740" y="4138455"/>
-            <a:ext cx="526106" cy="400110"/>
+            <a:off x="9415961" y="4138455"/>
+            <a:ext cx="503664" cy="400110"/>
           </a:xfrm>
           <a:prstGeom prst="rect">
             <a:avLst/>
@@ -7184,7 +7219,7 @@
             <a:pPr algn="ctr"/>
             <a:r>
               <a:rPr lang="en-US" sz="1000" dirty="0"/>
-              <a:t>+ G/Y</a:t>
+              <a:t>+ R/Y</a:t>
             </a:r>
           </a:p>
         </p:txBody>
@@ -7203,8 +7238,8 @@
         </p:nvSpPr>
         <p:spPr>
           <a:xfrm>
-            <a:off x="9419185" y="5513590"/>
-            <a:ext cx="526106" cy="400110"/>
+            <a:off x="9430406" y="5513590"/>
+            <a:ext cx="503664" cy="400110"/>
           </a:xfrm>
           <a:prstGeom prst="rect">
             <a:avLst/>
@@ -7227,7 +7262,7 @@
             <a:pPr algn="ctr"/>
             <a:r>
               <a:rPr lang="en-US" sz="1000" dirty="0"/>
-              <a:t>+ G/Y</a:t>
+              <a:t>+ R/Y</a:t>
             </a:r>
           </a:p>
         </p:txBody>
@@ -7246,8 +7281,8 @@
         </p:nvSpPr>
         <p:spPr>
           <a:xfrm>
-            <a:off x="8079189" y="6210143"/>
-            <a:ext cx="534121" cy="400110"/>
+            <a:off x="8023127" y="6175613"/>
+            <a:ext cx="631623" cy="553998"/>
           </a:xfrm>
           <a:prstGeom prst="rect">
             <a:avLst/>
@@ -7270,7 +7305,7 @@
             <a:pPr algn="ctr"/>
             <a:r>
               <a:rPr lang="en-US" sz="1000" dirty="0"/>
-              <a:t>+ Red</a:t>
+              <a:t>+ Green</a:t>
             </a:r>
           </a:p>
         </p:txBody>

</xml_diff>

<commit_message>
more info on old or new Arduino Nano bootloader
</commit_message>
<xml_diff>
--- a/BuildRubberBandGunSoftware.pptx
+++ b/BuildRubberBandGunSoftware.pptx
@@ -274,7 +274,7 @@
           <a:p>
             <a:fld id="{02AC24A9-CCB6-4F8D-B8DB-C2F3692CFA5A}" type="datetimeFigureOut">
               <a:rPr lang="en-US" smtClean="0"/>
-              <a:t>9/20/2020</a:t>
+              <a:t>10/24/2020</a:t>
             </a:fld>
             <a:endParaRPr lang="en-US" dirty="0"/>
           </a:p>
@@ -644,7 +644,7 @@
           <a:p>
             <a:fld id="{02AC24A9-CCB6-4F8D-B8DB-C2F3692CFA5A}" type="datetimeFigureOut">
               <a:rPr lang="en-US" smtClean="0"/>
-              <a:t>9/20/2020</a:t>
+              <a:t>10/24/2020</a:t>
             </a:fld>
             <a:endParaRPr lang="en-US"/>
           </a:p>
@@ -853,7 +853,7 @@
           <a:p>
             <a:fld id="{02AC24A9-CCB6-4F8D-B8DB-C2F3692CFA5A}" type="datetimeFigureOut">
               <a:rPr lang="en-US" smtClean="0"/>
-              <a:t>9/20/2020</a:t>
+              <a:t>10/24/2020</a:t>
             </a:fld>
             <a:endParaRPr lang="en-US"/>
           </a:p>
@@ -1323,7 +1323,7 @@
           <a:p>
             <a:fld id="{02AC24A9-CCB6-4F8D-B8DB-C2F3692CFA5A}" type="datetimeFigureOut">
               <a:rPr lang="en-US" smtClean="0"/>
-              <a:t>9/20/2020</a:t>
+              <a:t>10/24/2020</a:t>
             </a:fld>
             <a:endParaRPr lang="en-US"/>
           </a:p>
@@ -1777,7 +1777,7 @@
           <a:p>
             <a:fld id="{02AC24A9-CCB6-4F8D-B8DB-C2F3692CFA5A}" type="datetimeFigureOut">
               <a:rPr lang="en-US" smtClean="0"/>
-              <a:t>9/20/2020</a:t>
+              <a:t>10/24/2020</a:t>
             </a:fld>
             <a:endParaRPr lang="en-US"/>
           </a:p>
@@ -2309,7 +2309,7 @@
           <a:p>
             <a:fld id="{02AC24A9-CCB6-4F8D-B8DB-C2F3692CFA5A}" type="datetimeFigureOut">
               <a:rPr lang="en-US" smtClean="0"/>
-              <a:t>9/20/2020</a:t>
+              <a:t>10/24/2020</a:t>
             </a:fld>
             <a:endParaRPr lang="en-US"/>
           </a:p>
@@ -3008,7 +3008,7 @@
           <a:p>
             <a:fld id="{02AC24A9-CCB6-4F8D-B8DB-C2F3692CFA5A}" type="datetimeFigureOut">
               <a:rPr lang="en-US" smtClean="0"/>
-              <a:t>9/20/2020</a:t>
+              <a:t>10/24/2020</a:t>
             </a:fld>
             <a:endParaRPr lang="en-US"/>
           </a:p>
@@ -3337,7 +3337,7 @@
           <a:p>
             <a:fld id="{02AC24A9-CCB6-4F8D-B8DB-C2F3692CFA5A}" type="datetimeFigureOut">
               <a:rPr lang="en-US" smtClean="0"/>
-              <a:t>9/20/2020</a:t>
+              <a:t>10/24/2020</a:t>
             </a:fld>
             <a:endParaRPr lang="en-US"/>
           </a:p>
@@ -3450,7 +3450,7 @@
           <a:p>
             <a:fld id="{02AC24A9-CCB6-4F8D-B8DB-C2F3692CFA5A}" type="datetimeFigureOut">
               <a:rPr lang="en-US" smtClean="0"/>
-              <a:t>9/20/2020</a:t>
+              <a:t>10/24/2020</a:t>
             </a:fld>
             <a:endParaRPr lang="en-US"/>
           </a:p>
@@ -3945,7 +3945,7 @@
           <a:p>
             <a:fld id="{02AC24A9-CCB6-4F8D-B8DB-C2F3692CFA5A}" type="datetimeFigureOut">
               <a:rPr lang="en-US" smtClean="0"/>
-              <a:t>9/20/2020</a:t>
+              <a:t>10/24/2020</a:t>
             </a:fld>
             <a:endParaRPr lang="en-US" dirty="0"/>
           </a:p>
@@ -4422,7 +4422,7 @@
           <a:p>
             <a:fld id="{02AC24A9-CCB6-4F8D-B8DB-C2F3692CFA5A}" type="datetimeFigureOut">
               <a:rPr lang="en-US" smtClean="0"/>
-              <a:t>9/20/2020</a:t>
+              <a:t>10/24/2020</a:t>
             </a:fld>
             <a:endParaRPr lang="en-US"/>
           </a:p>
@@ -4665,7 +4665,7 @@
           <a:p>
             <a:fld id="{02AC24A9-CCB6-4F8D-B8DB-C2F3692CFA5A}" type="datetimeFigureOut">
               <a:rPr lang="en-US" smtClean="0"/>
-              <a:t>9/20/2020</a:t>
+              <a:t>10/24/2020</a:t>
             </a:fld>
             <a:endParaRPr lang="en-US"/>
           </a:p>
@@ -5257,7 +5257,7 @@
         <p:spPr>
           <a:xfrm>
             <a:off x="856209" y="1718697"/>
-            <a:ext cx="1588897" cy="369332"/>
+            <a:ext cx="1492716" cy="369332"/>
           </a:xfrm>
           <a:prstGeom prst="rect">
             <a:avLst/>
@@ -5271,8 +5271,12 @@
           <a:lstStyle/>
           <a:p>
             <a:r>
-              <a:rPr lang="en-US" dirty="0"/>
-              <a:t>20 Sept 2020</a:t>
+              <a:rPr lang="en-US"/>
+              <a:t>24 Oct </a:t>
+            </a:r>
+            <a:r>
+              <a:rPr lang="en-US" dirty="0"/>
+              <a:t>2020</a:t>
             </a:r>
           </a:p>
         </p:txBody>
@@ -10269,6 +10273,177 @@
           </a:extLst>
         </p:spPr>
       </p:pic>
+      <p:sp>
+        <p:nvSpPr>
+          <p:cNvPr id="4" name="TextBox 3">
+            <a:extLst>
+              <a:ext uri="{FF2B5EF4-FFF2-40B4-BE49-F238E27FC236}">
+                <a16:creationId xmlns:a16="http://schemas.microsoft.com/office/drawing/2014/main" id="{D58BAF05-2AF5-4DAA-B15D-9F9B112C9F2E}"/>
+              </a:ext>
+            </a:extLst>
+          </p:cNvPr>
+          <p:cNvSpPr txBox="1"/>
+          <p:nvPr/>
+        </p:nvSpPr>
+        <p:spPr>
+          <a:xfrm>
+            <a:off x="6199632" y="3560124"/>
+            <a:ext cx="5877573" cy="3139321"/>
+          </a:xfrm>
+          <a:prstGeom prst="rect">
+            <a:avLst/>
+          </a:prstGeom>
+          <a:noFill/>
+        </p:spPr>
+        <p:txBody>
+          <a:bodyPr wrap="square" rtlCol="0">
+            <a:spAutoFit/>
+          </a:bodyPr>
+          <a:lstStyle/>
+          <a:p>
+            <a:pPr algn="l">
+              <a:buFont typeface="+mj-lt"/>
+              <a:buAutoNum type="arabicPeriod"/>
+            </a:pPr>
+            <a:r>
+              <a:rPr lang="en-US" b="0" i="0" dirty="0">
+                <a:solidFill>
+                  <a:srgbClr val="333333"/>
+                </a:solidFill>
+                <a:effectLst/>
+                <a:latin typeface="-apple-system"/>
+              </a:rPr>
+              <a:t>If your Arduino NANO was purchased earlier than 2018 you have the older official version of Nano. In this case Select </a:t>
+            </a:r>
+            <a:r>
+              <a:rPr lang="en-US" b="0" i="1" dirty="0">
+                <a:solidFill>
+                  <a:srgbClr val="333333"/>
+                </a:solidFill>
+                <a:effectLst/>
+                <a:latin typeface="-apple-system"/>
+              </a:rPr>
+              <a:t>Tools &gt; Processor &gt; ATmega328P</a:t>
+            </a:r>
+            <a:r>
+              <a:rPr lang="en-US" b="0" i="0" dirty="0">
+                <a:solidFill>
+                  <a:srgbClr val="333333"/>
+                </a:solidFill>
+                <a:effectLst/>
+                <a:latin typeface="-apple-system"/>
+              </a:rPr>
+              <a:t> and select: </a:t>
+            </a:r>
+            <a:r>
+              <a:rPr lang="en-US" b="1" i="0" dirty="0">
+                <a:solidFill>
+                  <a:srgbClr val="333333"/>
+                </a:solidFill>
+                <a:effectLst/>
+                <a:latin typeface="-apple-system"/>
+              </a:rPr>
+              <a:t>(Old Bootloader)</a:t>
+            </a:r>
+            <a:r>
+              <a:rPr lang="en-US" b="0" i="0" dirty="0">
+                <a:solidFill>
+                  <a:srgbClr val="333333"/>
+                </a:solidFill>
+                <a:effectLst/>
+                <a:latin typeface="-apple-system"/>
+              </a:rPr>
+              <a:t> and try to compile your sketch again. It is also recommended to update Arduino AVR Core 1.16.21 or later through Boards Manager.</a:t>
+            </a:r>
+          </a:p>
+          <a:p>
+            <a:pPr algn="l">
+              <a:buFont typeface="+mj-lt"/>
+              <a:buAutoNum type="arabicPeriod"/>
+            </a:pPr>
+            <a:r>
+              <a:rPr lang="en-US" b="0" i="0" dirty="0">
+                <a:solidFill>
+                  <a:srgbClr val="333333"/>
+                </a:solidFill>
+                <a:effectLst/>
+                <a:latin typeface="-apple-system"/>
+              </a:rPr>
+              <a:t>If you have the newer version of the Nano board (manufactured in 2018 or later), make sure you have </a:t>
+            </a:r>
+            <a:r>
+              <a:rPr lang="en-US" b="1" i="0" dirty="0">
+                <a:solidFill>
+                  <a:srgbClr val="333333"/>
+                </a:solidFill>
+                <a:effectLst/>
+                <a:latin typeface="-apple-system"/>
+              </a:rPr>
+              <a:t>Arduino AVR Boards 1.6.21</a:t>
+            </a:r>
+            <a:r>
+              <a:rPr lang="en-US" b="0" i="0" dirty="0">
+                <a:solidFill>
+                  <a:srgbClr val="333333"/>
+                </a:solidFill>
+                <a:effectLst/>
+                <a:latin typeface="-apple-system"/>
+              </a:rPr>
+              <a:t> or newer installed. Check this in Arduino IDE: </a:t>
+            </a:r>
+            <a:r>
+              <a:rPr lang="en-US" b="0" i="1" dirty="0">
+                <a:solidFill>
+                  <a:srgbClr val="333333"/>
+                </a:solidFill>
+                <a:effectLst/>
+                <a:latin typeface="-apple-system"/>
+              </a:rPr>
+              <a:t>Tools &gt; Board &gt; Boards Manager</a:t>
+            </a:r>
+            <a:r>
+              <a:rPr lang="en-US" b="0" i="0" dirty="0">
+                <a:solidFill>
+                  <a:srgbClr val="333333"/>
+                </a:solidFill>
+                <a:effectLst/>
+                <a:latin typeface="-apple-system"/>
+              </a:rPr>
+              <a:t> and select </a:t>
+            </a:r>
+            <a:r>
+              <a:rPr lang="en-US" b="0" i="1" dirty="0">
+                <a:solidFill>
+                  <a:srgbClr val="333333"/>
+                </a:solidFill>
+                <a:effectLst/>
+                <a:latin typeface="-apple-system"/>
+              </a:rPr>
+              <a:t>Tools &gt; Processor &gt; </a:t>
+            </a:r>
+            <a:r>
+              <a:rPr lang="en-US" b="1" i="1" dirty="0">
+                <a:solidFill>
+                  <a:srgbClr val="333333"/>
+                </a:solidFill>
+                <a:effectLst/>
+                <a:latin typeface="-apple-system"/>
+              </a:rPr>
+              <a:t>ATmega328P</a:t>
+            </a:r>
+            <a:r>
+              <a:rPr lang="en-US" b="0" i="0" dirty="0">
+                <a:solidFill>
+                  <a:srgbClr val="333333"/>
+                </a:solidFill>
+                <a:effectLst/>
+                <a:latin typeface="-apple-system"/>
+              </a:rPr>
+              <a:t>.</a:t>
+            </a:r>
+          </a:p>
+        </p:txBody>
+      </p:sp>
     </p:spTree>
     <p:extLst>
       <p:ext uri="{BB962C8B-B14F-4D97-AF65-F5344CB8AC3E}">

</xml_diff>

<commit_message>
be consistent use #define LCM least common multiple
</commit_message>
<xml_diff>
--- a/BuildRubberBandGunSoftware.pptx
+++ b/BuildRubberBandGunSoftware.pptx
@@ -274,7 +274,7 @@
           <a:p>
             <a:fld id="{02AC24A9-CCB6-4F8D-B8DB-C2F3692CFA5A}" type="datetimeFigureOut">
               <a:rPr lang="en-US" smtClean="0"/>
-              <a:t>10/24/2020</a:t>
+              <a:t>10/25/2020</a:t>
             </a:fld>
             <a:endParaRPr lang="en-US" dirty="0"/>
           </a:p>
@@ -644,7 +644,7 @@
           <a:p>
             <a:fld id="{02AC24A9-CCB6-4F8D-B8DB-C2F3692CFA5A}" type="datetimeFigureOut">
               <a:rPr lang="en-US" smtClean="0"/>
-              <a:t>10/24/2020</a:t>
+              <a:t>10/25/2020</a:t>
             </a:fld>
             <a:endParaRPr lang="en-US"/>
           </a:p>
@@ -853,7 +853,7 @@
           <a:p>
             <a:fld id="{02AC24A9-CCB6-4F8D-B8DB-C2F3692CFA5A}" type="datetimeFigureOut">
               <a:rPr lang="en-US" smtClean="0"/>
-              <a:t>10/24/2020</a:t>
+              <a:t>10/25/2020</a:t>
             </a:fld>
             <a:endParaRPr lang="en-US"/>
           </a:p>
@@ -1323,7 +1323,7 @@
           <a:p>
             <a:fld id="{02AC24A9-CCB6-4F8D-B8DB-C2F3692CFA5A}" type="datetimeFigureOut">
               <a:rPr lang="en-US" smtClean="0"/>
-              <a:t>10/24/2020</a:t>
+              <a:t>10/25/2020</a:t>
             </a:fld>
             <a:endParaRPr lang="en-US"/>
           </a:p>
@@ -1777,7 +1777,7 @@
           <a:p>
             <a:fld id="{02AC24A9-CCB6-4F8D-B8DB-C2F3692CFA5A}" type="datetimeFigureOut">
               <a:rPr lang="en-US" smtClean="0"/>
-              <a:t>10/24/2020</a:t>
+              <a:t>10/25/2020</a:t>
             </a:fld>
             <a:endParaRPr lang="en-US"/>
           </a:p>
@@ -2309,7 +2309,7 @@
           <a:p>
             <a:fld id="{02AC24A9-CCB6-4F8D-B8DB-C2F3692CFA5A}" type="datetimeFigureOut">
               <a:rPr lang="en-US" smtClean="0"/>
-              <a:t>10/24/2020</a:t>
+              <a:t>10/25/2020</a:t>
             </a:fld>
             <a:endParaRPr lang="en-US"/>
           </a:p>
@@ -3008,7 +3008,7 @@
           <a:p>
             <a:fld id="{02AC24A9-CCB6-4F8D-B8DB-C2F3692CFA5A}" type="datetimeFigureOut">
               <a:rPr lang="en-US" smtClean="0"/>
-              <a:t>10/24/2020</a:t>
+              <a:t>10/25/2020</a:t>
             </a:fld>
             <a:endParaRPr lang="en-US"/>
           </a:p>
@@ -3337,7 +3337,7 @@
           <a:p>
             <a:fld id="{02AC24A9-CCB6-4F8D-B8DB-C2F3692CFA5A}" type="datetimeFigureOut">
               <a:rPr lang="en-US" smtClean="0"/>
-              <a:t>10/24/2020</a:t>
+              <a:t>10/25/2020</a:t>
             </a:fld>
             <a:endParaRPr lang="en-US"/>
           </a:p>
@@ -3450,7 +3450,7 @@
           <a:p>
             <a:fld id="{02AC24A9-CCB6-4F8D-B8DB-C2F3692CFA5A}" type="datetimeFigureOut">
               <a:rPr lang="en-US" smtClean="0"/>
-              <a:t>10/24/2020</a:t>
+              <a:t>10/25/2020</a:t>
             </a:fld>
             <a:endParaRPr lang="en-US"/>
           </a:p>
@@ -3945,7 +3945,7 @@
           <a:p>
             <a:fld id="{02AC24A9-CCB6-4F8D-B8DB-C2F3692CFA5A}" type="datetimeFigureOut">
               <a:rPr lang="en-US" smtClean="0"/>
-              <a:t>10/24/2020</a:t>
+              <a:t>10/25/2020</a:t>
             </a:fld>
             <a:endParaRPr lang="en-US" dirty="0"/>
           </a:p>
@@ -4422,7 +4422,7 @@
           <a:p>
             <a:fld id="{02AC24A9-CCB6-4F8D-B8DB-C2F3692CFA5A}" type="datetimeFigureOut">
               <a:rPr lang="en-US" smtClean="0"/>
-              <a:t>10/24/2020</a:t>
+              <a:t>10/25/2020</a:t>
             </a:fld>
             <a:endParaRPr lang="en-US"/>
           </a:p>
@@ -4665,7 +4665,7 @@
           <a:p>
             <a:fld id="{02AC24A9-CCB6-4F8D-B8DB-C2F3692CFA5A}" type="datetimeFigureOut">
               <a:rPr lang="en-US" smtClean="0"/>
-              <a:t>10/24/2020</a:t>
+              <a:t>10/25/2020</a:t>
             </a:fld>
             <a:endParaRPr lang="en-US"/>
           </a:p>
@@ -10440,6 +10440,84 @@
                 <a:latin typeface="-apple-system"/>
               </a:rPr>
               <a:t>.</a:t>
+            </a:r>
+          </a:p>
+        </p:txBody>
+      </p:sp>
+      <p:sp>
+        <p:nvSpPr>
+          <p:cNvPr id="6" name="TextBox 5">
+            <a:extLst>
+              <a:ext uri="{FF2B5EF4-FFF2-40B4-BE49-F238E27FC236}">
+                <a16:creationId xmlns:a16="http://schemas.microsoft.com/office/drawing/2014/main" id="{BF259E93-1987-46E4-B621-FADC6CDD2616}"/>
+              </a:ext>
+            </a:extLst>
+          </p:cNvPr>
+          <p:cNvSpPr txBox="1"/>
+          <p:nvPr/>
+        </p:nvSpPr>
+        <p:spPr>
+          <a:xfrm>
+            <a:off x="5320146" y="2163556"/>
+            <a:ext cx="6462025" cy="369332"/>
+          </a:xfrm>
+          <a:prstGeom prst="rect">
+            <a:avLst/>
+          </a:prstGeom>
+          <a:noFill/>
+        </p:spPr>
+        <p:txBody>
+          <a:bodyPr wrap="none" rtlCol="0">
+            <a:spAutoFit/>
+          </a:bodyPr>
+          <a:lstStyle/>
+          <a:p>
+            <a:r>
+              <a:rPr lang="en-US" sz="900" dirty="0">
+                <a:latin typeface="Arial" panose="020B0604020202020204" pitchFamily="34" charset="0"/>
+                <a:cs typeface="Arial" panose="020B0604020202020204" pitchFamily="34" charset="0"/>
+                <a:hlinkClick r:id="rId3"/>
+              </a:rPr>
+              <a:t>https://support.arduino.cc/hc/en-us/articles/360016785580-Error-avrdude-stk500-getsync-attempt-X-of-10-not-in-sync-resp-</a:t>
+            </a:r>
+            <a:endParaRPr lang="en-US" sz="900" dirty="0">
+              <a:latin typeface="Arial" panose="020B0604020202020204" pitchFamily="34" charset="0"/>
+              <a:cs typeface="Arial" panose="020B0604020202020204" pitchFamily="34" charset="0"/>
+            </a:endParaRPr>
+          </a:p>
+          <a:p>
+            <a:r>
+              <a:rPr lang="en-US" sz="900" b="0" i="0" dirty="0">
+                <a:solidFill>
+                  <a:srgbClr val="333333"/>
+                </a:solidFill>
+                <a:effectLst/>
+                <a:latin typeface="Arial" panose="020B0604020202020204" pitchFamily="34" charset="0"/>
+                <a:cs typeface="Arial" panose="020B0604020202020204" pitchFamily="34" charset="0"/>
+              </a:rPr>
+              <a:t>Error: </a:t>
+            </a:r>
+            <a:r>
+              <a:rPr lang="en-US" sz="900" b="0" i="0" dirty="0" err="1">
+                <a:solidFill>
+                  <a:srgbClr val="333333"/>
+                </a:solidFill>
+                <a:effectLst/>
+                <a:latin typeface="Arial" panose="020B0604020202020204" pitchFamily="34" charset="0"/>
+                <a:cs typeface="Arial" panose="020B0604020202020204" pitchFamily="34" charset="0"/>
+              </a:rPr>
+              <a:t>avrdude</a:t>
+            </a:r>
+            <a:r>
+              <a:rPr lang="en-US" sz="900" b="0" i="0" dirty="0">
+                <a:solidFill>
+                  <a:srgbClr val="333333"/>
+                </a:solidFill>
+                <a:effectLst/>
+                <a:latin typeface="Arial" panose="020B0604020202020204" pitchFamily="34" charset="0"/>
+                <a:cs typeface="Arial" panose="020B0604020202020204" pitchFamily="34" charset="0"/>
+              </a:rPr>
+              <a:t>: stk500_getsync() attempt X of 10: not in sync: resp=</a:t>
             </a:r>
           </a:p>
         </p:txBody>

</xml_diff>

<commit_message>
update docs a bit
</commit_message>
<xml_diff>
--- a/BuildRubberBandGunSoftware.pptx
+++ b/BuildRubberBandGunSoftware.pptx
@@ -11,7 +11,8 @@
     <p:sldId id="259" r:id="rId5"/>
     <p:sldId id="261" r:id="rId6"/>
     <p:sldId id="263" r:id="rId7"/>
-    <p:sldId id="265" r:id="rId8"/>
+    <p:sldId id="266" r:id="rId8"/>
+    <p:sldId id="265" r:id="rId9"/>
   </p:sldIdLst>
   <p:sldSz cx="12192000" cy="6858000"/>
   <p:notesSz cx="7315200" cy="9601200"/>
@@ -274,7 +275,7 @@
           <a:p>
             <a:fld id="{02AC24A9-CCB6-4F8D-B8DB-C2F3692CFA5A}" type="datetimeFigureOut">
               <a:rPr lang="en-US" smtClean="0"/>
-              <a:t>10/25/2020</a:t>
+              <a:t>6/24/2022</a:t>
             </a:fld>
             <a:endParaRPr lang="en-US" dirty="0"/>
           </a:p>
@@ -644,7 +645,7 @@
           <a:p>
             <a:fld id="{02AC24A9-CCB6-4F8D-B8DB-C2F3692CFA5A}" type="datetimeFigureOut">
               <a:rPr lang="en-US" smtClean="0"/>
-              <a:t>10/25/2020</a:t>
+              <a:t>6/24/2022</a:t>
             </a:fld>
             <a:endParaRPr lang="en-US"/>
           </a:p>
@@ -853,7 +854,7 @@
           <a:p>
             <a:fld id="{02AC24A9-CCB6-4F8D-B8DB-C2F3692CFA5A}" type="datetimeFigureOut">
               <a:rPr lang="en-US" smtClean="0"/>
-              <a:t>10/25/2020</a:t>
+              <a:t>6/24/2022</a:t>
             </a:fld>
             <a:endParaRPr lang="en-US"/>
           </a:p>
@@ -1323,7 +1324,7 @@
           <a:p>
             <a:fld id="{02AC24A9-CCB6-4F8D-B8DB-C2F3692CFA5A}" type="datetimeFigureOut">
               <a:rPr lang="en-US" smtClean="0"/>
-              <a:t>10/25/2020</a:t>
+              <a:t>6/24/2022</a:t>
             </a:fld>
             <a:endParaRPr lang="en-US"/>
           </a:p>
@@ -1777,7 +1778,7 @@
           <a:p>
             <a:fld id="{02AC24A9-CCB6-4F8D-B8DB-C2F3692CFA5A}" type="datetimeFigureOut">
               <a:rPr lang="en-US" smtClean="0"/>
-              <a:t>10/25/2020</a:t>
+              <a:t>6/24/2022</a:t>
             </a:fld>
             <a:endParaRPr lang="en-US"/>
           </a:p>
@@ -2309,7 +2310,7 @@
           <a:p>
             <a:fld id="{02AC24A9-CCB6-4F8D-B8DB-C2F3692CFA5A}" type="datetimeFigureOut">
               <a:rPr lang="en-US" smtClean="0"/>
-              <a:t>10/25/2020</a:t>
+              <a:t>6/24/2022</a:t>
             </a:fld>
             <a:endParaRPr lang="en-US"/>
           </a:p>
@@ -3008,7 +3009,7 @@
           <a:p>
             <a:fld id="{02AC24A9-CCB6-4F8D-B8DB-C2F3692CFA5A}" type="datetimeFigureOut">
               <a:rPr lang="en-US" smtClean="0"/>
-              <a:t>10/25/2020</a:t>
+              <a:t>6/24/2022</a:t>
             </a:fld>
             <a:endParaRPr lang="en-US"/>
           </a:p>
@@ -3337,7 +3338,7 @@
           <a:p>
             <a:fld id="{02AC24A9-CCB6-4F8D-B8DB-C2F3692CFA5A}" type="datetimeFigureOut">
               <a:rPr lang="en-US" smtClean="0"/>
-              <a:t>10/25/2020</a:t>
+              <a:t>6/24/2022</a:t>
             </a:fld>
             <a:endParaRPr lang="en-US"/>
           </a:p>
@@ -3450,7 +3451,7 @@
           <a:p>
             <a:fld id="{02AC24A9-CCB6-4F8D-B8DB-C2F3692CFA5A}" type="datetimeFigureOut">
               <a:rPr lang="en-US" smtClean="0"/>
-              <a:t>10/25/2020</a:t>
+              <a:t>6/24/2022</a:t>
             </a:fld>
             <a:endParaRPr lang="en-US"/>
           </a:p>
@@ -3945,7 +3946,7 @@
           <a:p>
             <a:fld id="{02AC24A9-CCB6-4F8D-B8DB-C2F3692CFA5A}" type="datetimeFigureOut">
               <a:rPr lang="en-US" smtClean="0"/>
-              <a:t>10/25/2020</a:t>
+              <a:t>6/24/2022</a:t>
             </a:fld>
             <a:endParaRPr lang="en-US" dirty="0"/>
           </a:p>
@@ -4422,7 +4423,7 @@
           <a:p>
             <a:fld id="{02AC24A9-CCB6-4F8D-B8DB-C2F3692CFA5A}" type="datetimeFigureOut">
               <a:rPr lang="en-US" smtClean="0"/>
-              <a:t>10/25/2020</a:t>
+              <a:t>6/24/2022</a:t>
             </a:fld>
             <a:endParaRPr lang="en-US"/>
           </a:p>
@@ -4665,7 +4666,7 @@
           <a:p>
             <a:fld id="{02AC24A9-CCB6-4F8D-B8DB-C2F3692CFA5A}" type="datetimeFigureOut">
               <a:rPr lang="en-US" smtClean="0"/>
-              <a:t>10/25/2020</a:t>
+              <a:t>6/24/2022</a:t>
             </a:fld>
             <a:endParaRPr lang="en-US"/>
           </a:p>
@@ -10175,8 +10176,12 @@
               <a:rPr lang="en-US" dirty="0"/>
             </a:br>
             <a:r>
+              <a:rPr lang="en-US" dirty="0" err="1"/>
+              <a:t>RBG_SciFi.ino</a:t>
+            </a:r>
+            <a:r>
               <a:rPr lang="en-US" dirty="0"/>
-              <a:t>Arduino Setup</a:t>
+              <a:t> Arduino Setup</a:t>
             </a:r>
           </a:p>
         </p:txBody>
@@ -10584,8 +10589,12 @@
               <a:rPr lang="en-US" dirty="0"/>
             </a:br>
             <a:r>
+              <a:rPr lang="en-US" dirty="0" err="1"/>
+              <a:t>RBG_SciFi.ino</a:t>
+            </a:r>
+            <a:r>
               <a:rPr lang="en-US" dirty="0"/>
-              <a:t>Programming Arduino for Bluetooth</a:t>
+              <a:t> programming</a:t>
             </a:r>
           </a:p>
         </p:txBody>
@@ -10608,13 +10617,13 @@
         </p:nvSpPr>
         <p:spPr>
           <a:xfrm>
-            <a:off x="522475" y="3643522"/>
-            <a:ext cx="4037102" cy="1311145"/>
+            <a:off x="461418" y="2371053"/>
+            <a:ext cx="4037102" cy="3938307"/>
           </a:xfrm>
         </p:spPr>
         <p:txBody>
           <a:bodyPr>
-            <a:normAutofit/>
+            <a:noAutofit/>
           </a:bodyPr>
           <a:lstStyle/>
           <a:p>
@@ -10622,32 +10631,66 @@
               <a:buNone/>
             </a:pPr>
             <a:r>
-              <a:rPr lang="en-US" sz="1200" dirty="0"/>
-              <a:t>Connections to program the KCX-BT-EMITTER</a:t>
-            </a:r>
-          </a:p>
-          <a:p>
-            <a:r>
-              <a:rPr lang="en-US" sz="1000" dirty="0"/>
-              <a:t>See RubberBandGun_wiring.pdf</a:t>
-            </a:r>
-          </a:p>
-          <a:p>
-            <a:r>
-              <a:rPr lang="en-US" sz="1000" dirty="0"/>
-              <a:t>See ProgrammingArduino_SerialMonitor_SampleOutput.pdf</a:t>
-            </a:r>
-          </a:p>
-          <a:p>
-            <a:r>
-              <a:rPr lang="en-US" sz="1000" dirty="0"/>
-              <a:t>See </a:t>
-            </a:r>
-            <a:r>
-              <a:rPr lang="en-US" sz="1000" dirty="0" err="1"/>
-              <a:t>ProgrammingArduino.ino</a:t>
-            </a:r>
-            <a:endParaRPr lang="en-US" sz="1000" dirty="0"/>
+              <a:rPr lang="en-US" sz="1200" dirty="0" err="1">
+                <a:latin typeface="Arial" panose="020B0604020202020204" pitchFamily="34" charset="0"/>
+                <a:cs typeface="Arial" panose="020B0604020202020204" pitchFamily="34" charset="0"/>
+              </a:rPr>
+              <a:t>RBG_SciFi.ino</a:t>
+            </a:r>
+            <a:endParaRPr lang="en-US" sz="1200" dirty="0">
+              <a:latin typeface="Arial" panose="020B0604020202020204" pitchFamily="34" charset="0"/>
+              <a:cs typeface="Arial" panose="020B0604020202020204" pitchFamily="34" charset="0"/>
+            </a:endParaRPr>
+          </a:p>
+          <a:p>
+            <a:pPr marL="0" indent="0">
+              <a:buNone/>
+            </a:pPr>
+            <a:r>
+              <a:rPr lang="en-US" sz="1200" dirty="0">
+                <a:latin typeface="Arial" panose="020B0604020202020204" pitchFamily="34" charset="0"/>
+                <a:cs typeface="Arial" panose="020B0604020202020204" pitchFamily="34" charset="0"/>
+              </a:rPr>
+              <a:t>Take the clear acrylic cover off, pull back the barrel/solenoid/motor assembly as if loading, turn the RBG power on, plug in the </a:t>
+            </a:r>
+            <a:r>
+              <a:rPr lang="it-IT" sz="1200" dirty="0">
+                <a:latin typeface="Arial" panose="020B0604020202020204" pitchFamily="34" charset="0"/>
+                <a:cs typeface="Arial" panose="020B0604020202020204" pitchFamily="34" charset="0"/>
+              </a:rPr>
+              <a:t>USB Male Mini 5 Pin</a:t>
+            </a:r>
+            <a:r>
+              <a:rPr lang="en-US" sz="1200" dirty="0">
+                <a:latin typeface="Arial" panose="020B0604020202020204" pitchFamily="34" charset="0"/>
+                <a:cs typeface="Arial" panose="020B0604020202020204" pitchFamily="34" charset="0"/>
+              </a:rPr>
+              <a:t> to the Arduino NANO and the other side to your computer, and program. Reverse steps to disconnect.</a:t>
+            </a:r>
+          </a:p>
+          <a:p>
+            <a:pPr marL="0" indent="0">
+              <a:buNone/>
+            </a:pPr>
+            <a:r>
+              <a:rPr lang="en-US" sz="1200" dirty="0">
+                <a:latin typeface="Arial" panose="020B0604020202020204" pitchFamily="34" charset="0"/>
+                <a:cs typeface="Arial" panose="020B0604020202020204" pitchFamily="34" charset="0"/>
+              </a:rPr>
+              <a:t>NOTE: when the RBG power is on while the USB connector is connected and periodically resetting the Arduino, it continuously resets and pulses the solenoid/motor circuit at an interval of about 1.5 seconds. This might eventually damage the solenoid/motor or its circuitry, so it is important to pull back the barrel/solenoid/motor assembly before powering on.</a:t>
+            </a:r>
+          </a:p>
+          <a:p>
+            <a:pPr marL="0" indent="0">
+              <a:buNone/>
+            </a:pPr>
+            <a:r>
+              <a:rPr lang="en-US" sz="1200" dirty="0">
+                <a:latin typeface="Arial" panose="020B0604020202020204" pitchFamily="34" charset="0"/>
+                <a:cs typeface="Arial" panose="020B0604020202020204" pitchFamily="34" charset="0"/>
+              </a:rPr>
+              <a:t>NOTE: The reason I suggest powering on the RBG while programming is so that the entire RBG is not being powered through our inexpensive clone Arduino Nano.</a:t>
+            </a:r>
           </a:p>
         </p:txBody>
       </p:sp>
@@ -10665,7 +10708,7 @@
         </p:nvSpPr>
         <p:spPr>
           <a:xfrm>
-            <a:off x="4722395" y="2267953"/>
+            <a:off x="4757352" y="2371053"/>
             <a:ext cx="6491234" cy="4120813"/>
           </a:xfrm>
           <a:prstGeom prst="rect">
@@ -11532,7 +11575,7 @@
         </p:nvSpPr>
         <p:spPr>
           <a:xfrm rot="4359892">
-            <a:off x="9600943" y="5090236"/>
+            <a:off x="9600943" y="4852847"/>
             <a:ext cx="1126941" cy="417140"/>
           </a:xfrm>
           <a:prstGeom prst="rect">
@@ -11966,7 +12009,7 @@
         </p:nvSpPr>
         <p:spPr>
           <a:xfrm rot="20513597">
-            <a:off x="9943038" y="4757349"/>
+            <a:off x="10237283" y="5471988"/>
             <a:ext cx="134315" cy="180926"/>
           </a:xfrm>
           <a:prstGeom prst="roundRect">
@@ -12172,10 +12215,10 @@
       </p:grpSp>
       <p:sp>
         <p:nvSpPr>
-          <p:cNvPr id="4" name="Rectangle 3">
-            <a:extLst>
-              <a:ext uri="{FF2B5EF4-FFF2-40B4-BE49-F238E27FC236}">
-                <a16:creationId xmlns:a16="http://schemas.microsoft.com/office/drawing/2014/main" id="{13495F2B-8FCE-446D-8B24-ACAE63D3707C}"/>
+          <p:cNvPr id="49" name="Freeform: Shape 48">
+            <a:extLst>
+              <a:ext uri="{FF2B5EF4-FFF2-40B4-BE49-F238E27FC236}">
+                <a16:creationId xmlns:a16="http://schemas.microsoft.com/office/drawing/2014/main" id="{0171344A-A62F-440E-8A13-661F78F244AB}"/>
               </a:ext>
             </a:extLst>
           </p:cNvPr>
@@ -12183,198 +12226,9 @@
           <p:nvPr/>
         </p:nvSpPr>
         <p:spPr>
-          <a:xfrm rot="5400000">
-            <a:off x="7853957" y="5102742"/>
-            <a:ext cx="1126941" cy="508003"/>
-          </a:xfrm>
-          <a:prstGeom prst="rect">
-            <a:avLst/>
-          </a:prstGeom>
-          <a:solidFill>
-            <a:schemeClr val="accent5"/>
-          </a:solidFill>
-          <a:ln>
-            <a:solidFill>
-              <a:schemeClr val="accent5"/>
-            </a:solidFill>
-          </a:ln>
-        </p:spPr>
-        <p:style>
-          <a:lnRef idx="2">
-            <a:schemeClr val="accent1">
-              <a:shade val="50000"/>
-            </a:schemeClr>
-          </a:lnRef>
-          <a:fillRef idx="1">
-            <a:schemeClr val="accent1"/>
-          </a:fillRef>
-          <a:effectRef idx="0">
-            <a:schemeClr val="accent1"/>
-          </a:effectRef>
-          <a:fontRef idx="minor">
-            <a:schemeClr val="lt1"/>
-          </a:fontRef>
-        </p:style>
-        <p:txBody>
-          <a:bodyPr rtlCol="0" anchor="ctr"/>
-          <a:lstStyle/>
-          <a:p>
-            <a:pPr algn="ctr"/>
-            <a:r>
-              <a:rPr lang="en-US" dirty="0"/>
-              <a:t>Prog </a:t>
-            </a:r>
-            <a:r>
-              <a:rPr lang="en-US" dirty="0" err="1"/>
-              <a:t>Ardu</a:t>
-            </a:r>
-            <a:endParaRPr lang="en-US" dirty="0"/>
-          </a:p>
-        </p:txBody>
-      </p:sp>
-      <p:cxnSp>
-        <p:nvCxnSpPr>
-          <p:cNvPr id="44" name="Straight Connector 43">
-            <a:extLst>
-              <a:ext uri="{FF2B5EF4-FFF2-40B4-BE49-F238E27FC236}">
-                <a16:creationId xmlns:a16="http://schemas.microsoft.com/office/drawing/2014/main" id="{590B4BA7-DFB4-4F73-8617-4CBE043770F3}"/>
-              </a:ext>
-            </a:extLst>
-          </p:cNvPr>
-          <p:cNvCxnSpPr>
-            <a:endCxn id="40" idx="0"/>
-          </p:cNvCxnSpPr>
-          <p:nvPr/>
-        </p:nvCxnSpPr>
-        <p:spPr>
-          <a:xfrm>
-            <a:off x="8653486" y="4962053"/>
-            <a:ext cx="988881" cy="300850"/>
-          </a:xfrm>
-          <a:prstGeom prst="line">
-            <a:avLst/>
-          </a:prstGeom>
-          <a:ln w="12700">
-            <a:solidFill>
-              <a:schemeClr val="tx1"/>
-            </a:solidFill>
-          </a:ln>
-        </p:spPr>
-        <p:style>
-          <a:lnRef idx="1">
-            <a:schemeClr val="accent1"/>
-          </a:lnRef>
-          <a:fillRef idx="0">
-            <a:schemeClr val="accent1"/>
-          </a:fillRef>
-          <a:effectRef idx="0">
-            <a:schemeClr val="accent1"/>
-          </a:effectRef>
-          <a:fontRef idx="minor">
-            <a:schemeClr val="tx1"/>
-          </a:fontRef>
-        </p:style>
-      </p:cxnSp>
-      <p:sp>
-        <p:nvSpPr>
-          <p:cNvPr id="45" name="TextBox 44">
-            <a:extLst>
-              <a:ext uri="{FF2B5EF4-FFF2-40B4-BE49-F238E27FC236}">
-                <a16:creationId xmlns:a16="http://schemas.microsoft.com/office/drawing/2014/main" id="{D1002E0D-FFDA-4212-A4C1-D47E37E7FB5C}"/>
-              </a:ext>
-            </a:extLst>
-          </p:cNvPr>
-          <p:cNvSpPr txBox="1"/>
-          <p:nvPr/>
-        </p:nvSpPr>
-        <p:spPr>
-          <a:xfrm>
-            <a:off x="8802618" y="5096123"/>
-            <a:ext cx="677237" cy="276999"/>
-          </a:xfrm>
-          <a:prstGeom prst="rect">
-            <a:avLst/>
-          </a:prstGeom>
-          <a:noFill/>
-        </p:spPr>
-        <p:txBody>
-          <a:bodyPr wrap="none" rtlCol="0">
-            <a:spAutoFit/>
-          </a:bodyPr>
-          <a:lstStyle/>
-          <a:p>
-            <a:r>
-              <a:rPr lang="en-US" sz="1200" dirty="0"/>
-              <a:t>3 wires</a:t>
-            </a:r>
-          </a:p>
-        </p:txBody>
-      </p:sp>
-      <p:sp>
-        <p:nvSpPr>
-          <p:cNvPr id="47" name="Rectangle: Rounded Corners 46">
-            <a:extLst>
-              <a:ext uri="{FF2B5EF4-FFF2-40B4-BE49-F238E27FC236}">
-                <a16:creationId xmlns:a16="http://schemas.microsoft.com/office/drawing/2014/main" id="{3D94BD1C-2593-49F2-BF89-6F318F52CB20}"/>
-              </a:ext>
-            </a:extLst>
-          </p:cNvPr>
-          <p:cNvSpPr/>
-          <p:nvPr/>
-        </p:nvSpPr>
-        <p:spPr>
-          <a:xfrm>
-            <a:off x="8350269" y="4787158"/>
-            <a:ext cx="134315" cy="180926"/>
-          </a:xfrm>
-          <a:prstGeom prst="roundRect">
-            <a:avLst/>
-          </a:prstGeom>
-          <a:solidFill>
-            <a:schemeClr val="bg1"/>
-          </a:solidFill>
-        </p:spPr>
-        <p:style>
-          <a:lnRef idx="2">
-            <a:schemeClr val="accent1">
-              <a:shade val="50000"/>
-            </a:schemeClr>
-          </a:lnRef>
-          <a:fillRef idx="1">
-            <a:schemeClr val="accent1"/>
-          </a:fillRef>
-          <a:effectRef idx="0">
-            <a:schemeClr val="accent1"/>
-          </a:effectRef>
-          <a:fontRef idx="minor">
-            <a:schemeClr val="lt1"/>
-          </a:fontRef>
-        </p:style>
-        <p:txBody>
-          <a:bodyPr rtlCol="0" anchor="ctr"/>
-          <a:lstStyle/>
-          <a:p>
-            <a:pPr algn="ctr"/>
-            <a:endParaRPr lang="en-US"/>
-          </a:p>
-        </p:txBody>
-      </p:sp>
-      <p:sp>
-        <p:nvSpPr>
-          <p:cNvPr id="49" name="Freeform: Shape 48">
-            <a:extLst>
-              <a:ext uri="{FF2B5EF4-FFF2-40B4-BE49-F238E27FC236}">
-                <a16:creationId xmlns:a16="http://schemas.microsoft.com/office/drawing/2014/main" id="{0171344A-A62F-440E-8A13-661F78F244AB}"/>
-              </a:ext>
-            </a:extLst>
-          </p:cNvPr>
-          <p:cNvSpPr/>
-          <p:nvPr/>
-        </p:nvSpPr>
-        <p:spPr>
-          <a:xfrm>
-            <a:off x="6394784" y="3783932"/>
-            <a:ext cx="2033628" cy="1004636"/>
+          <a:xfrm rot="359564" flipV="1">
+            <a:off x="7993924" y="5528666"/>
+            <a:ext cx="2349170" cy="619353"/>
           </a:xfrm>
           <a:custGeom>
             <a:avLst/>
@@ -12459,7 +12313,7 @@
         </p:nvSpPr>
         <p:spPr>
           <a:xfrm>
-            <a:off x="7072979" y="3956310"/>
+            <a:off x="7968012" y="4677668"/>
             <a:ext cx="478016" cy="276999"/>
           </a:xfrm>
           <a:prstGeom prst="rect">
@@ -12509,7 +12363,7 @@
         </p:blipFill>
         <p:spPr bwMode="auto">
           <a:xfrm>
-            <a:off x="5358768" y="2991666"/>
+            <a:off x="6668045" y="5090160"/>
             <a:ext cx="1314450" cy="1219200"/>
           </a:xfrm>
           <a:prstGeom prst="rect">
@@ -12527,12 +12381,1863 @@
           </a:extLst>
         </p:spPr>
       </p:pic>
+    </p:spTree>
+    <p:extLst>
+      <p:ext uri="{BB962C8B-B14F-4D97-AF65-F5344CB8AC3E}">
+        <p14:creationId xmlns:p14="http://schemas.microsoft.com/office/powerpoint/2010/main" val="4170202118"/>
+      </p:ext>
+    </p:extLst>
+  </p:cSld>
+  <p:clrMapOvr>
+    <a:masterClrMapping/>
+  </p:clrMapOvr>
+</p:sld>
+</file>
+
+<file path=ppt/slides/slide8.xml><?xml version="1.0" encoding="utf-8"?>
+<p:sld xmlns:a="http://schemas.openxmlformats.org/drawingml/2006/main" xmlns:r="http://schemas.openxmlformats.org/officeDocument/2006/relationships" xmlns:p="http://schemas.openxmlformats.org/presentationml/2006/main">
+  <p:cSld>
+    <p:spTree>
+      <p:nvGrpSpPr>
+        <p:cNvPr id="1" name=""/>
+        <p:cNvGrpSpPr/>
+        <p:nvPr/>
+      </p:nvGrpSpPr>
+      <p:grpSpPr>
+        <a:xfrm>
+          <a:off x="0" y="0"/>
+          <a:ext cx="0" cy="0"/>
+          <a:chOff x="0" y="0"/>
+          <a:chExt cx="0" cy="0"/>
+        </a:xfrm>
+      </p:grpSpPr>
+      <p:sp>
+        <p:nvSpPr>
+          <p:cNvPr id="2" name="Title 1">
+            <a:extLst>
+              <a:ext uri="{FF2B5EF4-FFF2-40B4-BE49-F238E27FC236}">
+                <a16:creationId xmlns:a16="http://schemas.microsoft.com/office/drawing/2014/main" id="{4E2272C3-2933-48F5-923A-A6570DEEFCCF}"/>
+              </a:ext>
+            </a:extLst>
+          </p:cNvPr>
+          <p:cNvSpPr>
+            <a:spLocks noGrp="1"/>
+          </p:cNvSpPr>
+          <p:nvPr>
+            <p:ph type="title"/>
+          </p:nvPr>
+        </p:nvSpPr>
+        <p:spPr/>
+        <p:txBody>
+          <a:bodyPr>
+            <a:normAutofit fontScale="90000"/>
+          </a:bodyPr>
+          <a:lstStyle/>
+          <a:p>
+            <a:pPr algn="ctr"/>
+            <a:r>
+              <a:rPr lang="en-US" dirty="0"/>
+              <a:t>FOOF Rubber Band Gun</a:t>
+            </a:r>
+            <a:br>
+              <a:rPr lang="en-US" dirty="0"/>
+            </a:br>
+            <a:r>
+              <a:rPr lang="en-US" dirty="0"/>
+              <a:t>Programming Arduino for Bluetooth</a:t>
+            </a:r>
+          </a:p>
+        </p:txBody>
+      </p:sp>
+      <p:sp>
+        <p:nvSpPr>
+          <p:cNvPr id="3" name="Content Placeholder 2">
+            <a:extLst>
+              <a:ext uri="{FF2B5EF4-FFF2-40B4-BE49-F238E27FC236}">
+                <a16:creationId xmlns:a16="http://schemas.microsoft.com/office/drawing/2014/main" id="{6FA38F56-2E24-4600-B93F-FBDF438A7340}"/>
+              </a:ext>
+            </a:extLst>
+          </p:cNvPr>
+          <p:cNvSpPr>
+            <a:spLocks noGrp="1"/>
+          </p:cNvSpPr>
+          <p:nvPr>
+            <p:ph idx="1"/>
+          </p:nvPr>
+        </p:nvSpPr>
+        <p:spPr>
+          <a:xfrm>
+            <a:off x="522475" y="3643522"/>
+            <a:ext cx="4037102" cy="1311145"/>
+          </a:xfrm>
+        </p:spPr>
+        <p:txBody>
+          <a:bodyPr>
+            <a:normAutofit/>
+          </a:bodyPr>
+          <a:lstStyle/>
+          <a:p>
+            <a:pPr marL="0" indent="0">
+              <a:buNone/>
+            </a:pPr>
+            <a:r>
+              <a:rPr lang="en-US" sz="1200" dirty="0"/>
+              <a:t>Connections to program the KCX-BT-EMITTER</a:t>
+            </a:r>
+          </a:p>
+          <a:p>
+            <a:r>
+              <a:rPr lang="en-US" sz="1000" dirty="0"/>
+              <a:t>See RubberBandGun_wiring.pdf</a:t>
+            </a:r>
+          </a:p>
+          <a:p>
+            <a:r>
+              <a:rPr lang="en-US" sz="1000" dirty="0"/>
+              <a:t>See ProgrammingArduino_SerialMonitor_SampleOutput.pdf</a:t>
+            </a:r>
+          </a:p>
+          <a:p>
+            <a:r>
+              <a:rPr lang="en-US" sz="1000" dirty="0"/>
+              <a:t>See </a:t>
+            </a:r>
+            <a:r>
+              <a:rPr lang="en-US" sz="1000" dirty="0" err="1"/>
+              <a:t>ProgrammingArduino.ino</a:t>
+            </a:r>
+            <a:endParaRPr lang="en-US" sz="1000" dirty="0"/>
+          </a:p>
+        </p:txBody>
+      </p:sp>
+      <p:sp>
+        <p:nvSpPr>
+          <p:cNvPr id="6" name="Rectangle 5">
+            <a:extLst>
+              <a:ext uri="{FF2B5EF4-FFF2-40B4-BE49-F238E27FC236}">
+                <a16:creationId xmlns:a16="http://schemas.microsoft.com/office/drawing/2014/main" id="{235F5C12-ADF8-4B05-8E93-AEC36CE91A1A}"/>
+              </a:ext>
+            </a:extLst>
+          </p:cNvPr>
+          <p:cNvSpPr/>
+          <p:nvPr/>
+        </p:nvSpPr>
+        <p:spPr>
+          <a:xfrm>
+            <a:off x="4722395" y="2267953"/>
+            <a:ext cx="6491234" cy="4120813"/>
+          </a:xfrm>
+          <a:prstGeom prst="rect">
+            <a:avLst/>
+          </a:prstGeom>
+          <a:solidFill>
+            <a:schemeClr val="accent3">
+              <a:lumMod val="40000"/>
+              <a:lumOff val="60000"/>
+            </a:schemeClr>
+          </a:solidFill>
+        </p:spPr>
+        <p:style>
+          <a:lnRef idx="2">
+            <a:schemeClr val="accent1">
+              <a:shade val="50000"/>
+            </a:schemeClr>
+          </a:lnRef>
+          <a:fillRef idx="1">
+            <a:schemeClr val="accent1"/>
+          </a:fillRef>
+          <a:effectRef idx="0">
+            <a:schemeClr val="accent1"/>
+          </a:effectRef>
+          <a:fontRef idx="minor">
+            <a:schemeClr val="lt1"/>
+          </a:fontRef>
+        </p:style>
+        <p:txBody>
+          <a:bodyPr rtlCol="0" anchor="ctr"/>
+          <a:lstStyle/>
+          <a:p>
+            <a:pPr algn="ctr"/>
+            <a:endParaRPr lang="en-US" dirty="0"/>
+          </a:p>
+        </p:txBody>
+      </p:sp>
+      <p:grpSp>
+        <p:nvGrpSpPr>
+          <p:cNvPr id="7" name="Group 6">
+            <a:extLst>
+              <a:ext uri="{FF2B5EF4-FFF2-40B4-BE49-F238E27FC236}">
+                <a16:creationId xmlns:a16="http://schemas.microsoft.com/office/drawing/2014/main" id="{FDD38489-A34F-4ACA-BE82-DC274CB73572}"/>
+              </a:ext>
+            </a:extLst>
+          </p:cNvPr>
+          <p:cNvGrpSpPr/>
+          <p:nvPr/>
+        </p:nvGrpSpPr>
+        <p:grpSpPr>
+          <a:xfrm>
+            <a:off x="7956975" y="2447340"/>
+            <a:ext cx="3054773" cy="3799838"/>
+            <a:chOff x="1009227" y="2409240"/>
+            <a:chExt cx="3054773" cy="3799838"/>
+          </a:xfrm>
+        </p:grpSpPr>
+        <p:grpSp>
+          <p:nvGrpSpPr>
+            <p:cNvPr id="8" name="Group 7">
+              <a:extLst>
+                <a:ext uri="{FF2B5EF4-FFF2-40B4-BE49-F238E27FC236}">
+                  <a16:creationId xmlns:a16="http://schemas.microsoft.com/office/drawing/2014/main" id="{6AA0749C-E01A-4583-B163-FA92E15AFD17}"/>
+                </a:ext>
+              </a:extLst>
+            </p:cNvPr>
+            <p:cNvGrpSpPr/>
+            <p:nvPr/>
+          </p:nvGrpSpPr>
+          <p:grpSpPr>
+            <a:xfrm>
+              <a:off x="1009227" y="2409240"/>
+              <a:ext cx="3054773" cy="3799838"/>
+              <a:chOff x="1009227" y="2404535"/>
+              <a:chExt cx="3054773" cy="3799838"/>
+            </a:xfrm>
+          </p:grpSpPr>
+          <p:cxnSp>
+            <p:nvCxnSpPr>
+              <p:cNvPr id="17" name="Straight Connector 16">
+                <a:extLst>
+                  <a:ext uri="{FF2B5EF4-FFF2-40B4-BE49-F238E27FC236}">
+                    <a16:creationId xmlns:a16="http://schemas.microsoft.com/office/drawing/2014/main" id="{FB6E9B18-5C12-4524-9B5A-7338D2871FFA}"/>
+                  </a:ext>
+                </a:extLst>
+              </p:cNvPr>
+              <p:cNvCxnSpPr/>
+              <p:nvPr/>
+            </p:nvCxnSpPr>
+            <p:spPr>
+              <a:xfrm>
+                <a:off x="1009227" y="2411307"/>
+                <a:ext cx="2160693" cy="0"/>
+              </a:xfrm>
+              <a:prstGeom prst="line">
+                <a:avLst/>
+              </a:prstGeom>
+              <a:ln/>
+            </p:spPr>
+            <p:style>
+              <a:lnRef idx="3">
+                <a:schemeClr val="dk1"/>
+              </a:lnRef>
+              <a:fillRef idx="0">
+                <a:schemeClr val="dk1"/>
+              </a:fillRef>
+              <a:effectRef idx="2">
+                <a:schemeClr val="dk1"/>
+              </a:effectRef>
+              <a:fontRef idx="minor">
+                <a:schemeClr val="tx1"/>
+              </a:fontRef>
+            </p:style>
+          </p:cxnSp>
+          <p:cxnSp>
+            <p:nvCxnSpPr>
+              <p:cNvPr id="18" name="Straight Connector 17">
+                <a:extLst>
+                  <a:ext uri="{FF2B5EF4-FFF2-40B4-BE49-F238E27FC236}">
+                    <a16:creationId xmlns:a16="http://schemas.microsoft.com/office/drawing/2014/main" id="{AD3CCD17-FC9F-4E55-8EE8-3153FCBD427F}"/>
+                  </a:ext>
+                </a:extLst>
+              </p:cNvPr>
+              <p:cNvCxnSpPr/>
+              <p:nvPr/>
+            </p:nvCxnSpPr>
+            <p:spPr>
+              <a:xfrm>
+                <a:off x="3156373" y="2418080"/>
+                <a:ext cx="0" cy="765387"/>
+              </a:xfrm>
+              <a:prstGeom prst="line">
+                <a:avLst/>
+              </a:prstGeom>
+              <a:ln/>
+            </p:spPr>
+            <p:style>
+              <a:lnRef idx="3">
+                <a:schemeClr val="dk1"/>
+              </a:lnRef>
+              <a:fillRef idx="0">
+                <a:schemeClr val="dk1"/>
+              </a:fillRef>
+              <a:effectRef idx="2">
+                <a:schemeClr val="dk1"/>
+              </a:effectRef>
+              <a:fontRef idx="minor">
+                <a:schemeClr val="tx1"/>
+              </a:fontRef>
+            </p:style>
+          </p:cxnSp>
+          <p:cxnSp>
+            <p:nvCxnSpPr>
+              <p:cNvPr id="19" name="Straight Connector 18">
+                <a:extLst>
+                  <a:ext uri="{FF2B5EF4-FFF2-40B4-BE49-F238E27FC236}">
+                    <a16:creationId xmlns:a16="http://schemas.microsoft.com/office/drawing/2014/main" id="{EAABA448-5997-47B2-B5E8-40B9E042408D}"/>
+                  </a:ext>
+                </a:extLst>
+              </p:cNvPr>
+              <p:cNvCxnSpPr/>
+              <p:nvPr/>
+            </p:nvCxnSpPr>
+            <p:spPr>
+              <a:xfrm>
+                <a:off x="3169920" y="3183467"/>
+                <a:ext cx="894080" cy="3020906"/>
+              </a:xfrm>
+              <a:prstGeom prst="line">
+                <a:avLst/>
+              </a:prstGeom>
+              <a:ln/>
+            </p:spPr>
+            <p:style>
+              <a:lnRef idx="3">
+                <a:schemeClr val="dk1"/>
+              </a:lnRef>
+              <a:fillRef idx="0">
+                <a:schemeClr val="dk1"/>
+              </a:fillRef>
+              <a:effectRef idx="2">
+                <a:schemeClr val="dk1"/>
+              </a:effectRef>
+              <a:fontRef idx="minor">
+                <a:schemeClr val="tx1"/>
+              </a:fontRef>
+            </p:style>
+          </p:cxnSp>
+          <p:cxnSp>
+            <p:nvCxnSpPr>
+              <p:cNvPr id="20" name="Straight Connector 19">
+                <a:extLst>
+                  <a:ext uri="{FF2B5EF4-FFF2-40B4-BE49-F238E27FC236}">
+                    <a16:creationId xmlns:a16="http://schemas.microsoft.com/office/drawing/2014/main" id="{CAE3830A-B487-4B2A-9459-E8B04E665EBD}"/>
+                  </a:ext>
+                </a:extLst>
+              </p:cNvPr>
+              <p:cNvCxnSpPr/>
+              <p:nvPr/>
+            </p:nvCxnSpPr>
+            <p:spPr>
+              <a:xfrm flipH="1">
+                <a:off x="2465493" y="6204372"/>
+                <a:ext cx="1598506" cy="0"/>
+              </a:xfrm>
+              <a:prstGeom prst="line">
+                <a:avLst/>
+              </a:prstGeom>
+              <a:ln/>
+            </p:spPr>
+            <p:style>
+              <a:lnRef idx="3">
+                <a:schemeClr val="dk1"/>
+              </a:lnRef>
+              <a:fillRef idx="0">
+                <a:schemeClr val="dk1"/>
+              </a:fillRef>
+              <a:effectRef idx="2">
+                <a:schemeClr val="dk1"/>
+              </a:effectRef>
+              <a:fontRef idx="minor">
+                <a:schemeClr val="tx1"/>
+              </a:fontRef>
+            </p:style>
+          </p:cxnSp>
+          <p:cxnSp>
+            <p:nvCxnSpPr>
+              <p:cNvPr id="21" name="Straight Connector 20">
+                <a:extLst>
+                  <a:ext uri="{FF2B5EF4-FFF2-40B4-BE49-F238E27FC236}">
+                    <a16:creationId xmlns:a16="http://schemas.microsoft.com/office/drawing/2014/main" id="{31C5745F-4EC3-432A-9698-D7AA9F25C14A}"/>
+                  </a:ext>
+                </a:extLst>
+              </p:cNvPr>
+              <p:cNvCxnSpPr/>
+              <p:nvPr/>
+            </p:nvCxnSpPr>
+            <p:spPr>
+              <a:xfrm flipV="1">
+                <a:off x="2458720" y="5784427"/>
+                <a:ext cx="358987" cy="419946"/>
+              </a:xfrm>
+              <a:prstGeom prst="line">
+                <a:avLst/>
+              </a:prstGeom>
+              <a:ln/>
+            </p:spPr>
+            <p:style>
+              <a:lnRef idx="3">
+                <a:schemeClr val="dk1"/>
+              </a:lnRef>
+              <a:fillRef idx="0">
+                <a:schemeClr val="dk1"/>
+              </a:fillRef>
+              <a:effectRef idx="2">
+                <a:schemeClr val="dk1"/>
+              </a:effectRef>
+              <a:fontRef idx="minor">
+                <a:schemeClr val="tx1"/>
+              </a:fontRef>
+            </p:style>
+          </p:cxnSp>
+          <p:cxnSp>
+            <p:nvCxnSpPr>
+              <p:cNvPr id="22" name="Straight Connector 21">
+                <a:extLst>
+                  <a:ext uri="{FF2B5EF4-FFF2-40B4-BE49-F238E27FC236}">
+                    <a16:creationId xmlns:a16="http://schemas.microsoft.com/office/drawing/2014/main" id="{6FF9FBF6-49D3-45A3-8095-E279AAF75D02}"/>
+                  </a:ext>
+                </a:extLst>
+              </p:cNvPr>
+              <p:cNvCxnSpPr/>
+              <p:nvPr/>
+            </p:nvCxnSpPr>
+            <p:spPr>
+              <a:xfrm flipH="1" flipV="1">
+                <a:off x="2025227" y="3183467"/>
+                <a:ext cx="792480" cy="2600961"/>
+              </a:xfrm>
+              <a:prstGeom prst="line">
+                <a:avLst/>
+              </a:prstGeom>
+              <a:ln/>
+            </p:spPr>
+            <p:style>
+              <a:lnRef idx="3">
+                <a:schemeClr val="dk1"/>
+              </a:lnRef>
+              <a:fillRef idx="0">
+                <a:schemeClr val="dk1"/>
+              </a:fillRef>
+              <a:effectRef idx="2">
+                <a:schemeClr val="dk1"/>
+              </a:effectRef>
+              <a:fontRef idx="minor">
+                <a:schemeClr val="tx1"/>
+              </a:fontRef>
+            </p:style>
+          </p:cxnSp>
+          <p:cxnSp>
+            <p:nvCxnSpPr>
+              <p:cNvPr id="23" name="Straight Connector 22">
+                <a:extLst>
+                  <a:ext uri="{FF2B5EF4-FFF2-40B4-BE49-F238E27FC236}">
+                    <a16:creationId xmlns:a16="http://schemas.microsoft.com/office/drawing/2014/main" id="{FA944F93-E570-4F8A-98B3-17D84DEDFEC1}"/>
+                  </a:ext>
+                </a:extLst>
+              </p:cNvPr>
+              <p:cNvCxnSpPr/>
+              <p:nvPr/>
+            </p:nvCxnSpPr>
+            <p:spPr>
+              <a:xfrm flipH="1">
+                <a:off x="1456267" y="3183467"/>
+                <a:ext cx="568961" cy="0"/>
+              </a:xfrm>
+              <a:prstGeom prst="line">
+                <a:avLst/>
+              </a:prstGeom>
+              <a:ln/>
+            </p:spPr>
+            <p:style>
+              <a:lnRef idx="3">
+                <a:schemeClr val="dk1"/>
+              </a:lnRef>
+              <a:fillRef idx="0">
+                <a:schemeClr val="dk1"/>
+              </a:fillRef>
+              <a:effectRef idx="2">
+                <a:schemeClr val="dk1"/>
+              </a:effectRef>
+              <a:fontRef idx="minor">
+                <a:schemeClr val="tx1"/>
+              </a:fontRef>
+            </p:style>
+          </p:cxnSp>
+          <p:cxnSp>
+            <p:nvCxnSpPr>
+              <p:cNvPr id="24" name="Straight Connector 23">
+                <a:extLst>
+                  <a:ext uri="{FF2B5EF4-FFF2-40B4-BE49-F238E27FC236}">
+                    <a16:creationId xmlns:a16="http://schemas.microsoft.com/office/drawing/2014/main" id="{CACA00CE-F432-40AA-A88E-8AECE0915AB2}"/>
+                  </a:ext>
+                </a:extLst>
+              </p:cNvPr>
+              <p:cNvCxnSpPr/>
+              <p:nvPr/>
+            </p:nvCxnSpPr>
+            <p:spPr>
+              <a:xfrm flipH="1" flipV="1">
+                <a:off x="1009227" y="2871893"/>
+                <a:ext cx="440266" cy="311574"/>
+              </a:xfrm>
+              <a:prstGeom prst="line">
+                <a:avLst/>
+              </a:prstGeom>
+              <a:ln/>
+            </p:spPr>
+            <p:style>
+              <a:lnRef idx="3">
+                <a:schemeClr val="dk1"/>
+              </a:lnRef>
+              <a:fillRef idx="0">
+                <a:schemeClr val="dk1"/>
+              </a:fillRef>
+              <a:effectRef idx="2">
+                <a:schemeClr val="dk1"/>
+              </a:effectRef>
+              <a:fontRef idx="minor">
+                <a:schemeClr val="tx1"/>
+              </a:fontRef>
+            </p:style>
+          </p:cxnSp>
+          <p:cxnSp>
+            <p:nvCxnSpPr>
+              <p:cNvPr id="25" name="Straight Connector 24">
+                <a:extLst>
+                  <a:ext uri="{FF2B5EF4-FFF2-40B4-BE49-F238E27FC236}">
+                    <a16:creationId xmlns:a16="http://schemas.microsoft.com/office/drawing/2014/main" id="{D8E496F6-F1DC-4EB1-A0B8-79C411F166D4}"/>
+                  </a:ext>
+                </a:extLst>
+              </p:cNvPr>
+              <p:cNvCxnSpPr/>
+              <p:nvPr/>
+            </p:nvCxnSpPr>
+            <p:spPr>
+              <a:xfrm flipV="1">
+                <a:off x="1009227" y="2404535"/>
+                <a:ext cx="0" cy="467359"/>
+              </a:xfrm>
+              <a:prstGeom prst="line">
+                <a:avLst/>
+              </a:prstGeom>
+              <a:ln/>
+            </p:spPr>
+            <p:style>
+              <a:lnRef idx="3">
+                <a:schemeClr val="dk1"/>
+              </a:lnRef>
+              <a:fillRef idx="0">
+                <a:schemeClr val="dk1"/>
+              </a:fillRef>
+              <a:effectRef idx="2">
+                <a:schemeClr val="dk1"/>
+              </a:effectRef>
+              <a:fontRef idx="minor">
+                <a:schemeClr val="tx1"/>
+              </a:fontRef>
+            </p:style>
+          </p:cxnSp>
+        </p:grpSp>
+        <p:grpSp>
+          <p:nvGrpSpPr>
+            <p:cNvPr id="9" name="Group 8">
+              <a:extLst>
+                <a:ext uri="{FF2B5EF4-FFF2-40B4-BE49-F238E27FC236}">
+                  <a16:creationId xmlns:a16="http://schemas.microsoft.com/office/drawing/2014/main" id="{4A8FD470-6289-4C73-B8F6-BE0C175CF66C}"/>
+                </a:ext>
+              </a:extLst>
+            </p:cNvPr>
+            <p:cNvGrpSpPr/>
+            <p:nvPr/>
+          </p:nvGrpSpPr>
+          <p:grpSpPr>
+            <a:xfrm>
+              <a:off x="2083406" y="3824273"/>
+              <a:ext cx="393094" cy="317492"/>
+              <a:chOff x="2083406" y="3819568"/>
+              <a:chExt cx="393094" cy="317492"/>
+            </a:xfrm>
+          </p:grpSpPr>
+          <p:sp>
+            <p:nvSpPr>
+              <p:cNvPr id="14" name="Rectangle 13">
+                <a:extLst>
+                  <a:ext uri="{FF2B5EF4-FFF2-40B4-BE49-F238E27FC236}">
+                    <a16:creationId xmlns:a16="http://schemas.microsoft.com/office/drawing/2014/main" id="{0E248137-2717-4EA3-BBAE-BB59B05B3A4B}"/>
+                  </a:ext>
+                </a:extLst>
+              </p:cNvPr>
+              <p:cNvSpPr/>
+              <p:nvPr/>
+            </p:nvSpPr>
+            <p:spPr>
+              <a:xfrm rot="20597776">
+                <a:off x="2083406" y="3819568"/>
+                <a:ext cx="304800" cy="317492"/>
+              </a:xfrm>
+              <a:prstGeom prst="rect">
+                <a:avLst/>
+              </a:prstGeom>
+              <a:solidFill>
+                <a:schemeClr val="tx1"/>
+              </a:solidFill>
+            </p:spPr>
+            <p:style>
+              <a:lnRef idx="2">
+                <a:schemeClr val="accent1">
+                  <a:shade val="50000"/>
+                </a:schemeClr>
+              </a:lnRef>
+              <a:fillRef idx="1">
+                <a:schemeClr val="accent1"/>
+              </a:fillRef>
+              <a:effectRef idx="0">
+                <a:schemeClr val="accent1"/>
+              </a:effectRef>
+              <a:fontRef idx="minor">
+                <a:schemeClr val="lt1"/>
+              </a:fontRef>
+            </p:style>
+            <p:txBody>
+              <a:bodyPr rtlCol="0" anchor="ctr"/>
+              <a:lstStyle/>
+              <a:p>
+                <a:pPr algn="ctr"/>
+                <a:endParaRPr lang="en-US"/>
+              </a:p>
+            </p:txBody>
+          </p:sp>
+          <p:sp>
+            <p:nvSpPr>
+              <p:cNvPr id="15" name="Rectangle 14">
+                <a:extLst>
+                  <a:ext uri="{FF2B5EF4-FFF2-40B4-BE49-F238E27FC236}">
+                    <a16:creationId xmlns:a16="http://schemas.microsoft.com/office/drawing/2014/main" id="{F29065A9-663E-4B88-950F-207B23255325}"/>
+                  </a:ext>
+                </a:extLst>
+              </p:cNvPr>
+              <p:cNvSpPr/>
+              <p:nvPr/>
+            </p:nvSpPr>
+            <p:spPr>
+              <a:xfrm rot="20475956">
+                <a:off x="2336800" y="3860800"/>
+                <a:ext cx="114300" cy="45719"/>
+              </a:xfrm>
+              <a:prstGeom prst="rect">
+                <a:avLst/>
+              </a:prstGeom>
+              <a:solidFill>
+                <a:schemeClr val="tx1"/>
+              </a:solidFill>
+            </p:spPr>
+            <p:style>
+              <a:lnRef idx="2">
+                <a:schemeClr val="accent1">
+                  <a:shade val="50000"/>
+                </a:schemeClr>
+              </a:lnRef>
+              <a:fillRef idx="1">
+                <a:schemeClr val="accent1"/>
+              </a:fillRef>
+              <a:effectRef idx="0">
+                <a:schemeClr val="accent1"/>
+              </a:effectRef>
+              <a:fontRef idx="minor">
+                <a:schemeClr val="lt1"/>
+              </a:fontRef>
+            </p:style>
+            <p:txBody>
+              <a:bodyPr rtlCol="0" anchor="ctr"/>
+              <a:lstStyle/>
+              <a:p>
+                <a:pPr algn="ctr"/>
+                <a:endParaRPr lang="en-US"/>
+              </a:p>
+            </p:txBody>
+          </p:sp>
+          <p:sp>
+            <p:nvSpPr>
+              <p:cNvPr id="16" name="Rectangle 15">
+                <a:extLst>
+                  <a:ext uri="{FF2B5EF4-FFF2-40B4-BE49-F238E27FC236}">
+                    <a16:creationId xmlns:a16="http://schemas.microsoft.com/office/drawing/2014/main" id="{6BBD8906-09AA-461E-84D4-F30D0BED9178}"/>
+                  </a:ext>
+                </a:extLst>
+              </p:cNvPr>
+              <p:cNvSpPr/>
+              <p:nvPr/>
+            </p:nvSpPr>
+            <p:spPr>
+              <a:xfrm rot="20475956">
+                <a:off x="2362200" y="3930650"/>
+                <a:ext cx="114300" cy="45719"/>
+              </a:xfrm>
+              <a:prstGeom prst="rect">
+                <a:avLst/>
+              </a:prstGeom>
+              <a:solidFill>
+                <a:schemeClr val="tx1"/>
+              </a:solidFill>
+            </p:spPr>
+            <p:style>
+              <a:lnRef idx="2">
+                <a:schemeClr val="accent1">
+                  <a:shade val="50000"/>
+                </a:schemeClr>
+              </a:lnRef>
+              <a:fillRef idx="1">
+                <a:schemeClr val="accent1"/>
+              </a:fillRef>
+              <a:effectRef idx="0">
+                <a:schemeClr val="accent1"/>
+              </a:effectRef>
+              <a:fontRef idx="minor">
+                <a:schemeClr val="lt1"/>
+              </a:fontRef>
+            </p:style>
+            <p:txBody>
+              <a:bodyPr rtlCol="0" anchor="ctr"/>
+              <a:lstStyle/>
+              <a:p>
+                <a:pPr algn="ctr"/>
+                <a:endParaRPr lang="en-US"/>
+              </a:p>
+            </p:txBody>
+          </p:sp>
+        </p:grpSp>
+        <p:grpSp>
+          <p:nvGrpSpPr>
+            <p:cNvPr id="10" name="Group 9">
+              <a:extLst>
+                <a:ext uri="{FF2B5EF4-FFF2-40B4-BE49-F238E27FC236}">
+                  <a16:creationId xmlns:a16="http://schemas.microsoft.com/office/drawing/2014/main" id="{0AE5BDBB-E101-4EBF-B271-275E8025917D}"/>
+                </a:ext>
+              </a:extLst>
+            </p:cNvPr>
+            <p:cNvGrpSpPr/>
+            <p:nvPr/>
+          </p:nvGrpSpPr>
+          <p:grpSpPr>
+            <a:xfrm>
+              <a:off x="1070531" y="2628142"/>
+              <a:ext cx="577816" cy="636933"/>
+              <a:chOff x="1070531" y="2628142"/>
+              <a:chExt cx="577816" cy="636933"/>
+            </a:xfrm>
+          </p:grpSpPr>
+          <p:sp>
+            <p:nvSpPr>
+              <p:cNvPr id="11" name="Rectangle 10">
+                <a:extLst>
+                  <a:ext uri="{FF2B5EF4-FFF2-40B4-BE49-F238E27FC236}">
+                    <a16:creationId xmlns:a16="http://schemas.microsoft.com/office/drawing/2014/main" id="{0FE00938-E70D-4273-9B0F-1EBB063F295F}"/>
+                  </a:ext>
+                </a:extLst>
+              </p:cNvPr>
+              <p:cNvSpPr/>
+              <p:nvPr/>
+            </p:nvSpPr>
+            <p:spPr>
+              <a:xfrm rot="18054809">
+                <a:off x="1047905" y="2809102"/>
+                <a:ext cx="478599" cy="433348"/>
+              </a:xfrm>
+              <a:prstGeom prst="rect">
+                <a:avLst/>
+              </a:prstGeom>
+              <a:solidFill>
+                <a:schemeClr val="tx1">
+                  <a:lumMod val="95000"/>
+                  <a:lumOff val="5000"/>
+                </a:schemeClr>
+              </a:solidFill>
+            </p:spPr>
+            <p:style>
+              <a:lnRef idx="2">
+                <a:schemeClr val="accent1">
+                  <a:shade val="50000"/>
+                </a:schemeClr>
+              </a:lnRef>
+              <a:fillRef idx="1">
+                <a:schemeClr val="accent1"/>
+              </a:fillRef>
+              <a:effectRef idx="0">
+                <a:schemeClr val="accent1"/>
+              </a:effectRef>
+              <a:fontRef idx="minor">
+                <a:schemeClr val="lt1"/>
+              </a:fontRef>
+            </p:style>
+            <p:txBody>
+              <a:bodyPr rtlCol="0" anchor="ctr"/>
+              <a:lstStyle/>
+              <a:p>
+                <a:pPr algn="ctr"/>
+                <a:endParaRPr lang="en-US"/>
+              </a:p>
+            </p:txBody>
+          </p:sp>
+          <p:sp>
+            <p:nvSpPr>
+              <p:cNvPr id="12" name="Rectangle 11">
+                <a:extLst>
+                  <a:ext uri="{FF2B5EF4-FFF2-40B4-BE49-F238E27FC236}">
+                    <a16:creationId xmlns:a16="http://schemas.microsoft.com/office/drawing/2014/main" id="{29B3F658-7F20-41CB-82F4-CD1E40CCF915}"/>
+                  </a:ext>
+                </a:extLst>
+              </p:cNvPr>
+              <p:cNvSpPr/>
+              <p:nvPr/>
+            </p:nvSpPr>
+            <p:spPr>
+              <a:xfrm rot="18213472">
+                <a:off x="1412677" y="2715997"/>
+                <a:ext cx="221429" cy="45719"/>
+              </a:xfrm>
+              <a:prstGeom prst="rect">
+                <a:avLst/>
+              </a:prstGeom>
+              <a:solidFill>
+                <a:schemeClr val="tx1"/>
+              </a:solidFill>
+            </p:spPr>
+            <p:style>
+              <a:lnRef idx="2">
+                <a:schemeClr val="accent1">
+                  <a:shade val="50000"/>
+                </a:schemeClr>
+              </a:lnRef>
+              <a:fillRef idx="1">
+                <a:schemeClr val="accent1"/>
+              </a:fillRef>
+              <a:effectRef idx="0">
+                <a:schemeClr val="accent1"/>
+              </a:effectRef>
+              <a:fontRef idx="minor">
+                <a:schemeClr val="lt1"/>
+              </a:fontRef>
+            </p:style>
+            <p:txBody>
+              <a:bodyPr rtlCol="0" anchor="ctr"/>
+              <a:lstStyle/>
+              <a:p>
+                <a:pPr algn="ctr"/>
+                <a:endParaRPr lang="en-US"/>
+              </a:p>
+            </p:txBody>
+          </p:sp>
+          <p:sp>
+            <p:nvSpPr>
+              <p:cNvPr id="13" name="Rectangle 12">
+                <a:extLst>
+                  <a:ext uri="{FF2B5EF4-FFF2-40B4-BE49-F238E27FC236}">
+                    <a16:creationId xmlns:a16="http://schemas.microsoft.com/office/drawing/2014/main" id="{77B4914D-2AB2-49F4-8ACE-F669F9F6D678}"/>
+                  </a:ext>
+                </a:extLst>
+              </p:cNvPr>
+              <p:cNvSpPr/>
+              <p:nvPr/>
+            </p:nvSpPr>
+            <p:spPr>
+              <a:xfrm rot="18213472">
+                <a:off x="1514773" y="2779497"/>
+                <a:ext cx="221429" cy="45719"/>
+              </a:xfrm>
+              <a:prstGeom prst="rect">
+                <a:avLst/>
+              </a:prstGeom>
+              <a:solidFill>
+                <a:schemeClr val="tx1"/>
+              </a:solidFill>
+            </p:spPr>
+            <p:style>
+              <a:lnRef idx="2">
+                <a:schemeClr val="accent1">
+                  <a:shade val="50000"/>
+                </a:schemeClr>
+              </a:lnRef>
+              <a:fillRef idx="1">
+                <a:schemeClr val="accent1"/>
+              </a:fillRef>
+              <a:effectRef idx="0">
+                <a:schemeClr val="accent1"/>
+              </a:effectRef>
+              <a:fontRef idx="minor">
+                <a:schemeClr val="lt1"/>
+              </a:fontRef>
+            </p:style>
+            <p:txBody>
+              <a:bodyPr rtlCol="0" anchor="ctr"/>
+              <a:lstStyle/>
+              <a:p>
+                <a:pPr algn="ctr"/>
+                <a:endParaRPr lang="en-US"/>
+              </a:p>
+            </p:txBody>
+          </p:sp>
+        </p:grpSp>
+      </p:grpSp>
+      <p:sp>
+        <p:nvSpPr>
+          <p:cNvPr id="26" name="Rectangle 25">
+            <a:extLst>
+              <a:ext uri="{FF2B5EF4-FFF2-40B4-BE49-F238E27FC236}">
+                <a16:creationId xmlns:a16="http://schemas.microsoft.com/office/drawing/2014/main" id="{3363469C-B5E3-4850-A601-11AD41D4BBCB}"/>
+              </a:ext>
+            </a:extLst>
+          </p:cNvPr>
+          <p:cNvSpPr/>
+          <p:nvPr/>
+        </p:nvSpPr>
+        <p:spPr>
+          <a:xfrm rot="15064516">
+            <a:off x="9492362" y="3832303"/>
+            <a:ext cx="850988" cy="331313"/>
+          </a:xfrm>
+          <a:prstGeom prst="rect">
+            <a:avLst/>
+          </a:prstGeom>
+        </p:spPr>
+        <p:style>
+          <a:lnRef idx="2">
+            <a:schemeClr val="accent5">
+              <a:shade val="50000"/>
+            </a:schemeClr>
+          </a:lnRef>
+          <a:fillRef idx="1">
+            <a:schemeClr val="accent5"/>
+          </a:fillRef>
+          <a:effectRef idx="0">
+            <a:schemeClr val="accent5"/>
+          </a:effectRef>
+          <a:fontRef idx="minor">
+            <a:schemeClr val="lt1"/>
+          </a:fontRef>
+        </p:style>
+        <p:txBody>
+          <a:bodyPr rtlCol="0" anchor="ctr"/>
+          <a:lstStyle/>
+          <a:p>
+            <a:pPr algn="ctr"/>
+            <a:r>
+              <a:rPr lang="en-US" dirty="0"/>
+              <a:t> UBEC</a:t>
+            </a:r>
+          </a:p>
+        </p:txBody>
+      </p:sp>
+      <p:sp>
+        <p:nvSpPr>
+          <p:cNvPr id="27" name="Rectangle 26">
+            <a:extLst>
+              <a:ext uri="{FF2B5EF4-FFF2-40B4-BE49-F238E27FC236}">
+                <a16:creationId xmlns:a16="http://schemas.microsoft.com/office/drawing/2014/main" id="{04F83FCE-AF0E-4EAF-89D5-421E40656273}"/>
+              </a:ext>
+            </a:extLst>
+          </p:cNvPr>
+          <p:cNvSpPr/>
+          <p:nvPr/>
+        </p:nvSpPr>
+        <p:spPr>
+          <a:xfrm rot="3355565">
+            <a:off x="9665928" y="3308220"/>
+            <a:ext cx="175572" cy="336594"/>
+          </a:xfrm>
+          <a:prstGeom prst="rect">
+            <a:avLst/>
+          </a:prstGeom>
+          <a:solidFill>
+            <a:schemeClr val="accent6">
+              <a:lumMod val="40000"/>
+              <a:lumOff val="60000"/>
+            </a:schemeClr>
+          </a:solidFill>
+        </p:spPr>
+        <p:style>
+          <a:lnRef idx="2">
+            <a:schemeClr val="accent1">
+              <a:shade val="50000"/>
+            </a:schemeClr>
+          </a:lnRef>
+          <a:fillRef idx="1">
+            <a:schemeClr val="accent1"/>
+          </a:fillRef>
+          <a:effectRef idx="0">
+            <a:schemeClr val="accent1"/>
+          </a:effectRef>
+          <a:fontRef idx="minor">
+            <a:schemeClr val="lt1"/>
+          </a:fontRef>
+        </p:style>
+        <p:txBody>
+          <a:bodyPr rtlCol="0" anchor="ctr"/>
+          <a:lstStyle/>
+          <a:p>
+            <a:pPr algn="ctr"/>
+            <a:endParaRPr lang="en-US"/>
+          </a:p>
+        </p:txBody>
+      </p:sp>
+      <p:sp>
+        <p:nvSpPr>
+          <p:cNvPr id="29" name="Rectangle 28">
+            <a:extLst>
+              <a:ext uri="{FF2B5EF4-FFF2-40B4-BE49-F238E27FC236}">
+                <a16:creationId xmlns:a16="http://schemas.microsoft.com/office/drawing/2014/main" id="{75DA5D87-A5F5-41FF-9E5B-BA8DCA2D83B5}"/>
+              </a:ext>
+            </a:extLst>
+          </p:cNvPr>
+          <p:cNvSpPr/>
+          <p:nvPr/>
+        </p:nvSpPr>
+        <p:spPr>
+          <a:xfrm rot="20653546">
+            <a:off x="10693744" y="5042581"/>
+            <a:ext cx="64302" cy="784651"/>
+          </a:xfrm>
+          <a:prstGeom prst="rect">
+            <a:avLst/>
+          </a:prstGeom>
+          <a:solidFill>
+            <a:schemeClr val="accent4">
+              <a:lumMod val="60000"/>
+              <a:lumOff val="40000"/>
+            </a:schemeClr>
+          </a:solidFill>
+        </p:spPr>
+        <p:style>
+          <a:lnRef idx="2">
+            <a:schemeClr val="accent1">
+              <a:shade val="50000"/>
+            </a:schemeClr>
+          </a:lnRef>
+          <a:fillRef idx="1">
+            <a:schemeClr val="accent1"/>
+          </a:fillRef>
+          <a:effectRef idx="0">
+            <a:schemeClr val="accent1"/>
+          </a:effectRef>
+          <a:fontRef idx="minor">
+            <a:schemeClr val="lt1"/>
+          </a:fontRef>
+        </p:style>
+        <p:txBody>
+          <a:bodyPr rtlCol="0" anchor="ctr"/>
+          <a:lstStyle/>
+          <a:p>
+            <a:pPr algn="ctr"/>
+            <a:endParaRPr lang="en-US"/>
+          </a:p>
+        </p:txBody>
+      </p:sp>
+      <p:sp>
+        <p:nvSpPr>
+          <p:cNvPr id="30" name="Rectangle 29">
+            <a:extLst>
+              <a:ext uri="{FF2B5EF4-FFF2-40B4-BE49-F238E27FC236}">
+                <a16:creationId xmlns:a16="http://schemas.microsoft.com/office/drawing/2014/main" id="{20733B9B-7E8B-4845-B636-05948F6F81E0}"/>
+              </a:ext>
+            </a:extLst>
+          </p:cNvPr>
+          <p:cNvSpPr/>
+          <p:nvPr/>
+        </p:nvSpPr>
+        <p:spPr>
+          <a:xfrm>
+            <a:off x="10024535" y="2508710"/>
+            <a:ext cx="248778" cy="98118"/>
+          </a:xfrm>
+          <a:prstGeom prst="rect">
+            <a:avLst/>
+          </a:prstGeom>
+          <a:solidFill>
+            <a:srgbClr val="36F856"/>
+          </a:solidFill>
+        </p:spPr>
+        <p:style>
+          <a:lnRef idx="2">
+            <a:schemeClr val="accent1">
+              <a:shade val="50000"/>
+            </a:schemeClr>
+          </a:lnRef>
+          <a:fillRef idx="1">
+            <a:schemeClr val="accent1"/>
+          </a:fillRef>
+          <a:effectRef idx="0">
+            <a:schemeClr val="accent1"/>
+          </a:effectRef>
+          <a:fontRef idx="minor">
+            <a:schemeClr val="lt1"/>
+          </a:fontRef>
+        </p:style>
+        <p:txBody>
+          <a:bodyPr rtlCol="0" anchor="ctr"/>
+          <a:lstStyle/>
+          <a:p>
+            <a:pPr algn="ctr"/>
+            <a:endParaRPr lang="en-US"/>
+          </a:p>
+        </p:txBody>
+      </p:sp>
+      <p:grpSp>
+        <p:nvGrpSpPr>
+          <p:cNvPr id="31" name="Group 30">
+            <a:extLst>
+              <a:ext uri="{FF2B5EF4-FFF2-40B4-BE49-F238E27FC236}">
+                <a16:creationId xmlns:a16="http://schemas.microsoft.com/office/drawing/2014/main" id="{744AD4F3-A33E-447C-B6B1-BB4804E55FA9}"/>
+              </a:ext>
+            </a:extLst>
+          </p:cNvPr>
+          <p:cNvGrpSpPr/>
+          <p:nvPr/>
+        </p:nvGrpSpPr>
+        <p:grpSpPr>
+          <a:xfrm>
+            <a:off x="8599866" y="2592467"/>
+            <a:ext cx="549138" cy="600209"/>
+            <a:chOff x="8599866" y="2592467"/>
+            <a:chExt cx="549138" cy="600209"/>
+          </a:xfrm>
+        </p:grpSpPr>
+        <p:sp>
+          <p:nvSpPr>
+            <p:cNvPr id="32" name="Rectangle 31">
+              <a:extLst>
+                <a:ext uri="{FF2B5EF4-FFF2-40B4-BE49-F238E27FC236}">
+                  <a16:creationId xmlns:a16="http://schemas.microsoft.com/office/drawing/2014/main" id="{05A7CA1D-1BAC-48E6-B333-C8E69C238C03}"/>
+                </a:ext>
+              </a:extLst>
+            </p:cNvPr>
+            <p:cNvSpPr/>
+            <p:nvPr/>
+          </p:nvSpPr>
+          <p:spPr>
+            <a:xfrm>
+              <a:off x="8599866" y="2620374"/>
+              <a:ext cx="549138" cy="572302"/>
+            </a:xfrm>
+            <a:prstGeom prst="rect">
+              <a:avLst/>
+            </a:prstGeom>
+            <a:solidFill>
+              <a:schemeClr val="accent5"/>
+            </a:solidFill>
+            <a:ln>
+              <a:solidFill>
+                <a:srgbClr val="0070C0"/>
+              </a:solidFill>
+            </a:ln>
+          </p:spPr>
+          <p:style>
+            <a:lnRef idx="2">
+              <a:schemeClr val="accent1">
+                <a:shade val="50000"/>
+              </a:schemeClr>
+            </a:lnRef>
+            <a:fillRef idx="1">
+              <a:schemeClr val="accent1"/>
+            </a:fillRef>
+            <a:effectRef idx="0">
+              <a:schemeClr val="accent1"/>
+            </a:effectRef>
+            <a:fontRef idx="minor">
+              <a:schemeClr val="lt1"/>
+            </a:fontRef>
+          </p:style>
+          <p:txBody>
+            <a:bodyPr rtlCol="0" anchor="ctr"/>
+            <a:lstStyle/>
+            <a:p>
+              <a:pPr algn="ctr"/>
+              <a:r>
+                <a:rPr lang="en-US" sz="1200" dirty="0"/>
+                <a:t>YX</a:t>
+              </a:r>
+            </a:p>
+            <a:p>
+              <a:pPr algn="ctr"/>
+              <a:r>
+                <a:rPr lang="en-US" sz="1200" dirty="0"/>
+                <a:t>5200</a:t>
+              </a:r>
+            </a:p>
+          </p:txBody>
+        </p:sp>
+        <p:sp>
+          <p:nvSpPr>
+            <p:cNvPr id="33" name="Oval 32">
+              <a:extLst>
+                <a:ext uri="{FF2B5EF4-FFF2-40B4-BE49-F238E27FC236}">
+                  <a16:creationId xmlns:a16="http://schemas.microsoft.com/office/drawing/2014/main" id="{E41082DF-47E4-4746-9F65-F9CC44CB7624}"/>
+                </a:ext>
+              </a:extLst>
+            </p:cNvPr>
+            <p:cNvSpPr/>
+            <p:nvPr/>
+          </p:nvSpPr>
+          <p:spPr>
+            <a:xfrm>
+              <a:off x="8838064" y="2592467"/>
+              <a:ext cx="54186" cy="46399"/>
+            </a:xfrm>
+            <a:prstGeom prst="ellipse">
+              <a:avLst/>
+            </a:prstGeom>
+            <a:solidFill>
+              <a:schemeClr val="accent3">
+                <a:lumMod val="40000"/>
+                <a:lumOff val="60000"/>
+              </a:schemeClr>
+            </a:solidFill>
+            <a:ln>
+              <a:solidFill>
+                <a:schemeClr val="accent3">
+                  <a:lumMod val="40000"/>
+                  <a:lumOff val="60000"/>
+                </a:schemeClr>
+              </a:solidFill>
+            </a:ln>
+          </p:spPr>
+          <p:style>
+            <a:lnRef idx="2">
+              <a:schemeClr val="accent1">
+                <a:shade val="50000"/>
+              </a:schemeClr>
+            </a:lnRef>
+            <a:fillRef idx="1">
+              <a:schemeClr val="accent1"/>
+            </a:fillRef>
+            <a:effectRef idx="0">
+              <a:schemeClr val="accent1"/>
+            </a:effectRef>
+            <a:fontRef idx="minor">
+              <a:schemeClr val="lt1"/>
+            </a:fontRef>
+          </p:style>
+          <p:txBody>
+            <a:bodyPr rtlCol="0" anchor="ctr"/>
+            <a:lstStyle/>
+            <a:p>
+              <a:pPr algn="ctr"/>
+              <a:endParaRPr lang="en-US"/>
+            </a:p>
+          </p:txBody>
+        </p:sp>
+      </p:grpSp>
+      <p:grpSp>
+        <p:nvGrpSpPr>
+          <p:cNvPr id="34" name="Group 33">
+            <a:extLst>
+              <a:ext uri="{FF2B5EF4-FFF2-40B4-BE49-F238E27FC236}">
+                <a16:creationId xmlns:a16="http://schemas.microsoft.com/office/drawing/2014/main" id="{9BD12F2A-1262-45F6-9303-EA90AEA4C8CA}"/>
+              </a:ext>
+            </a:extLst>
+          </p:cNvPr>
+          <p:cNvGrpSpPr/>
+          <p:nvPr/>
+        </p:nvGrpSpPr>
+        <p:grpSpPr>
+          <a:xfrm rot="16019730">
+            <a:off x="9227780" y="4363881"/>
+            <a:ext cx="534377" cy="189534"/>
+            <a:chOff x="9382567" y="3220117"/>
+            <a:chExt cx="534377" cy="189534"/>
+          </a:xfrm>
+        </p:grpSpPr>
+        <p:sp>
+          <p:nvSpPr>
+            <p:cNvPr id="35" name="Rectangle 34">
+              <a:extLst>
+                <a:ext uri="{FF2B5EF4-FFF2-40B4-BE49-F238E27FC236}">
+                  <a16:creationId xmlns:a16="http://schemas.microsoft.com/office/drawing/2014/main" id="{1919EAF8-3FE6-4254-9BEE-C5331042D628}"/>
+                </a:ext>
+              </a:extLst>
+            </p:cNvPr>
+            <p:cNvSpPr/>
+            <p:nvPr/>
+          </p:nvSpPr>
+          <p:spPr>
+            <a:xfrm rot="20675816">
+              <a:off x="9382567" y="3230531"/>
+              <a:ext cx="517241" cy="179120"/>
+            </a:xfrm>
+            <a:prstGeom prst="rect">
+              <a:avLst/>
+            </a:prstGeom>
+          </p:spPr>
+          <p:style>
+            <a:lnRef idx="2">
+              <a:schemeClr val="accent1">
+                <a:shade val="50000"/>
+              </a:schemeClr>
+            </a:lnRef>
+            <a:fillRef idx="1">
+              <a:schemeClr val="accent1"/>
+            </a:fillRef>
+            <a:effectRef idx="0">
+              <a:schemeClr val="accent1"/>
+            </a:effectRef>
+            <a:fontRef idx="minor">
+              <a:schemeClr val="lt1"/>
+            </a:fontRef>
+          </p:style>
+          <p:txBody>
+            <a:bodyPr rtlCol="0" anchor="ctr"/>
+            <a:lstStyle/>
+            <a:p>
+              <a:pPr algn="ctr"/>
+              <a:r>
+                <a:rPr lang="en-US" sz="1400" dirty="0"/>
+                <a:t>125</a:t>
+              </a:r>
+            </a:p>
+          </p:txBody>
+        </p:sp>
+        <p:sp>
+          <p:nvSpPr>
+            <p:cNvPr id="36" name="Oval 35">
+              <a:extLst>
+                <a:ext uri="{FF2B5EF4-FFF2-40B4-BE49-F238E27FC236}">
+                  <a16:creationId xmlns:a16="http://schemas.microsoft.com/office/drawing/2014/main" id="{595B925E-A2CA-42F7-B52C-5017BAB5F06A}"/>
+                </a:ext>
+              </a:extLst>
+            </p:cNvPr>
+            <p:cNvSpPr/>
+            <p:nvPr/>
+          </p:nvSpPr>
+          <p:spPr>
+            <a:xfrm>
+              <a:off x="9862758" y="3220117"/>
+              <a:ext cx="54186" cy="46399"/>
+            </a:xfrm>
+            <a:prstGeom prst="ellipse">
+              <a:avLst/>
+            </a:prstGeom>
+            <a:solidFill>
+              <a:schemeClr val="accent3">
+                <a:lumMod val="40000"/>
+                <a:lumOff val="60000"/>
+              </a:schemeClr>
+            </a:solidFill>
+            <a:ln>
+              <a:solidFill>
+                <a:schemeClr val="accent3">
+                  <a:lumMod val="40000"/>
+                  <a:lumOff val="60000"/>
+                </a:schemeClr>
+              </a:solidFill>
+            </a:ln>
+          </p:spPr>
+          <p:style>
+            <a:lnRef idx="2">
+              <a:schemeClr val="accent1">
+                <a:shade val="50000"/>
+              </a:schemeClr>
+            </a:lnRef>
+            <a:fillRef idx="1">
+              <a:schemeClr val="accent1"/>
+            </a:fillRef>
+            <a:effectRef idx="0">
+              <a:schemeClr val="accent1"/>
+            </a:effectRef>
+            <a:fontRef idx="minor">
+              <a:schemeClr val="lt1"/>
+            </a:fontRef>
+          </p:style>
+          <p:txBody>
+            <a:bodyPr rtlCol="0" anchor="ctr"/>
+            <a:lstStyle/>
+            <a:p>
+              <a:pPr algn="ctr"/>
+              <a:endParaRPr lang="en-US"/>
+            </a:p>
+          </p:txBody>
+        </p:sp>
+      </p:grpSp>
+      <p:sp>
+        <p:nvSpPr>
+          <p:cNvPr id="38" name="TextBox 37">
+            <a:extLst>
+              <a:ext uri="{FF2B5EF4-FFF2-40B4-BE49-F238E27FC236}">
+                <a16:creationId xmlns:a16="http://schemas.microsoft.com/office/drawing/2014/main" id="{3640D38F-85CB-449C-B536-E537606B3102}"/>
+              </a:ext>
+            </a:extLst>
+          </p:cNvPr>
+          <p:cNvSpPr txBox="1"/>
+          <p:nvPr/>
+        </p:nvSpPr>
+        <p:spPr>
+          <a:xfrm rot="20266484">
+            <a:off x="9895418" y="4241706"/>
+            <a:ext cx="290464" cy="215444"/>
+          </a:xfrm>
+          <a:prstGeom prst="rect">
+            <a:avLst/>
+          </a:prstGeom>
+          <a:noFill/>
+        </p:spPr>
+        <p:txBody>
+          <a:bodyPr wrap="none" rtlCol="0">
+            <a:spAutoFit/>
+          </a:bodyPr>
+          <a:lstStyle/>
+          <a:p>
+            <a:r>
+              <a:rPr lang="en-US" sz="800" dirty="0">
+                <a:solidFill>
+                  <a:schemeClr val="bg1"/>
+                </a:solidFill>
+              </a:rPr>
+              <a:t>IN</a:t>
+            </a:r>
+          </a:p>
+        </p:txBody>
+      </p:sp>
+      <p:grpSp>
+        <p:nvGrpSpPr>
+          <p:cNvPr id="39" name="Group 38">
+            <a:extLst>
+              <a:ext uri="{FF2B5EF4-FFF2-40B4-BE49-F238E27FC236}">
+                <a16:creationId xmlns:a16="http://schemas.microsoft.com/office/drawing/2014/main" id="{EC8881DB-3E86-439C-9FDE-52D09AF68151}"/>
+              </a:ext>
+            </a:extLst>
+          </p:cNvPr>
+          <p:cNvGrpSpPr/>
+          <p:nvPr/>
+        </p:nvGrpSpPr>
+        <p:grpSpPr>
+          <a:xfrm rot="16019730">
+            <a:off x="9454507" y="5131573"/>
+            <a:ext cx="534377" cy="189534"/>
+            <a:chOff x="9382567" y="3220117"/>
+            <a:chExt cx="534377" cy="189534"/>
+          </a:xfrm>
+        </p:grpSpPr>
+        <p:sp>
+          <p:nvSpPr>
+            <p:cNvPr id="40" name="Rectangle 39">
+              <a:extLst>
+                <a:ext uri="{FF2B5EF4-FFF2-40B4-BE49-F238E27FC236}">
+                  <a16:creationId xmlns:a16="http://schemas.microsoft.com/office/drawing/2014/main" id="{BF652637-5C03-40F0-B695-30A6E3AB22A1}"/>
+                </a:ext>
+              </a:extLst>
+            </p:cNvPr>
+            <p:cNvSpPr/>
+            <p:nvPr/>
+          </p:nvSpPr>
+          <p:spPr>
+            <a:xfrm rot="20675816">
+              <a:off x="9382567" y="3230531"/>
+              <a:ext cx="517241" cy="179120"/>
+            </a:xfrm>
+            <a:prstGeom prst="rect">
+              <a:avLst/>
+            </a:prstGeom>
+          </p:spPr>
+          <p:style>
+            <a:lnRef idx="2">
+              <a:schemeClr val="accent1">
+                <a:shade val="50000"/>
+              </a:schemeClr>
+            </a:lnRef>
+            <a:fillRef idx="1">
+              <a:schemeClr val="accent1"/>
+            </a:fillRef>
+            <a:effectRef idx="0">
+              <a:schemeClr val="accent1"/>
+            </a:effectRef>
+            <a:fontRef idx="minor">
+              <a:schemeClr val="lt1"/>
+            </a:fontRef>
+          </p:style>
+          <p:txBody>
+            <a:bodyPr rtlCol="0" anchor="ctr"/>
+            <a:lstStyle/>
+            <a:p>
+              <a:pPr algn="ctr"/>
+              <a:r>
+                <a:rPr lang="en-US" sz="1200" dirty="0"/>
+                <a:t>KCX</a:t>
+              </a:r>
+            </a:p>
+          </p:txBody>
+        </p:sp>
+        <p:sp>
+          <p:nvSpPr>
+            <p:cNvPr id="41" name="Oval 40">
+              <a:extLst>
+                <a:ext uri="{FF2B5EF4-FFF2-40B4-BE49-F238E27FC236}">
+                  <a16:creationId xmlns:a16="http://schemas.microsoft.com/office/drawing/2014/main" id="{F24FD21A-F125-4BA5-A023-3A28F82D3892}"/>
+                </a:ext>
+              </a:extLst>
+            </p:cNvPr>
+            <p:cNvSpPr/>
+            <p:nvPr/>
+          </p:nvSpPr>
+          <p:spPr>
+            <a:xfrm>
+              <a:off x="9862758" y="3220117"/>
+              <a:ext cx="54186" cy="46399"/>
+            </a:xfrm>
+            <a:prstGeom prst="ellipse">
+              <a:avLst/>
+            </a:prstGeom>
+            <a:solidFill>
+              <a:schemeClr val="accent3">
+                <a:lumMod val="40000"/>
+                <a:lumOff val="60000"/>
+              </a:schemeClr>
+            </a:solidFill>
+            <a:ln>
+              <a:solidFill>
+                <a:schemeClr val="accent3">
+                  <a:lumMod val="40000"/>
+                  <a:lumOff val="60000"/>
+                </a:schemeClr>
+              </a:solidFill>
+            </a:ln>
+          </p:spPr>
+          <p:style>
+            <a:lnRef idx="2">
+              <a:schemeClr val="accent1">
+                <a:shade val="50000"/>
+              </a:schemeClr>
+            </a:lnRef>
+            <a:fillRef idx="1">
+              <a:schemeClr val="accent1"/>
+            </a:fillRef>
+            <a:effectRef idx="0">
+              <a:schemeClr val="accent1"/>
+            </a:effectRef>
+            <a:fontRef idx="minor">
+              <a:schemeClr val="lt1"/>
+            </a:fontRef>
+          </p:style>
+          <p:txBody>
+            <a:bodyPr rtlCol="0" anchor="ctr"/>
+            <a:lstStyle/>
+            <a:p>
+              <a:pPr algn="ctr"/>
+              <a:endParaRPr lang="en-US" sz="1200"/>
+            </a:p>
+          </p:txBody>
+        </p:sp>
+      </p:grpSp>
+      <p:sp>
+        <p:nvSpPr>
+          <p:cNvPr id="4" name="Rectangle 3">
+            <a:extLst>
+              <a:ext uri="{FF2B5EF4-FFF2-40B4-BE49-F238E27FC236}">
+                <a16:creationId xmlns:a16="http://schemas.microsoft.com/office/drawing/2014/main" id="{13495F2B-8FCE-446D-8B24-ACAE63D3707C}"/>
+              </a:ext>
+            </a:extLst>
+          </p:cNvPr>
+          <p:cNvSpPr/>
+          <p:nvPr/>
+        </p:nvSpPr>
+        <p:spPr>
+          <a:xfrm rot="5400000">
+            <a:off x="7853957" y="5102742"/>
+            <a:ext cx="1126941" cy="508003"/>
+          </a:xfrm>
+          <a:prstGeom prst="rect">
+            <a:avLst/>
+          </a:prstGeom>
+          <a:solidFill>
+            <a:schemeClr val="accent5"/>
+          </a:solidFill>
+          <a:ln>
+            <a:solidFill>
+              <a:schemeClr val="accent5"/>
+            </a:solidFill>
+          </a:ln>
+        </p:spPr>
+        <p:style>
+          <a:lnRef idx="2">
+            <a:schemeClr val="accent1">
+              <a:shade val="50000"/>
+            </a:schemeClr>
+          </a:lnRef>
+          <a:fillRef idx="1">
+            <a:schemeClr val="accent1"/>
+          </a:fillRef>
+          <a:effectRef idx="0">
+            <a:schemeClr val="accent1"/>
+          </a:effectRef>
+          <a:fontRef idx="minor">
+            <a:schemeClr val="lt1"/>
+          </a:fontRef>
+        </p:style>
+        <p:txBody>
+          <a:bodyPr rtlCol="0" anchor="ctr"/>
+          <a:lstStyle/>
+          <a:p>
+            <a:pPr algn="ctr"/>
+            <a:r>
+              <a:rPr lang="en-US" dirty="0"/>
+              <a:t>Prog </a:t>
+            </a:r>
+            <a:r>
+              <a:rPr lang="en-US" dirty="0" err="1"/>
+              <a:t>Ardu</a:t>
+            </a:r>
+            <a:endParaRPr lang="en-US" dirty="0"/>
+          </a:p>
+        </p:txBody>
+      </p:sp>
+      <p:cxnSp>
+        <p:nvCxnSpPr>
+          <p:cNvPr id="44" name="Straight Connector 43">
+            <a:extLst>
+              <a:ext uri="{FF2B5EF4-FFF2-40B4-BE49-F238E27FC236}">
+                <a16:creationId xmlns:a16="http://schemas.microsoft.com/office/drawing/2014/main" id="{590B4BA7-DFB4-4F73-8617-4CBE043770F3}"/>
+              </a:ext>
+            </a:extLst>
+          </p:cNvPr>
+          <p:cNvCxnSpPr>
+            <a:endCxn id="40" idx="0"/>
+          </p:cNvCxnSpPr>
+          <p:nvPr/>
+        </p:nvCxnSpPr>
+        <p:spPr>
+          <a:xfrm>
+            <a:off x="8653486" y="4962053"/>
+            <a:ext cx="988881" cy="300850"/>
+          </a:xfrm>
+          <a:prstGeom prst="line">
+            <a:avLst/>
+          </a:prstGeom>
+          <a:ln w="12700">
+            <a:solidFill>
+              <a:schemeClr val="tx1"/>
+            </a:solidFill>
+          </a:ln>
+        </p:spPr>
+        <p:style>
+          <a:lnRef idx="1">
+            <a:schemeClr val="accent1"/>
+          </a:lnRef>
+          <a:fillRef idx="0">
+            <a:schemeClr val="accent1"/>
+          </a:fillRef>
+          <a:effectRef idx="0">
+            <a:schemeClr val="accent1"/>
+          </a:effectRef>
+          <a:fontRef idx="minor">
+            <a:schemeClr val="tx1"/>
+          </a:fontRef>
+        </p:style>
+      </p:cxnSp>
+      <p:sp>
+        <p:nvSpPr>
+          <p:cNvPr id="45" name="TextBox 44">
+            <a:extLst>
+              <a:ext uri="{FF2B5EF4-FFF2-40B4-BE49-F238E27FC236}">
+                <a16:creationId xmlns:a16="http://schemas.microsoft.com/office/drawing/2014/main" id="{D1002E0D-FFDA-4212-A4C1-D47E37E7FB5C}"/>
+              </a:ext>
+            </a:extLst>
+          </p:cNvPr>
+          <p:cNvSpPr txBox="1"/>
+          <p:nvPr/>
+        </p:nvSpPr>
+        <p:spPr>
+          <a:xfrm>
+            <a:off x="8802618" y="5096123"/>
+            <a:ext cx="677237" cy="276999"/>
+          </a:xfrm>
+          <a:prstGeom prst="rect">
+            <a:avLst/>
+          </a:prstGeom>
+          <a:noFill/>
+        </p:spPr>
+        <p:txBody>
+          <a:bodyPr wrap="none" rtlCol="0">
+            <a:spAutoFit/>
+          </a:bodyPr>
+          <a:lstStyle/>
+          <a:p>
+            <a:r>
+              <a:rPr lang="en-US" sz="1200" dirty="0"/>
+              <a:t>3 wires</a:t>
+            </a:r>
+          </a:p>
+        </p:txBody>
+      </p:sp>
+      <p:sp>
+        <p:nvSpPr>
+          <p:cNvPr id="47" name="Rectangle: Rounded Corners 46">
+            <a:extLst>
+              <a:ext uri="{FF2B5EF4-FFF2-40B4-BE49-F238E27FC236}">
+                <a16:creationId xmlns:a16="http://schemas.microsoft.com/office/drawing/2014/main" id="{3D94BD1C-2593-49F2-BF89-6F318F52CB20}"/>
+              </a:ext>
+            </a:extLst>
+          </p:cNvPr>
+          <p:cNvSpPr/>
+          <p:nvPr/>
+        </p:nvSpPr>
+        <p:spPr>
+          <a:xfrm>
+            <a:off x="8350269" y="4787158"/>
+            <a:ext cx="134315" cy="180926"/>
+          </a:xfrm>
+          <a:prstGeom prst="roundRect">
+            <a:avLst/>
+          </a:prstGeom>
+          <a:solidFill>
+            <a:schemeClr val="bg1"/>
+          </a:solidFill>
+        </p:spPr>
+        <p:style>
+          <a:lnRef idx="2">
+            <a:schemeClr val="accent1">
+              <a:shade val="50000"/>
+            </a:schemeClr>
+          </a:lnRef>
+          <a:fillRef idx="1">
+            <a:schemeClr val="accent1"/>
+          </a:fillRef>
+          <a:effectRef idx="0">
+            <a:schemeClr val="accent1"/>
+          </a:effectRef>
+          <a:fontRef idx="minor">
+            <a:schemeClr val="lt1"/>
+          </a:fontRef>
+        </p:style>
+        <p:txBody>
+          <a:bodyPr rtlCol="0" anchor="ctr"/>
+          <a:lstStyle/>
+          <a:p>
+            <a:pPr algn="ctr"/>
+            <a:endParaRPr lang="en-US"/>
+          </a:p>
+        </p:txBody>
+      </p:sp>
+      <p:sp>
+        <p:nvSpPr>
+          <p:cNvPr id="49" name="Freeform: Shape 48">
+            <a:extLst>
+              <a:ext uri="{FF2B5EF4-FFF2-40B4-BE49-F238E27FC236}">
+                <a16:creationId xmlns:a16="http://schemas.microsoft.com/office/drawing/2014/main" id="{0171344A-A62F-440E-8A13-661F78F244AB}"/>
+              </a:ext>
+            </a:extLst>
+          </p:cNvPr>
+          <p:cNvSpPr/>
+          <p:nvPr/>
+        </p:nvSpPr>
+        <p:spPr>
+          <a:xfrm>
+            <a:off x="6394784" y="3783932"/>
+            <a:ext cx="2033628" cy="1004636"/>
+          </a:xfrm>
+          <a:custGeom>
+            <a:avLst/>
+            <a:gdLst>
+              <a:gd name="connsiteX0" fmla="*/ 2009274 w 2033628"/>
+              <a:gd name="connsiteY0" fmla="*/ 1004636 h 1004636"/>
+              <a:gd name="connsiteX1" fmla="*/ 1750595 w 2033628"/>
+              <a:gd name="connsiteY1" fmla="*/ 348915 h 1004636"/>
+              <a:gd name="connsiteX2" fmla="*/ 0 w 2033628"/>
+              <a:gd name="connsiteY2" fmla="*/ 0 h 1004636"/>
+            </a:gdLst>
+            <a:ahLst/>
+            <a:cxnLst>
+              <a:cxn ang="0">
+                <a:pos x="connsiteX0" y="connsiteY0"/>
+              </a:cxn>
+              <a:cxn ang="0">
+                <a:pos x="connsiteX1" y="connsiteY1"/>
+              </a:cxn>
+              <a:cxn ang="0">
+                <a:pos x="connsiteX2" y="connsiteY2"/>
+              </a:cxn>
+            </a:cxnLst>
+            <a:rect l="l" t="t" r="r" b="b"/>
+            <a:pathLst>
+              <a:path w="2033628" h="1004636">
+                <a:moveTo>
+                  <a:pt x="2009274" y="1004636"/>
+                </a:moveTo>
+                <a:cubicBezTo>
+                  <a:pt x="2047374" y="760495"/>
+                  <a:pt x="2085474" y="516354"/>
+                  <a:pt x="1750595" y="348915"/>
+                </a:cubicBezTo>
+                <a:cubicBezTo>
+                  <a:pt x="1415716" y="181476"/>
+                  <a:pt x="295776" y="60158"/>
+                  <a:pt x="0" y="0"/>
+                </a:cubicBezTo>
+              </a:path>
+            </a:pathLst>
+          </a:custGeom>
+          <a:noFill/>
+          <a:ln w="38100"/>
+        </p:spPr>
+        <p:style>
+          <a:lnRef idx="2">
+            <a:schemeClr val="accent1">
+              <a:shade val="50000"/>
+            </a:schemeClr>
+          </a:lnRef>
+          <a:fillRef idx="1">
+            <a:schemeClr val="accent1"/>
+          </a:fillRef>
+          <a:effectRef idx="0">
+            <a:schemeClr val="accent1"/>
+          </a:effectRef>
+          <a:fontRef idx="minor">
+            <a:schemeClr val="lt1"/>
+          </a:fontRef>
+        </p:style>
+        <p:txBody>
+          <a:bodyPr rtlCol="0" anchor="ctr"/>
+          <a:lstStyle/>
+          <a:p>
+            <a:pPr algn="ctr"/>
+            <a:endParaRPr lang="en-US"/>
+          </a:p>
+        </p:txBody>
+      </p:sp>
+      <p:sp>
+        <p:nvSpPr>
+          <p:cNvPr id="51" name="TextBox 50">
+            <a:extLst>
+              <a:ext uri="{FF2B5EF4-FFF2-40B4-BE49-F238E27FC236}">
+                <a16:creationId xmlns:a16="http://schemas.microsoft.com/office/drawing/2014/main" id="{89EA6A16-A414-41BA-ABBF-74B0C55D2D3C}"/>
+              </a:ext>
+            </a:extLst>
+          </p:cNvPr>
+          <p:cNvSpPr txBox="1"/>
+          <p:nvPr/>
+        </p:nvSpPr>
+        <p:spPr>
+          <a:xfrm>
+            <a:off x="7072979" y="3956310"/>
+            <a:ext cx="478016" cy="276999"/>
+          </a:xfrm>
+          <a:prstGeom prst="rect">
+            <a:avLst/>
+          </a:prstGeom>
+          <a:noFill/>
+        </p:spPr>
+        <p:txBody>
+          <a:bodyPr wrap="none" rtlCol="0">
+            <a:spAutoFit/>
+          </a:bodyPr>
+          <a:lstStyle/>
+          <a:p>
+            <a:r>
+              <a:rPr lang="en-US" sz="1200" dirty="0"/>
+              <a:t>USB</a:t>
+            </a:r>
+          </a:p>
+        </p:txBody>
+      </p:sp>
       <p:pic>
         <p:nvPicPr>
-          <p:cNvPr id="1030" name="Picture 6" descr="Bluetooth Speakers, ZoeeTree S1Pro Speaker Bluetooth Wireless with 20W HD Sound &amp; Deep Bass, IPX7 Waterproof Speaker with 36Hours, 100Ft Wireless Range, Portable Speakers for Home, Outdoors, Travel">
-            <a:extLst>
-              <a:ext uri="{FF2B5EF4-FFF2-40B4-BE49-F238E27FC236}">
-                <a16:creationId xmlns:a16="http://schemas.microsoft.com/office/drawing/2014/main" id="{B65D2C01-14EA-4E28-BAF3-C6C76097C604}"/>
+          <p:cNvPr id="1028" name="Picture 4" descr="Image result for free clip art laptop">
+            <a:extLst>
+              <a:ext uri="{FF2B5EF4-FFF2-40B4-BE49-F238E27FC236}">
+                <a16:creationId xmlns:a16="http://schemas.microsoft.com/office/drawing/2014/main" id="{7F60D823-696C-4383-A952-1755FFB2183A}"/>
               </a:ext>
             </a:extLst>
           </p:cNvPr>
@@ -12542,7 +14247,7 @@
           <p:nvPr/>
         </p:nvPicPr>
         <p:blipFill>
-          <a:blip r:embed="rId3">
+          <a:blip r:embed="rId2">
             <a:extLst>
               <a:ext uri="{28A0092B-C50C-407E-A947-70E740481C1C}">
                 <a14:useLocalDpi xmlns:a14="http://schemas.microsoft.com/office/drawing/2010/main" val="0"/>
@@ -12556,8 +14261,8 @@
         </p:blipFill>
         <p:spPr bwMode="auto">
           <a:xfrm>
-            <a:off x="5950234" y="4877621"/>
-            <a:ext cx="833438" cy="833438"/>
+            <a:off x="5358768" y="2991666"/>
+            <a:ext cx="1314450" cy="1219200"/>
           </a:xfrm>
           <a:prstGeom prst="rect">
             <a:avLst/>
@@ -12574,6 +14279,160 @@
           </a:extLst>
         </p:spPr>
       </p:pic>
+      <p:pic>
+        <p:nvPicPr>
+          <p:cNvPr id="1030" name="Picture 6" descr="Bluetooth Speakers, ZoeeTree S1Pro Speaker Bluetooth Wireless with 20W HD Sound &amp; Deep Bass, IPX7 Waterproof Speaker with 36Hours, 100Ft Wireless Range, Portable Speakers for Home, Outdoors, Travel">
+            <a:extLst>
+              <a:ext uri="{FF2B5EF4-FFF2-40B4-BE49-F238E27FC236}">
+                <a16:creationId xmlns:a16="http://schemas.microsoft.com/office/drawing/2014/main" id="{B65D2C01-14EA-4E28-BAF3-C6C76097C604}"/>
+              </a:ext>
+            </a:extLst>
+          </p:cNvPr>
+          <p:cNvPicPr>
+            <a:picLocks noChangeAspect="1" noChangeArrowheads="1"/>
+          </p:cNvPicPr>
+          <p:nvPr/>
+        </p:nvPicPr>
+        <p:blipFill>
+          <a:blip r:embed="rId3">
+            <a:extLst>
+              <a:ext uri="{28A0092B-C50C-407E-A947-70E740481C1C}">
+                <a14:useLocalDpi xmlns:a14="http://schemas.microsoft.com/office/drawing/2010/main" val="0"/>
+              </a:ext>
+            </a:extLst>
+          </a:blip>
+          <a:srcRect/>
+          <a:stretch>
+            <a:fillRect/>
+          </a:stretch>
+        </p:blipFill>
+        <p:spPr bwMode="auto">
+          <a:xfrm>
+            <a:off x="5950234" y="4877621"/>
+            <a:ext cx="833438" cy="833438"/>
+          </a:xfrm>
+          <a:prstGeom prst="rect">
+            <a:avLst/>
+          </a:prstGeom>
+          <a:noFill/>
+          <a:extLst>
+            <a:ext uri="{909E8E84-426E-40DD-AFC4-6F175D3DCCD1}">
+              <a14:hiddenFill xmlns:a14="http://schemas.microsoft.com/office/drawing/2010/main">
+                <a:solidFill>
+                  <a:srgbClr val="FFFFFF"/>
+                </a:solidFill>
+              </a14:hiddenFill>
+            </a:ext>
+          </a:extLst>
+        </p:spPr>
+      </p:pic>
+      <p:sp>
+        <p:nvSpPr>
+          <p:cNvPr id="48" name="Rectangle 47">
+            <a:extLst>
+              <a:ext uri="{FF2B5EF4-FFF2-40B4-BE49-F238E27FC236}">
+                <a16:creationId xmlns:a16="http://schemas.microsoft.com/office/drawing/2014/main" id="{56FD9913-0392-CC8F-538A-949EFE1C24BF}"/>
+              </a:ext>
+            </a:extLst>
+          </p:cNvPr>
+          <p:cNvSpPr/>
+          <p:nvPr/>
+        </p:nvSpPr>
+        <p:spPr>
+          <a:xfrm rot="4359892">
+            <a:off x="9600943" y="4852847"/>
+            <a:ext cx="1126941" cy="417140"/>
+          </a:xfrm>
+          <a:prstGeom prst="rect">
+            <a:avLst/>
+          </a:prstGeom>
+          <a:solidFill>
+            <a:schemeClr val="accent5"/>
+          </a:solidFill>
+          <a:ln>
+            <a:solidFill>
+              <a:schemeClr val="accent5"/>
+            </a:solidFill>
+          </a:ln>
+        </p:spPr>
+        <p:style>
+          <a:lnRef idx="2">
+            <a:schemeClr val="accent1">
+              <a:shade val="50000"/>
+            </a:schemeClr>
+          </a:lnRef>
+          <a:fillRef idx="1">
+            <a:schemeClr val="accent1"/>
+          </a:fillRef>
+          <a:effectRef idx="0">
+            <a:schemeClr val="accent1"/>
+          </a:effectRef>
+          <a:fontRef idx="minor">
+            <a:schemeClr val="lt1"/>
+          </a:fontRef>
+        </p:style>
+        <p:txBody>
+          <a:bodyPr rtlCol="0" anchor="ctr"/>
+          <a:lstStyle/>
+          <a:p>
+            <a:pPr algn="ctr"/>
+            <a:r>
+              <a:rPr lang="en-US" dirty="0" err="1"/>
+              <a:t>Ardu</a:t>
+            </a:r>
+            <a:endParaRPr lang="en-US" dirty="0"/>
+          </a:p>
+        </p:txBody>
+      </p:sp>
+      <p:sp>
+        <p:nvSpPr>
+          <p:cNvPr id="50" name="Rectangle: Rounded Corners 49">
+            <a:extLst>
+              <a:ext uri="{FF2B5EF4-FFF2-40B4-BE49-F238E27FC236}">
+                <a16:creationId xmlns:a16="http://schemas.microsoft.com/office/drawing/2014/main" id="{F9BC8C74-EF0E-6A1F-A1A6-275E11D49BB8}"/>
+              </a:ext>
+            </a:extLst>
+          </p:cNvPr>
+          <p:cNvSpPr/>
+          <p:nvPr/>
+        </p:nvSpPr>
+        <p:spPr>
+          <a:xfrm rot="20513597">
+            <a:off x="10237283" y="5471988"/>
+            <a:ext cx="134315" cy="180926"/>
+          </a:xfrm>
+          <a:prstGeom prst="roundRect">
+            <a:avLst/>
+          </a:prstGeom>
+          <a:solidFill>
+            <a:schemeClr val="bg1"/>
+          </a:solidFill>
+        </p:spPr>
+        <p:style>
+          <a:lnRef idx="2">
+            <a:schemeClr val="accent1">
+              <a:shade val="50000"/>
+            </a:schemeClr>
+          </a:lnRef>
+          <a:fillRef idx="1">
+            <a:schemeClr val="accent1"/>
+          </a:fillRef>
+          <a:effectRef idx="0">
+            <a:schemeClr val="accent1"/>
+          </a:effectRef>
+          <a:fontRef idx="minor">
+            <a:schemeClr val="lt1"/>
+          </a:fontRef>
+        </p:style>
+        <p:txBody>
+          <a:bodyPr rtlCol="0" anchor="ctr"/>
+          <a:lstStyle/>
+          <a:p>
+            <a:pPr algn="ctr"/>
+            <a:endParaRPr lang="en-US"/>
+          </a:p>
+        </p:txBody>
+      </p:sp>
     </p:spTree>
     <p:extLst>
       <p:ext uri="{BB962C8B-B14F-4D97-AF65-F5344CB8AC3E}">

</xml_diff>

<commit_message>
latest version for software building
</commit_message>
<xml_diff>
--- a/BuildRubberBandGunSoftware.pptx
+++ b/BuildRubberBandGunSoftware.pptx
@@ -275,7 +275,7 @@
           <a:p>
             <a:fld id="{02AC24A9-CCB6-4F8D-B8DB-C2F3692CFA5A}" type="datetimeFigureOut">
               <a:rPr lang="en-US" smtClean="0"/>
-              <a:t>6/24/2022</a:t>
+              <a:t>6/26/2022</a:t>
             </a:fld>
             <a:endParaRPr lang="en-US" dirty="0"/>
           </a:p>
@@ -645,7 +645,7 @@
           <a:p>
             <a:fld id="{02AC24A9-CCB6-4F8D-B8DB-C2F3692CFA5A}" type="datetimeFigureOut">
               <a:rPr lang="en-US" smtClean="0"/>
-              <a:t>6/24/2022</a:t>
+              <a:t>6/26/2022</a:t>
             </a:fld>
             <a:endParaRPr lang="en-US"/>
           </a:p>
@@ -854,7 +854,7 @@
           <a:p>
             <a:fld id="{02AC24A9-CCB6-4F8D-B8DB-C2F3692CFA5A}" type="datetimeFigureOut">
               <a:rPr lang="en-US" smtClean="0"/>
-              <a:t>6/24/2022</a:t>
+              <a:t>6/26/2022</a:t>
             </a:fld>
             <a:endParaRPr lang="en-US"/>
           </a:p>
@@ -1324,7 +1324,7 @@
           <a:p>
             <a:fld id="{02AC24A9-CCB6-4F8D-B8DB-C2F3692CFA5A}" type="datetimeFigureOut">
               <a:rPr lang="en-US" smtClean="0"/>
-              <a:t>6/24/2022</a:t>
+              <a:t>6/26/2022</a:t>
             </a:fld>
             <a:endParaRPr lang="en-US"/>
           </a:p>
@@ -1778,7 +1778,7 @@
           <a:p>
             <a:fld id="{02AC24A9-CCB6-4F8D-B8DB-C2F3692CFA5A}" type="datetimeFigureOut">
               <a:rPr lang="en-US" smtClean="0"/>
-              <a:t>6/24/2022</a:t>
+              <a:t>6/26/2022</a:t>
             </a:fld>
             <a:endParaRPr lang="en-US"/>
           </a:p>
@@ -2310,7 +2310,7 @@
           <a:p>
             <a:fld id="{02AC24A9-CCB6-4F8D-B8DB-C2F3692CFA5A}" type="datetimeFigureOut">
               <a:rPr lang="en-US" smtClean="0"/>
-              <a:t>6/24/2022</a:t>
+              <a:t>6/26/2022</a:t>
             </a:fld>
             <a:endParaRPr lang="en-US"/>
           </a:p>
@@ -3009,7 +3009,7 @@
           <a:p>
             <a:fld id="{02AC24A9-CCB6-4F8D-B8DB-C2F3692CFA5A}" type="datetimeFigureOut">
               <a:rPr lang="en-US" smtClean="0"/>
-              <a:t>6/24/2022</a:t>
+              <a:t>6/26/2022</a:t>
             </a:fld>
             <a:endParaRPr lang="en-US"/>
           </a:p>
@@ -3338,7 +3338,7 @@
           <a:p>
             <a:fld id="{02AC24A9-CCB6-4F8D-B8DB-C2F3692CFA5A}" type="datetimeFigureOut">
               <a:rPr lang="en-US" smtClean="0"/>
-              <a:t>6/24/2022</a:t>
+              <a:t>6/26/2022</a:t>
             </a:fld>
             <a:endParaRPr lang="en-US"/>
           </a:p>
@@ -3451,7 +3451,7 @@
           <a:p>
             <a:fld id="{02AC24A9-CCB6-4F8D-B8DB-C2F3692CFA5A}" type="datetimeFigureOut">
               <a:rPr lang="en-US" smtClean="0"/>
-              <a:t>6/24/2022</a:t>
+              <a:t>6/26/2022</a:t>
             </a:fld>
             <a:endParaRPr lang="en-US"/>
           </a:p>
@@ -3946,7 +3946,7 @@
           <a:p>
             <a:fld id="{02AC24A9-CCB6-4F8D-B8DB-C2F3692CFA5A}" type="datetimeFigureOut">
               <a:rPr lang="en-US" smtClean="0"/>
-              <a:t>6/24/2022</a:t>
+              <a:t>6/26/2022</a:t>
             </a:fld>
             <a:endParaRPr lang="en-US" dirty="0"/>
           </a:p>
@@ -4423,7 +4423,7 @@
           <a:p>
             <a:fld id="{02AC24A9-CCB6-4F8D-B8DB-C2F3692CFA5A}" type="datetimeFigureOut">
               <a:rPr lang="en-US" smtClean="0"/>
-              <a:t>6/24/2022</a:t>
+              <a:t>6/26/2022</a:t>
             </a:fld>
             <a:endParaRPr lang="en-US"/>
           </a:p>
@@ -4666,7 +4666,7 @@
           <a:p>
             <a:fld id="{02AC24A9-CCB6-4F8D-B8DB-C2F3692CFA5A}" type="datetimeFigureOut">
               <a:rPr lang="en-US" smtClean="0"/>
-              <a:t>6/24/2022</a:t>
+              <a:t>6/26/2022</a:t>
             </a:fld>
             <a:endParaRPr lang="en-US"/>
           </a:p>
@@ -5258,7 +5258,7 @@
         <p:spPr>
           <a:xfrm>
             <a:off x="856209" y="1718697"/>
-            <a:ext cx="1492716" cy="369332"/>
+            <a:ext cx="1619739" cy="369332"/>
           </a:xfrm>
           <a:prstGeom prst="rect">
             <a:avLst/>
@@ -5272,12 +5272,8 @@
           <a:lstStyle/>
           <a:p>
             <a:r>
-              <a:rPr lang="en-US"/>
-              <a:t>24 Oct </a:t>
-            </a:r>
-            <a:r>
               <a:rPr lang="en-US" dirty="0"/>
-              <a:t>2020</a:t>
+              <a:t>24 June 2022</a:t>
             </a:r>
           </a:p>
         </p:txBody>

</xml_diff>